<commit_message>
Didn't do much :-(
</commit_message>
<xml_diff>
--- a/tex/figures/RotationalDynamics/Figures.pptx
+++ b/tex/figures/RotationalDynamics/Figures.pptx
@@ -244,7 +244,7 @@
           <a:p>
             <a:fld id="{F7249F8D-641B-4CAF-BAE5-10524742F6F1}" type="datetimeFigureOut">
               <a:rPr lang="en-CA" smtClean="0"/>
-              <a:t>2018-07-03</a:t>
+              <a:t>2018-07-04</a:t>
             </a:fld>
             <a:endParaRPr lang="en-CA"/>
           </a:p>
@@ -414,7 +414,7 @@
           <a:p>
             <a:fld id="{F7249F8D-641B-4CAF-BAE5-10524742F6F1}" type="datetimeFigureOut">
               <a:rPr lang="en-CA" smtClean="0"/>
-              <a:t>2018-07-03</a:t>
+              <a:t>2018-07-04</a:t>
             </a:fld>
             <a:endParaRPr lang="en-CA"/>
           </a:p>
@@ -594,7 +594,7 @@
           <a:p>
             <a:fld id="{F7249F8D-641B-4CAF-BAE5-10524742F6F1}" type="datetimeFigureOut">
               <a:rPr lang="en-CA" smtClean="0"/>
-              <a:t>2018-07-03</a:t>
+              <a:t>2018-07-04</a:t>
             </a:fld>
             <a:endParaRPr lang="en-CA"/>
           </a:p>
@@ -764,7 +764,7 @@
           <a:p>
             <a:fld id="{F7249F8D-641B-4CAF-BAE5-10524742F6F1}" type="datetimeFigureOut">
               <a:rPr lang="en-CA" smtClean="0"/>
-              <a:t>2018-07-03</a:t>
+              <a:t>2018-07-04</a:t>
             </a:fld>
             <a:endParaRPr lang="en-CA"/>
           </a:p>
@@ -1010,7 +1010,7 @@
           <a:p>
             <a:fld id="{F7249F8D-641B-4CAF-BAE5-10524742F6F1}" type="datetimeFigureOut">
               <a:rPr lang="en-CA" smtClean="0"/>
-              <a:t>2018-07-03</a:t>
+              <a:t>2018-07-04</a:t>
             </a:fld>
             <a:endParaRPr lang="en-CA"/>
           </a:p>
@@ -1242,7 +1242,7 @@
           <a:p>
             <a:fld id="{F7249F8D-641B-4CAF-BAE5-10524742F6F1}" type="datetimeFigureOut">
               <a:rPr lang="en-CA" smtClean="0"/>
-              <a:t>2018-07-03</a:t>
+              <a:t>2018-07-04</a:t>
             </a:fld>
             <a:endParaRPr lang="en-CA"/>
           </a:p>
@@ -1609,7 +1609,7 @@
           <a:p>
             <a:fld id="{F7249F8D-641B-4CAF-BAE5-10524742F6F1}" type="datetimeFigureOut">
               <a:rPr lang="en-CA" smtClean="0"/>
-              <a:t>2018-07-03</a:t>
+              <a:t>2018-07-04</a:t>
             </a:fld>
             <a:endParaRPr lang="en-CA"/>
           </a:p>
@@ -1727,7 +1727,7 @@
           <a:p>
             <a:fld id="{F7249F8D-641B-4CAF-BAE5-10524742F6F1}" type="datetimeFigureOut">
               <a:rPr lang="en-CA" smtClean="0"/>
-              <a:t>2018-07-03</a:t>
+              <a:t>2018-07-04</a:t>
             </a:fld>
             <a:endParaRPr lang="en-CA"/>
           </a:p>
@@ -1822,7 +1822,7 @@
           <a:p>
             <a:fld id="{F7249F8D-641B-4CAF-BAE5-10524742F6F1}" type="datetimeFigureOut">
               <a:rPr lang="en-CA" smtClean="0"/>
-              <a:t>2018-07-03</a:t>
+              <a:t>2018-07-04</a:t>
             </a:fld>
             <a:endParaRPr lang="en-CA"/>
           </a:p>
@@ -2099,7 +2099,7 @@
           <a:p>
             <a:fld id="{F7249F8D-641B-4CAF-BAE5-10524742F6F1}" type="datetimeFigureOut">
               <a:rPr lang="en-CA" smtClean="0"/>
-              <a:t>2018-07-03</a:t>
+              <a:t>2018-07-04</a:t>
             </a:fld>
             <a:endParaRPr lang="en-CA"/>
           </a:p>
@@ -2352,7 +2352,7 @@
           <a:p>
             <a:fld id="{F7249F8D-641B-4CAF-BAE5-10524742F6F1}" type="datetimeFigureOut">
               <a:rPr lang="en-CA" smtClean="0"/>
-              <a:t>2018-07-03</a:t>
+              <a:t>2018-07-04</a:t>
             </a:fld>
             <a:endParaRPr lang="en-CA"/>
           </a:p>
@@ -2565,7 +2565,7 @@
           <a:p>
             <a:fld id="{F7249F8D-641B-4CAF-BAE5-10524742F6F1}" type="datetimeFigureOut">
               <a:rPr lang="en-CA" smtClean="0"/>
-              <a:t>2018-07-03</a:t>
+              <a:t>2018-07-04</a:t>
             </a:fld>
             <a:endParaRPr lang="en-CA"/>
           </a:p>
@@ -4578,7 +4578,7 @@
         </p:nvGrpSpPr>
         <p:grpSpPr>
           <a:xfrm>
-            <a:off x="705714" y="891716"/>
+            <a:off x="314147" y="644415"/>
             <a:ext cx="3563694" cy="3422751"/>
             <a:chOff x="5179987" y="3123739"/>
             <a:chExt cx="3563694" cy="3422751"/>
@@ -5529,8 +5529,8 @@
               </a:fontRef>
             </p:style>
           </p:cxnSp>
-          <mc:AlternateContent xmlns:mc="http://schemas.openxmlformats.org/markup-compatibility/2006">
-            <mc:Choice xmlns:a14="http://schemas.microsoft.com/office/drawing/2010/main" Requires="a14">
+          <mc:AlternateContent xmlns:mc="http://schemas.openxmlformats.org/markup-compatibility/2006" xmlns:a14="http://schemas.microsoft.com/office/drawing/2010/main">
+            <mc:Choice Requires="a14">
               <p:sp>
                 <p:nvSpPr>
                   <p:cNvPr id="17" name="Rectangle 16"/>
@@ -5667,7 +5667,7 @@
                 </p:txBody>
               </p:sp>
             </mc:Choice>
-            <mc:Fallback>
+            <mc:Fallback xmlns="">
               <p:sp>
                 <p:nvSpPr>
                   <p:cNvPr id="17" name="Rectangle 16"/>
@@ -6029,8 +6029,8 @@
             </a:fontRef>
           </p:style>
         </p:cxnSp>
-        <mc:AlternateContent xmlns:mc="http://schemas.openxmlformats.org/markup-compatibility/2006">
-          <mc:Choice xmlns:a14="http://schemas.microsoft.com/office/drawing/2010/main" Requires="a14">
+        <mc:AlternateContent xmlns:mc="http://schemas.openxmlformats.org/markup-compatibility/2006" xmlns:a14="http://schemas.microsoft.com/office/drawing/2010/main">
+          <mc:Choice Requires="a14">
             <p:sp>
               <p:nvSpPr>
                 <p:cNvPr id="9" name="Rectangle 8"/>
@@ -6179,7 +6179,7 @@
               </p:txBody>
             </p:sp>
           </mc:Choice>
-          <mc:Fallback>
+          <mc:Fallback xmlns="">
             <p:sp>
               <p:nvSpPr>
                 <p:cNvPr id="9" name="Rectangle 8"/>
@@ -6985,7 +6985,7 @@
         </p:nvGrpSpPr>
         <p:grpSpPr>
           <a:xfrm>
-            <a:off x="5784076" y="891716"/>
+            <a:off x="4419655" y="530532"/>
             <a:ext cx="3563694" cy="3532552"/>
             <a:chOff x="5784076" y="891716"/>
             <a:chExt cx="3563694" cy="3532552"/>
@@ -7739,8 +7739,8 @@
                     </a:fontRef>
                   </p:style>
                 </p:cxnSp>
-                <mc:AlternateContent xmlns:mc="http://schemas.openxmlformats.org/markup-compatibility/2006">
-                  <mc:Choice xmlns:a14="http://schemas.microsoft.com/office/drawing/2010/main" Requires="a14">
+                <mc:AlternateContent xmlns:mc="http://schemas.openxmlformats.org/markup-compatibility/2006" xmlns:a14="http://schemas.microsoft.com/office/drawing/2010/main">
+                  <mc:Choice Requires="a14">
                     <p:sp>
                       <p:nvSpPr>
                         <p:cNvPr id="34" name="Rectangle 33"/>
@@ -7889,7 +7889,7 @@
                       </p:txBody>
                     </p:sp>
                   </mc:Choice>
-                  <mc:Fallback>
+                  <mc:Fallback xmlns="">
                     <p:sp>
                       <p:nvSpPr>
                         <p:cNvPr id="34" name="Rectangle 33"/>
@@ -7928,8 +7928,8 @@
                     </p:sp>
                   </mc:Fallback>
                 </mc:AlternateContent>
-                <mc:AlternateContent xmlns:mc="http://schemas.openxmlformats.org/markup-compatibility/2006">
-                  <mc:Choice xmlns:a14="http://schemas.microsoft.com/office/drawing/2010/main" Requires="a14">
+                <mc:AlternateContent xmlns:mc="http://schemas.openxmlformats.org/markup-compatibility/2006" xmlns:a14="http://schemas.microsoft.com/office/drawing/2010/main">
+                  <mc:Choice Requires="a14">
                     <p:sp>
                       <p:nvSpPr>
                         <p:cNvPr id="35" name="Rectangle 34"/>
@@ -8078,7 +8078,7 @@
                       </p:txBody>
                     </p:sp>
                   </mc:Choice>
-                  <mc:Fallback>
+                  <mc:Fallback xmlns="">
                     <p:sp>
                       <p:nvSpPr>
                         <p:cNvPr id="35" name="Rectangle 34"/>
@@ -8155,8 +8155,8 @@
                 </p:style>
               </p:cxnSp>
             </p:grpSp>
-            <mc:AlternateContent xmlns:mc="http://schemas.openxmlformats.org/markup-compatibility/2006">
-              <mc:Choice xmlns:a14="http://schemas.microsoft.com/office/drawing/2010/main" Requires="a14">
+            <mc:AlternateContent xmlns:mc="http://schemas.openxmlformats.org/markup-compatibility/2006" xmlns:a14="http://schemas.microsoft.com/office/drawing/2010/main">
+              <mc:Choice Requires="a14">
                 <p:sp>
                   <p:nvSpPr>
                     <p:cNvPr id="54" name="Rectangle 53"/>
@@ -8293,7 +8293,7 @@
                   </p:txBody>
                 </p:sp>
               </mc:Choice>
-              <mc:Fallback>
+              <mc:Fallback xmlns="">
                 <p:sp>
                   <p:nvSpPr>
                     <p:cNvPr id="54" name="Rectangle 53"/>
@@ -8369,8 +8369,8 @@
               </a:fontRef>
             </p:style>
           </p:cxnSp>
-          <mc:AlternateContent xmlns:mc="http://schemas.openxmlformats.org/markup-compatibility/2006">
-            <mc:Choice xmlns:a14="http://schemas.microsoft.com/office/drawing/2010/main" Requires="a14">
+          <mc:AlternateContent xmlns:mc="http://schemas.openxmlformats.org/markup-compatibility/2006" xmlns:a14="http://schemas.microsoft.com/office/drawing/2010/main">
+            <mc:Choice Requires="a14">
               <p:sp>
                 <p:nvSpPr>
                   <p:cNvPr id="65" name="TextBox 64"/>
@@ -8393,6 +8393,7 @@
                   </a:bodyPr>
                   <a:lstStyle/>
                   <a:p>
+                    <a:pPr/>
                     <a14:m>
                       <m:oMathPara xmlns:m="http://schemas.openxmlformats.org/officeDocument/2006/math">
                         <m:oMathParaPr>
@@ -8438,7 +8439,7 @@
                 </p:txBody>
               </p:sp>
             </mc:Choice>
-            <mc:Fallback>
+            <mc:Fallback xmlns="">
               <p:sp>
                 <p:nvSpPr>
                   <p:cNvPr id="65" name="TextBox 64"/>
@@ -8550,8 +8551,8 @@
             </a:fontRef>
           </p:style>
         </p:cxnSp>
-        <mc:AlternateContent xmlns:mc="http://schemas.openxmlformats.org/markup-compatibility/2006">
-          <mc:Choice xmlns:a14="http://schemas.microsoft.com/office/drawing/2010/main" Requires="a14">
+        <mc:AlternateContent xmlns:mc="http://schemas.openxmlformats.org/markup-compatibility/2006" xmlns:a14="http://schemas.microsoft.com/office/drawing/2010/main">
+          <mc:Choice Requires="a14">
             <p:sp>
               <p:nvSpPr>
                 <p:cNvPr id="74" name="TextBox 73"/>
@@ -8574,6 +8575,7 @@
                 </a:bodyPr>
                 <a:lstStyle/>
                 <a:p>
+                  <a:pPr/>
                   <a14:m>
                     <m:oMathPara xmlns:m="http://schemas.openxmlformats.org/officeDocument/2006/math">
                       <m:oMathParaPr>
@@ -8598,7 +8600,7 @@
               </p:txBody>
             </p:sp>
           </mc:Choice>
-          <mc:Fallback>
+          <mc:Fallback xmlns="">
             <p:sp>
               <p:nvSpPr>
                 <p:cNvPr id="74" name="TextBox 73"/>
@@ -8619,6 +8621,432 @@
                   <a:blip r:embed="rId16"/>
                   <a:stretch>
                     <a:fillRect l="-31707" r="-31707" b="-38000"/>
+                  </a:stretch>
+                </a:blipFill>
+              </p:spPr>
+              <p:txBody>
+                <a:bodyPr/>
+                <a:lstStyle/>
+                <a:p>
+                  <a:r>
+                    <a:rPr lang="en-US">
+                      <a:noFill/>
+                    </a:rPr>
+                    <a:t> </a:t>
+                  </a:r>
+                </a:p>
+              </p:txBody>
+            </p:sp>
+          </mc:Fallback>
+        </mc:AlternateContent>
+      </p:grpSp>
+      <p:grpSp>
+        <p:nvGrpSpPr>
+          <p:cNvPr id="40" name="Group 39"/>
+          <p:cNvGrpSpPr/>
+          <p:nvPr/>
+        </p:nvGrpSpPr>
+        <p:grpSpPr>
+          <a:xfrm>
+            <a:off x="201037" y="4270742"/>
+            <a:ext cx="2449388" cy="2616986"/>
+            <a:chOff x="2296193" y="3939315"/>
+            <a:chExt cx="2449388" cy="2616986"/>
+          </a:xfrm>
+        </p:grpSpPr>
+        <p:sp>
+          <p:nvSpPr>
+            <p:cNvPr id="2" name="Oval 1"/>
+            <p:cNvSpPr/>
+            <p:nvPr/>
+          </p:nvSpPr>
+          <p:spPr>
+            <a:xfrm>
+              <a:off x="2296193" y="4167806"/>
+              <a:ext cx="2160004" cy="2160004"/>
+            </a:xfrm>
+            <a:prstGeom prst="ellipse">
+              <a:avLst/>
+            </a:prstGeom>
+            <a:solidFill>
+              <a:schemeClr val="bg2">
+                <a:lumMod val="90000"/>
+              </a:schemeClr>
+            </a:solidFill>
+            <a:ln w="38100">
+              <a:solidFill>
+                <a:schemeClr val="tx1"/>
+              </a:solidFill>
+            </a:ln>
+          </p:spPr>
+          <p:style>
+            <a:lnRef idx="2">
+              <a:schemeClr val="accent1">
+                <a:shade val="50000"/>
+              </a:schemeClr>
+            </a:lnRef>
+            <a:fillRef idx="1">
+              <a:schemeClr val="accent1"/>
+            </a:fillRef>
+            <a:effectRef idx="0">
+              <a:schemeClr val="accent1"/>
+            </a:effectRef>
+            <a:fontRef idx="minor">
+              <a:schemeClr val="lt1"/>
+            </a:fontRef>
+          </p:style>
+          <p:txBody>
+            <a:bodyPr rtlCol="0" anchor="ctr"/>
+            <a:lstStyle/>
+            <a:p>
+              <a:pPr algn="ctr"/>
+              <a:endParaRPr lang="en-US"/>
+            </a:p>
+          </p:txBody>
+        </p:sp>
+        <p:sp>
+          <p:nvSpPr>
+            <p:cNvPr id="52" name="Oval 51"/>
+            <p:cNvSpPr/>
+            <p:nvPr/>
+          </p:nvSpPr>
+          <p:spPr>
+            <a:xfrm>
+              <a:off x="3319941" y="5187926"/>
+              <a:ext cx="120943" cy="119766"/>
+            </a:xfrm>
+            <a:prstGeom prst="ellipse">
+              <a:avLst/>
+            </a:prstGeom>
+            <a:solidFill>
+              <a:schemeClr val="tx1"/>
+            </a:solidFill>
+            <a:ln w="38100">
+              <a:solidFill>
+                <a:schemeClr val="tx1"/>
+              </a:solidFill>
+            </a:ln>
+          </p:spPr>
+          <p:style>
+            <a:lnRef idx="2">
+              <a:schemeClr val="accent1">
+                <a:shade val="50000"/>
+              </a:schemeClr>
+            </a:lnRef>
+            <a:fillRef idx="1">
+              <a:schemeClr val="accent1"/>
+            </a:fillRef>
+            <a:effectRef idx="0">
+              <a:schemeClr val="accent1"/>
+            </a:effectRef>
+            <a:fontRef idx="minor">
+              <a:schemeClr val="lt1"/>
+            </a:fontRef>
+          </p:style>
+          <p:txBody>
+            <a:bodyPr rtlCol="0" anchor="ctr"/>
+            <a:lstStyle/>
+            <a:p>
+              <a:pPr algn="ctr"/>
+              <a:endParaRPr lang="en-US"/>
+            </a:p>
+          </p:txBody>
+        </p:sp>
+        <p:sp>
+          <p:nvSpPr>
+            <p:cNvPr id="32" name="Oval 31"/>
+            <p:cNvSpPr/>
+            <p:nvPr/>
+          </p:nvSpPr>
+          <p:spPr>
+            <a:xfrm>
+              <a:off x="2995820" y="4859435"/>
+              <a:ext cx="776748" cy="776748"/>
+            </a:xfrm>
+            <a:prstGeom prst="ellipse">
+              <a:avLst/>
+            </a:prstGeom>
+            <a:noFill/>
+            <a:ln w="38100">
+              <a:solidFill>
+                <a:schemeClr val="tx1"/>
+              </a:solidFill>
+              <a:prstDash val="dash"/>
+            </a:ln>
+          </p:spPr>
+          <p:style>
+            <a:lnRef idx="2">
+              <a:schemeClr val="accent1">
+                <a:shade val="50000"/>
+              </a:schemeClr>
+            </a:lnRef>
+            <a:fillRef idx="1">
+              <a:schemeClr val="accent1"/>
+            </a:fillRef>
+            <a:effectRef idx="0">
+              <a:schemeClr val="accent1"/>
+            </a:effectRef>
+            <a:fontRef idx="minor">
+              <a:schemeClr val="lt1"/>
+            </a:fontRef>
+          </p:style>
+          <p:txBody>
+            <a:bodyPr rtlCol="0" anchor="ctr"/>
+            <a:lstStyle/>
+            <a:p>
+              <a:pPr algn="ctr"/>
+              <a:endParaRPr lang="en-US"/>
+            </a:p>
+          </p:txBody>
+        </p:sp>
+        <p:sp>
+          <p:nvSpPr>
+            <p:cNvPr id="56" name="Oval 55"/>
+            <p:cNvSpPr/>
+            <p:nvPr/>
+          </p:nvSpPr>
+          <p:spPr>
+            <a:xfrm>
+              <a:off x="2667460" y="4539073"/>
+              <a:ext cx="1417471" cy="1417471"/>
+            </a:xfrm>
+            <a:prstGeom prst="ellipse">
+              <a:avLst/>
+            </a:prstGeom>
+            <a:noFill/>
+            <a:ln w="38100">
+              <a:solidFill>
+                <a:schemeClr val="tx1"/>
+              </a:solidFill>
+              <a:prstDash val="dash"/>
+            </a:ln>
+          </p:spPr>
+          <p:style>
+            <a:lnRef idx="2">
+              <a:schemeClr val="accent1">
+                <a:shade val="50000"/>
+              </a:schemeClr>
+            </a:lnRef>
+            <a:fillRef idx="1">
+              <a:schemeClr val="accent1"/>
+            </a:fillRef>
+            <a:effectRef idx="0">
+              <a:schemeClr val="accent1"/>
+            </a:effectRef>
+            <a:fontRef idx="minor">
+              <a:schemeClr val="lt1"/>
+            </a:fontRef>
+          </p:style>
+          <p:txBody>
+            <a:bodyPr rtlCol="0" anchor="ctr"/>
+            <a:lstStyle/>
+            <a:p>
+              <a:pPr algn="ctr"/>
+              <a:endParaRPr lang="en-US"/>
+            </a:p>
+          </p:txBody>
+        </p:sp>
+        <p:sp>
+          <p:nvSpPr>
+            <p:cNvPr id="38" name="Arc 37"/>
+            <p:cNvSpPr/>
+            <p:nvPr/>
+          </p:nvSpPr>
+          <p:spPr>
+            <a:xfrm>
+              <a:off x="2426853" y="3939315"/>
+              <a:ext cx="2318728" cy="2616986"/>
+            </a:xfrm>
+            <a:prstGeom prst="arc">
+              <a:avLst/>
+            </a:prstGeom>
+            <a:ln w="38100">
+              <a:solidFill>
+                <a:schemeClr val="tx1"/>
+              </a:solidFill>
+              <a:headEnd type="triangle" w="med" len="med"/>
+              <a:tailEnd type="none" w="med" len="med"/>
+            </a:ln>
+          </p:spPr>
+          <p:style>
+            <a:lnRef idx="1">
+              <a:schemeClr val="accent1"/>
+            </a:lnRef>
+            <a:fillRef idx="0">
+              <a:schemeClr val="accent1"/>
+            </a:fillRef>
+            <a:effectRef idx="0">
+              <a:schemeClr val="accent1"/>
+            </a:effectRef>
+            <a:fontRef idx="minor">
+              <a:schemeClr val="tx1"/>
+            </a:fontRef>
+          </p:style>
+          <p:txBody>
+            <a:bodyPr rtlCol="0" anchor="ctr"/>
+            <a:lstStyle/>
+            <a:p>
+              <a:pPr algn="ctr"/>
+              <a:endParaRPr lang="en-US"/>
+            </a:p>
+          </p:txBody>
+        </p:sp>
+        <mc:AlternateContent xmlns:mc="http://schemas.openxmlformats.org/markup-compatibility/2006">
+          <mc:Choice xmlns:a14="http://schemas.microsoft.com/office/drawing/2010/main" Requires="a14">
+            <p:sp>
+              <p:nvSpPr>
+                <p:cNvPr id="39" name="TextBox 38"/>
+                <p:cNvSpPr txBox="1"/>
+                <p:nvPr/>
+              </p:nvSpPr>
+              <p:spPr>
+                <a:xfrm>
+                  <a:off x="3019675" y="4999915"/>
+                  <a:ext cx="234936" cy="307777"/>
+                </a:xfrm>
+                <a:prstGeom prst="rect">
+                  <a:avLst/>
+                </a:prstGeom>
+                <a:noFill/>
+              </p:spPr>
+              <p:txBody>
+                <a:bodyPr wrap="none" lIns="0" tIns="0" rIns="0" bIns="0" rtlCol="0">
+                  <a:spAutoFit/>
+                </a:bodyPr>
+                <a:lstStyle/>
+                <a:p>
+                  <a14:m>
+                    <m:oMathPara xmlns:m="http://schemas.openxmlformats.org/officeDocument/2006/math">
+                      <m:oMathParaPr>
+                        <m:jc m:val="centerGroup"/>
+                      </m:oMathParaPr>
+                      <m:oMath xmlns:m="http://schemas.openxmlformats.org/officeDocument/2006/math">
+                        <m:r>
+                          <a:rPr lang="en-US" sz="2000" b="0" i="1" smtClean="0">
+                            <a:latin typeface="Cambria Math" panose="02040503050406030204" pitchFamily="18" charset="0"/>
+                            <a:cs typeface="Arial" panose="020B0604020202020204" pitchFamily="34" charset="0"/>
+                          </a:rPr>
+                          <m:t>𝐴</m:t>
+                        </m:r>
+                      </m:oMath>
+                    </m:oMathPara>
+                  </a14:m>
+                  <a:endParaRPr lang="en-US" sz="2000" dirty="0" smtClean="0">
+                    <a:latin typeface="Arial" panose="020B0604020202020204" pitchFamily="34" charset="0"/>
+                    <a:cs typeface="Arial" panose="020B0604020202020204" pitchFamily="34" charset="0"/>
+                  </a:endParaRPr>
+                </a:p>
+              </p:txBody>
+            </p:sp>
+          </mc:Choice>
+          <mc:Fallback>
+            <p:sp>
+              <p:nvSpPr>
+                <p:cNvPr id="39" name="TextBox 38"/>
+                <p:cNvSpPr txBox="1">
+                  <a:spLocks noRot="1" noChangeAspect="1" noMove="1" noResize="1" noEditPoints="1" noAdjustHandles="1" noChangeArrowheads="1" noChangeShapeType="1" noTextEdit="1"/>
+                </p:cNvSpPr>
+                <p:nvPr/>
+              </p:nvSpPr>
+              <p:spPr>
+                <a:xfrm>
+                  <a:off x="3019675" y="4999915"/>
+                  <a:ext cx="234936" cy="307777"/>
+                </a:xfrm>
+                <a:prstGeom prst="rect">
+                  <a:avLst/>
+                </a:prstGeom>
+                <a:blipFill>
+                  <a:blip r:embed="rId17"/>
+                  <a:stretch>
+                    <a:fillRect l="-23684" r="-23684" b="-10000"/>
+                  </a:stretch>
+                </a:blipFill>
+              </p:spPr>
+              <p:txBody>
+                <a:bodyPr/>
+                <a:lstStyle/>
+                <a:p>
+                  <a:r>
+                    <a:rPr lang="en-US">
+                      <a:noFill/>
+                    </a:rPr>
+                    <a:t> </a:t>
+                  </a:r>
+                </a:p>
+              </p:txBody>
+            </p:sp>
+          </mc:Fallback>
+        </mc:AlternateContent>
+        <mc:AlternateContent xmlns:mc="http://schemas.openxmlformats.org/markup-compatibility/2006">
+          <mc:Choice xmlns:a14="http://schemas.microsoft.com/office/drawing/2010/main" Requires="a14">
+            <p:sp>
+              <p:nvSpPr>
+                <p:cNvPr id="58" name="TextBox 57"/>
+                <p:cNvSpPr txBox="1"/>
+                <p:nvPr/>
+              </p:nvSpPr>
+              <p:spPr>
+                <a:xfrm>
+                  <a:off x="2399859" y="4999915"/>
+                  <a:ext cx="245708" cy="307777"/>
+                </a:xfrm>
+                <a:prstGeom prst="rect">
+                  <a:avLst/>
+                </a:prstGeom>
+                <a:noFill/>
+              </p:spPr>
+              <p:txBody>
+                <a:bodyPr wrap="none" lIns="0" tIns="0" rIns="0" bIns="0" rtlCol="0">
+                  <a:spAutoFit/>
+                </a:bodyPr>
+                <a:lstStyle/>
+                <a:p>
+                  <a14:m>
+                    <m:oMathPara xmlns:m="http://schemas.openxmlformats.org/officeDocument/2006/math">
+                      <m:oMathParaPr>
+                        <m:jc m:val="centerGroup"/>
+                      </m:oMathParaPr>
+                      <m:oMath xmlns:m="http://schemas.openxmlformats.org/officeDocument/2006/math">
+                        <m:r>
+                          <a:rPr lang="en-US" sz="2000" b="0" i="1" smtClean="0">
+                            <a:latin typeface="Cambria Math" panose="02040503050406030204" pitchFamily="18" charset="0"/>
+                            <a:cs typeface="Arial" panose="020B0604020202020204" pitchFamily="34" charset="0"/>
+                          </a:rPr>
+                          <m:t>𝐵</m:t>
+                        </m:r>
+                      </m:oMath>
+                    </m:oMathPara>
+                  </a14:m>
+                  <a:endParaRPr lang="en-US" sz="2000" dirty="0" smtClean="0">
+                    <a:latin typeface="Arial" panose="020B0604020202020204" pitchFamily="34" charset="0"/>
+                    <a:cs typeface="Arial" panose="020B0604020202020204" pitchFamily="34" charset="0"/>
+                  </a:endParaRPr>
+                </a:p>
+              </p:txBody>
+            </p:sp>
+          </mc:Choice>
+          <mc:Fallback>
+            <p:sp>
+              <p:nvSpPr>
+                <p:cNvPr id="58" name="TextBox 57"/>
+                <p:cNvSpPr txBox="1">
+                  <a:spLocks noRot="1" noChangeAspect="1" noMove="1" noResize="1" noEditPoints="1" noAdjustHandles="1" noChangeArrowheads="1" noChangeShapeType="1" noTextEdit="1"/>
+                </p:cNvSpPr>
+                <p:nvPr/>
+              </p:nvSpPr>
+              <p:spPr>
+                <a:xfrm>
+                  <a:off x="2399859" y="4999915"/>
+                  <a:ext cx="245708" cy="307777"/>
+                </a:xfrm>
+                <a:prstGeom prst="rect">
+                  <a:avLst/>
+                </a:prstGeom>
+                <a:blipFill>
+                  <a:blip r:embed="rId18"/>
+                  <a:stretch>
+                    <a:fillRect l="-22500" r="-20000" b="-10000"/>
                   </a:stretch>
                 </a:blipFill>
               </p:spPr>

</xml_diff>

<commit_message>
Started angular momentum chapter
Finished kinetic energy narrative
</commit_message>
<xml_diff>
--- a/tex/figures/RotationalDynamics/Figures.pptx
+++ b/tex/figures/RotationalDynamics/Figures.pptx
@@ -6621,8 +6621,8 @@
                   </a:fontRef>
                 </p:style>
               </p:cxnSp>
-              <mc:AlternateContent xmlns:mc="http://schemas.openxmlformats.org/markup-compatibility/2006">
-                <mc:Choice xmlns:a14="http://schemas.microsoft.com/office/drawing/2010/main" Requires="a14">
+              <mc:AlternateContent xmlns:mc="http://schemas.openxmlformats.org/markup-compatibility/2006" xmlns:a14="http://schemas.microsoft.com/office/drawing/2010/main">
+                <mc:Choice Requires="a14">
                   <p:sp>
                     <p:nvSpPr>
                       <p:cNvPr id="11" name="TextBox 10"/>
@@ -6670,7 +6670,7 @@
                     </p:txBody>
                   </p:sp>
                 </mc:Choice>
-                <mc:Fallback>
+                <mc:Fallback xmlns="">
                   <p:sp>
                     <p:nvSpPr>
                       <p:cNvPr id="11" name="TextBox 10"/>
@@ -8019,8 +8019,8 @@
                 </p:sp>
               </mc:Fallback>
             </mc:AlternateContent>
-            <mc:AlternateContent xmlns:mc="http://schemas.openxmlformats.org/markup-compatibility/2006">
-              <mc:Choice xmlns:a14="http://schemas.microsoft.com/office/drawing/2010/main" Requires="a14">
+            <mc:AlternateContent xmlns:mc="http://schemas.openxmlformats.org/markup-compatibility/2006" xmlns:a14="http://schemas.microsoft.com/office/drawing/2010/main">
+              <mc:Choice Requires="a14">
                 <p:sp>
                   <p:nvSpPr>
                     <p:cNvPr id="7" name="TextBox 6"/>
@@ -8078,7 +8078,7 @@
                   </p:txBody>
                 </p:sp>
               </mc:Choice>
-              <mc:Fallback>
+              <mc:Fallback xmlns="">
                 <p:sp>
                   <p:nvSpPr>
                     <p:cNvPr id="7" name="TextBox 6"/>
@@ -8190,8 +8190,8 @@
               </a:fontRef>
             </p:style>
           </p:cxnSp>
-          <mc:AlternateContent xmlns:mc="http://schemas.openxmlformats.org/markup-compatibility/2006">
-            <mc:Choice xmlns:a14="http://schemas.microsoft.com/office/drawing/2010/main" Requires="a14">
+          <mc:AlternateContent xmlns:mc="http://schemas.openxmlformats.org/markup-compatibility/2006" xmlns:a14="http://schemas.microsoft.com/office/drawing/2010/main">
+            <mc:Choice Requires="a14">
               <p:sp>
                 <p:nvSpPr>
                   <p:cNvPr id="46" name="TextBox 45"/>
@@ -8239,7 +8239,7 @@
                 </p:txBody>
               </p:sp>
             </mc:Choice>
-            <mc:Fallback>
+            <mc:Fallback xmlns="">
               <p:sp>
                 <p:nvSpPr>
                   <p:cNvPr id="46" name="TextBox 45"/>
@@ -8327,8 +8327,8 @@
             </p:txBody>
           </p:sp>
         </p:grpSp>
-        <mc:AlternateContent xmlns:mc="http://schemas.openxmlformats.org/markup-compatibility/2006">
-          <mc:Choice xmlns:a14="http://schemas.microsoft.com/office/drawing/2010/main" Requires="a14">
+        <mc:AlternateContent xmlns:mc="http://schemas.openxmlformats.org/markup-compatibility/2006" xmlns:a14="http://schemas.microsoft.com/office/drawing/2010/main">
+          <mc:Choice Requires="a14">
             <p:sp>
               <p:nvSpPr>
                 <p:cNvPr id="2" name="TextBox 1"/>
@@ -8351,6 +8351,7 @@
                 </a:bodyPr>
                 <a:lstStyle/>
                 <a:p>
+                  <a:pPr/>
                   <a14:m>
                     <m:oMathPara xmlns:m="http://schemas.openxmlformats.org/officeDocument/2006/math">
                       <m:oMathParaPr>
@@ -8396,7 +8397,7 @@
               </p:txBody>
             </p:sp>
           </mc:Choice>
-          <mc:Fallback>
+          <mc:Fallback xmlns="">
             <p:sp>
               <p:nvSpPr>
                 <p:cNvPr id="2" name="TextBox 1"/>
@@ -14341,303 +14342,701 @@
       </p:grpSp>
       <p:grpSp>
         <p:nvGrpSpPr>
-          <p:cNvPr id="86" name="Group 85"/>
+          <p:cNvPr id="42" name="Group 41"/>
           <p:cNvGrpSpPr/>
           <p:nvPr/>
         </p:nvGrpSpPr>
         <p:grpSpPr>
           <a:xfrm>
-            <a:off x="5922853" y="3231700"/>
+            <a:off x="6070790" y="3144546"/>
             <a:ext cx="5644913" cy="3043063"/>
-            <a:chOff x="5334619" y="2718075"/>
+            <a:chOff x="5922853" y="3231700"/>
             <a:chExt cx="5644913" cy="3043063"/>
           </a:xfrm>
         </p:grpSpPr>
         <p:grpSp>
           <p:nvGrpSpPr>
-            <p:cNvPr id="28" name="Group 27"/>
+            <p:cNvPr id="86" name="Group 85"/>
             <p:cNvGrpSpPr/>
             <p:nvPr/>
           </p:nvGrpSpPr>
           <p:grpSpPr>
             <a:xfrm>
-              <a:off x="5334619" y="2718075"/>
+              <a:off x="5922853" y="3231700"/>
               <a:ext cx="5644913" cy="3043063"/>
-              <a:chOff x="5182219" y="2813073"/>
+              <a:chOff x="5334619" y="2718075"/>
               <a:chExt cx="5644913" cy="3043063"/>
             </a:xfrm>
           </p:grpSpPr>
           <p:grpSp>
             <p:nvGrpSpPr>
-              <p:cNvPr id="27" name="Group 26"/>
+              <p:cNvPr id="28" name="Group 27"/>
               <p:cNvGrpSpPr/>
               <p:nvPr/>
             </p:nvGrpSpPr>
             <p:grpSpPr>
-              <a:xfrm rot="20175156">
-                <a:off x="5182219" y="2813073"/>
+              <a:xfrm>
+                <a:off x="5334619" y="2718075"/>
                 <a:ext cx="5644913" cy="3043063"/>
-                <a:chOff x="1549880" y="3466484"/>
+                <a:chOff x="5182219" y="2813073"/>
                 <a:chExt cx="5644913" cy="3043063"/>
               </a:xfrm>
             </p:grpSpPr>
+            <p:grpSp>
+              <p:nvGrpSpPr>
+                <p:cNvPr id="27" name="Group 26"/>
+                <p:cNvGrpSpPr/>
+                <p:nvPr/>
+              </p:nvGrpSpPr>
+              <p:grpSpPr>
+                <a:xfrm rot="20175156">
+                  <a:off x="5182219" y="2813073"/>
+                  <a:ext cx="5644913" cy="3043063"/>
+                  <a:chOff x="1549880" y="3466484"/>
+                  <a:chExt cx="5644913" cy="3043063"/>
+                </a:xfrm>
+              </p:grpSpPr>
+              <p:sp>
+                <p:nvSpPr>
+                  <p:cNvPr id="58" name="Rectangle 56"/>
+                  <p:cNvSpPr/>
+                  <p:nvPr/>
+                </p:nvSpPr>
+                <p:spPr>
+                  <a:xfrm rot="361824">
+                    <a:off x="1549880" y="4622218"/>
+                    <a:ext cx="5644913" cy="1303814"/>
+                  </a:xfrm>
+                  <a:custGeom>
+                    <a:avLst/>
+                    <a:gdLst>
+                      <a:gd name="connsiteX0" fmla="*/ 0 w 2361341"/>
+                      <a:gd name="connsiteY0" fmla="*/ 0 h 988828"/>
+                      <a:gd name="connsiteX1" fmla="*/ 2361341 w 2361341"/>
+                      <a:gd name="connsiteY1" fmla="*/ 0 h 988828"/>
+                      <a:gd name="connsiteX2" fmla="*/ 2361341 w 2361341"/>
+                      <a:gd name="connsiteY2" fmla="*/ 988828 h 988828"/>
+                      <a:gd name="connsiteX3" fmla="*/ 0 w 2361341"/>
+                      <a:gd name="connsiteY3" fmla="*/ 988828 h 988828"/>
+                      <a:gd name="connsiteX4" fmla="*/ 0 w 2361341"/>
+                      <a:gd name="connsiteY4" fmla="*/ 0 h 988828"/>
+                      <a:gd name="connsiteX0" fmla="*/ 967563 w 2361341"/>
+                      <a:gd name="connsiteY0" fmla="*/ 159488 h 988828"/>
+                      <a:gd name="connsiteX1" fmla="*/ 2361341 w 2361341"/>
+                      <a:gd name="connsiteY1" fmla="*/ 0 h 988828"/>
+                      <a:gd name="connsiteX2" fmla="*/ 2361341 w 2361341"/>
+                      <a:gd name="connsiteY2" fmla="*/ 988828 h 988828"/>
+                      <a:gd name="connsiteX3" fmla="*/ 0 w 2361341"/>
+                      <a:gd name="connsiteY3" fmla="*/ 988828 h 988828"/>
+                      <a:gd name="connsiteX4" fmla="*/ 967563 w 2361341"/>
+                      <a:gd name="connsiteY4" fmla="*/ 159488 h 988828"/>
+                      <a:gd name="connsiteX0" fmla="*/ 935665 w 2329443"/>
+                      <a:gd name="connsiteY0" fmla="*/ 159488 h 1063256"/>
+                      <a:gd name="connsiteX1" fmla="*/ 2329443 w 2329443"/>
+                      <a:gd name="connsiteY1" fmla="*/ 0 h 1063256"/>
+                      <a:gd name="connsiteX2" fmla="*/ 2329443 w 2329443"/>
+                      <a:gd name="connsiteY2" fmla="*/ 988828 h 1063256"/>
+                      <a:gd name="connsiteX3" fmla="*/ 0 w 2329443"/>
+                      <a:gd name="connsiteY3" fmla="*/ 1063256 h 1063256"/>
+                      <a:gd name="connsiteX4" fmla="*/ 935665 w 2329443"/>
+                      <a:gd name="connsiteY4" fmla="*/ 159488 h 1063256"/>
+                      <a:gd name="connsiteX0" fmla="*/ 935665 w 2786643"/>
+                      <a:gd name="connsiteY0" fmla="*/ 10632 h 914400"/>
+                      <a:gd name="connsiteX1" fmla="*/ 2786643 w 2786643"/>
+                      <a:gd name="connsiteY1" fmla="*/ 0 h 914400"/>
+                      <a:gd name="connsiteX2" fmla="*/ 2329443 w 2786643"/>
+                      <a:gd name="connsiteY2" fmla="*/ 839972 h 914400"/>
+                      <a:gd name="connsiteX3" fmla="*/ 0 w 2786643"/>
+                      <a:gd name="connsiteY3" fmla="*/ 914400 h 914400"/>
+                      <a:gd name="connsiteX4" fmla="*/ 935665 w 2786643"/>
+                      <a:gd name="connsiteY4" fmla="*/ 10632 h 914400"/>
+                      <a:gd name="connsiteX0" fmla="*/ 935665 w 2786643"/>
+                      <a:gd name="connsiteY0" fmla="*/ 10632 h 914400"/>
+                      <a:gd name="connsiteX1" fmla="*/ 2786643 w 2786643"/>
+                      <a:gd name="connsiteY1" fmla="*/ 0 h 914400"/>
+                      <a:gd name="connsiteX2" fmla="*/ 1882876 w 2786643"/>
+                      <a:gd name="connsiteY2" fmla="*/ 861237 h 914400"/>
+                      <a:gd name="connsiteX3" fmla="*/ 0 w 2786643"/>
+                      <a:gd name="connsiteY3" fmla="*/ 914400 h 914400"/>
+                      <a:gd name="connsiteX4" fmla="*/ 935665 w 2786643"/>
+                      <a:gd name="connsiteY4" fmla="*/ 10632 h 914400"/>
+                      <a:gd name="connsiteX0" fmla="*/ 935665 w 3664172"/>
+                      <a:gd name="connsiteY0" fmla="*/ 869755 h 1773523"/>
+                      <a:gd name="connsiteX1" fmla="*/ 3664172 w 3664172"/>
+                      <a:gd name="connsiteY1" fmla="*/ 0 h 1773523"/>
+                      <a:gd name="connsiteX2" fmla="*/ 1882876 w 3664172"/>
+                      <a:gd name="connsiteY2" fmla="*/ 1720360 h 1773523"/>
+                      <a:gd name="connsiteX3" fmla="*/ 0 w 3664172"/>
+                      <a:gd name="connsiteY3" fmla="*/ 1773523 h 1773523"/>
+                      <a:gd name="connsiteX4" fmla="*/ 935665 w 3664172"/>
+                      <a:gd name="connsiteY4" fmla="*/ 869755 h 1773523"/>
+                      <a:gd name="connsiteX0" fmla="*/ 943039 w 3664172"/>
+                      <a:gd name="connsiteY0" fmla="*/ 17791 h 1773523"/>
+                      <a:gd name="connsiteX1" fmla="*/ 3664172 w 3664172"/>
+                      <a:gd name="connsiteY1" fmla="*/ 0 h 1773523"/>
+                      <a:gd name="connsiteX2" fmla="*/ 1882876 w 3664172"/>
+                      <a:gd name="connsiteY2" fmla="*/ 1720360 h 1773523"/>
+                      <a:gd name="connsiteX3" fmla="*/ 0 w 3664172"/>
+                      <a:gd name="connsiteY3" fmla="*/ 1773523 h 1773523"/>
+                      <a:gd name="connsiteX4" fmla="*/ 943039 w 3664172"/>
+                      <a:gd name="connsiteY4" fmla="*/ 17791 h 1773523"/>
+                      <a:gd name="connsiteX0" fmla="*/ 943039 w 3664172"/>
+                      <a:gd name="connsiteY0" fmla="*/ 17791 h 1784795"/>
+                      <a:gd name="connsiteX1" fmla="*/ 3664172 w 3664172"/>
+                      <a:gd name="connsiteY1" fmla="*/ 0 h 1784795"/>
+                      <a:gd name="connsiteX2" fmla="*/ 2775153 w 3664172"/>
+                      <a:gd name="connsiteY2" fmla="*/ 1784795 h 1784795"/>
+                      <a:gd name="connsiteX3" fmla="*/ 0 w 3664172"/>
+                      <a:gd name="connsiteY3" fmla="*/ 1773523 h 1784795"/>
+                      <a:gd name="connsiteX4" fmla="*/ 943039 w 3664172"/>
+                      <a:gd name="connsiteY4" fmla="*/ 17791 h 1784795"/>
+                      <a:gd name="connsiteX0" fmla="*/ 1110253 w 3664172"/>
+                      <a:gd name="connsiteY0" fmla="*/ 17791 h 1784795"/>
+                      <a:gd name="connsiteX1" fmla="*/ 3664172 w 3664172"/>
+                      <a:gd name="connsiteY1" fmla="*/ 0 h 1784795"/>
+                      <a:gd name="connsiteX2" fmla="*/ 2775153 w 3664172"/>
+                      <a:gd name="connsiteY2" fmla="*/ 1784795 h 1784795"/>
+                      <a:gd name="connsiteX3" fmla="*/ 0 w 3664172"/>
+                      <a:gd name="connsiteY3" fmla="*/ 1773523 h 1784795"/>
+                      <a:gd name="connsiteX4" fmla="*/ 1110253 w 3664172"/>
+                      <a:gd name="connsiteY4" fmla="*/ 17791 h 1784795"/>
+                      <a:gd name="connsiteX0" fmla="*/ 1361075 w 3664172"/>
+                      <a:gd name="connsiteY0" fmla="*/ 17791 h 1784795"/>
+                      <a:gd name="connsiteX1" fmla="*/ 3664172 w 3664172"/>
+                      <a:gd name="connsiteY1" fmla="*/ 0 h 1784795"/>
+                      <a:gd name="connsiteX2" fmla="*/ 2775153 w 3664172"/>
+                      <a:gd name="connsiteY2" fmla="*/ 1784795 h 1784795"/>
+                      <a:gd name="connsiteX3" fmla="*/ 0 w 3664172"/>
+                      <a:gd name="connsiteY3" fmla="*/ 1773523 h 1784795"/>
+                      <a:gd name="connsiteX4" fmla="*/ 1361075 w 3664172"/>
+                      <a:gd name="connsiteY4" fmla="*/ 17791 h 1784795"/>
+                      <a:gd name="connsiteX0" fmla="*/ 1411966 w 3664172"/>
+                      <a:gd name="connsiteY0" fmla="*/ 28485 h 1784795"/>
+                      <a:gd name="connsiteX1" fmla="*/ 3664172 w 3664172"/>
+                      <a:gd name="connsiteY1" fmla="*/ 0 h 1784795"/>
+                      <a:gd name="connsiteX2" fmla="*/ 2775153 w 3664172"/>
+                      <a:gd name="connsiteY2" fmla="*/ 1784795 h 1784795"/>
+                      <a:gd name="connsiteX3" fmla="*/ 0 w 3664172"/>
+                      <a:gd name="connsiteY3" fmla="*/ 1773523 h 1784795"/>
+                      <a:gd name="connsiteX4" fmla="*/ 1411966 w 3664172"/>
+                      <a:gd name="connsiteY4" fmla="*/ 28485 h 1784795"/>
+                      <a:gd name="connsiteX0" fmla="*/ 1397426 w 3664172"/>
+                      <a:gd name="connsiteY0" fmla="*/ 23139 h 1784795"/>
+                      <a:gd name="connsiteX1" fmla="*/ 3664172 w 3664172"/>
+                      <a:gd name="connsiteY1" fmla="*/ 0 h 1784795"/>
+                      <a:gd name="connsiteX2" fmla="*/ 2775153 w 3664172"/>
+                      <a:gd name="connsiteY2" fmla="*/ 1784795 h 1784795"/>
+                      <a:gd name="connsiteX3" fmla="*/ 0 w 3664172"/>
+                      <a:gd name="connsiteY3" fmla="*/ 1773523 h 1784795"/>
+                      <a:gd name="connsiteX4" fmla="*/ 1397426 w 3664172"/>
+                      <a:gd name="connsiteY4" fmla="*/ 23139 h 1784795"/>
+                      <a:gd name="connsiteX0" fmla="*/ 1397426 w 4154910"/>
+                      <a:gd name="connsiteY0" fmla="*/ 49874 h 1811530"/>
+                      <a:gd name="connsiteX1" fmla="*/ 4154910 w 4154910"/>
+                      <a:gd name="connsiteY1" fmla="*/ 0 h 1811530"/>
+                      <a:gd name="connsiteX2" fmla="*/ 2775153 w 4154910"/>
+                      <a:gd name="connsiteY2" fmla="*/ 1811530 h 1811530"/>
+                      <a:gd name="connsiteX3" fmla="*/ 0 w 4154910"/>
+                      <a:gd name="connsiteY3" fmla="*/ 1800258 h 1811530"/>
+                      <a:gd name="connsiteX4" fmla="*/ 1397426 w 4154910"/>
+                      <a:gd name="connsiteY4" fmla="*/ 49874 h 1811530"/>
+                      <a:gd name="connsiteX0" fmla="*/ 2077188 w 4154910"/>
+                      <a:gd name="connsiteY0" fmla="*/ 49874 h 1811530"/>
+                      <a:gd name="connsiteX1" fmla="*/ 4154910 w 4154910"/>
+                      <a:gd name="connsiteY1" fmla="*/ 0 h 1811530"/>
+                      <a:gd name="connsiteX2" fmla="*/ 2775153 w 4154910"/>
+                      <a:gd name="connsiteY2" fmla="*/ 1811530 h 1811530"/>
+                      <a:gd name="connsiteX3" fmla="*/ 0 w 4154910"/>
+                      <a:gd name="connsiteY3" fmla="*/ 1800258 h 1811530"/>
+                      <a:gd name="connsiteX4" fmla="*/ 2077188 w 4154910"/>
+                      <a:gd name="connsiteY4" fmla="*/ 49874 h 1811530"/>
+                      <a:gd name="connsiteX0" fmla="*/ 2077188 w 4871023"/>
+                      <a:gd name="connsiteY0" fmla="*/ 60568 h 1822224"/>
+                      <a:gd name="connsiteX1" fmla="*/ 4871023 w 4871023"/>
+                      <a:gd name="connsiteY1" fmla="*/ 0 h 1822224"/>
+                      <a:gd name="connsiteX2" fmla="*/ 2775153 w 4871023"/>
+                      <a:gd name="connsiteY2" fmla="*/ 1822224 h 1822224"/>
+                      <a:gd name="connsiteX3" fmla="*/ 0 w 4871023"/>
+                      <a:gd name="connsiteY3" fmla="*/ 1810952 h 1822224"/>
+                      <a:gd name="connsiteX4" fmla="*/ 2077188 w 4871023"/>
+                      <a:gd name="connsiteY4" fmla="*/ 60568 h 1822224"/>
+                    </a:gdLst>
+                    <a:ahLst/>
+                    <a:cxnLst>
+                      <a:cxn ang="0">
+                        <a:pos x="connsiteX0" y="connsiteY0"/>
+                      </a:cxn>
+                      <a:cxn ang="0">
+                        <a:pos x="connsiteX1" y="connsiteY1"/>
+                      </a:cxn>
+                      <a:cxn ang="0">
+                        <a:pos x="connsiteX2" y="connsiteY2"/>
+                      </a:cxn>
+                      <a:cxn ang="0">
+                        <a:pos x="connsiteX3" y="connsiteY3"/>
+                      </a:cxn>
+                      <a:cxn ang="0">
+                        <a:pos x="connsiteX4" y="connsiteY4"/>
+                      </a:cxn>
+                    </a:cxnLst>
+                    <a:rect l="l" t="t" r="r" b="b"/>
+                    <a:pathLst>
+                      <a:path w="4871023" h="1822224">
+                        <a:moveTo>
+                          <a:pt x="2077188" y="60568"/>
+                        </a:moveTo>
+                        <a:lnTo>
+                          <a:pt x="4871023" y="0"/>
+                        </a:lnTo>
+                        <a:lnTo>
+                          <a:pt x="2775153" y="1822224"/>
+                        </a:lnTo>
+                        <a:lnTo>
+                          <a:pt x="0" y="1810952"/>
+                        </a:lnTo>
+                        <a:lnTo>
+                          <a:pt x="2077188" y="60568"/>
+                        </a:lnTo>
+                        <a:close/>
+                      </a:path>
+                    </a:pathLst>
+                  </a:custGeom>
+                  <a:solidFill>
+                    <a:schemeClr val="bg2"/>
+                  </a:solidFill>
+                  <a:ln w="19050">
+                    <a:solidFill>
+                      <a:schemeClr val="tx1"/>
+                    </a:solidFill>
+                  </a:ln>
+                </p:spPr>
+                <p:style>
+                  <a:lnRef idx="2">
+                    <a:schemeClr val="accent1">
+                      <a:shade val="50000"/>
+                    </a:schemeClr>
+                  </a:lnRef>
+                  <a:fillRef idx="1">
+                    <a:schemeClr val="accent1"/>
+                  </a:fillRef>
+                  <a:effectRef idx="0">
+                    <a:schemeClr val="accent1"/>
+                  </a:effectRef>
+                  <a:fontRef idx="minor">
+                    <a:schemeClr val="lt1"/>
+                  </a:fontRef>
+                </p:style>
+                <p:txBody>
+                  <a:bodyPr rtlCol="0" anchor="ctr"/>
+                  <a:lstStyle/>
+                  <a:p>
+                    <a:pPr algn="ctr"/>
+                    <a:endParaRPr lang="en-US" dirty="0"/>
+                  </a:p>
+                </p:txBody>
+              </p:sp>
+              <p:cxnSp>
+                <p:nvCxnSpPr>
+                  <p:cNvPr id="59" name="Straight Connector 58"/>
+                  <p:cNvCxnSpPr/>
+                  <p:nvPr/>
+                </p:nvCxnSpPr>
+                <p:spPr>
+                  <a:xfrm flipH="1" flipV="1">
+                    <a:off x="4368740" y="4016098"/>
+                    <a:ext cx="10633" cy="1232244"/>
+                  </a:xfrm>
+                  <a:prstGeom prst="line">
+                    <a:avLst/>
+                  </a:prstGeom>
+                  <a:ln w="38100">
+                    <a:solidFill>
+                      <a:schemeClr val="tx1"/>
+                    </a:solidFill>
+                  </a:ln>
+                </p:spPr>
+                <p:style>
+                  <a:lnRef idx="1">
+                    <a:schemeClr val="accent1"/>
+                  </a:lnRef>
+                  <a:fillRef idx="0">
+                    <a:schemeClr val="accent1"/>
+                  </a:fillRef>
+                  <a:effectRef idx="0">
+                    <a:schemeClr val="accent1"/>
+                  </a:effectRef>
+                  <a:fontRef idx="minor">
+                    <a:schemeClr val="tx1"/>
+                  </a:fontRef>
+                </p:style>
+              </p:cxnSp>
+              <p:cxnSp>
+                <p:nvCxnSpPr>
+                  <p:cNvPr id="60" name="Straight Connector 59"/>
+                  <p:cNvCxnSpPr/>
+                  <p:nvPr/>
+                </p:nvCxnSpPr>
+                <p:spPr>
+                  <a:xfrm rot="1424844" flipH="1" flipV="1">
+                    <a:off x="4260460" y="5946063"/>
+                    <a:ext cx="242579" cy="563484"/>
+                  </a:xfrm>
+                  <a:prstGeom prst="line">
+                    <a:avLst/>
+                  </a:prstGeom>
+                  <a:ln w="38100">
+                    <a:solidFill>
+                      <a:schemeClr val="tx1"/>
+                    </a:solidFill>
+                  </a:ln>
+                </p:spPr>
+                <p:style>
+                  <a:lnRef idx="1">
+                    <a:schemeClr val="accent1"/>
+                  </a:lnRef>
+                  <a:fillRef idx="0">
+                    <a:schemeClr val="accent1"/>
+                  </a:fillRef>
+                  <a:effectRef idx="0">
+                    <a:schemeClr val="accent1"/>
+                  </a:effectRef>
+                  <a:fontRef idx="minor">
+                    <a:schemeClr val="tx1"/>
+                  </a:fontRef>
+                </p:style>
+              </p:cxnSp>
+              <p:cxnSp>
+                <p:nvCxnSpPr>
+                  <p:cNvPr id="61" name="Straight Arrow Connector 60"/>
+                  <p:cNvCxnSpPr/>
+                  <p:nvPr/>
+                </p:nvCxnSpPr>
+                <p:spPr>
+                  <a:xfrm rot="1424844" flipV="1">
+                    <a:off x="4389356" y="5209385"/>
+                    <a:ext cx="693759" cy="197980"/>
+                  </a:xfrm>
+                  <a:prstGeom prst="straightConnector1">
+                    <a:avLst/>
+                  </a:prstGeom>
+                  <a:ln w="38100">
+                    <a:solidFill>
+                      <a:schemeClr val="tx1"/>
+                    </a:solidFill>
+                    <a:tailEnd type="triangle"/>
+                  </a:ln>
+                </p:spPr>
+                <p:style>
+                  <a:lnRef idx="1">
+                    <a:schemeClr val="accent1"/>
+                  </a:lnRef>
+                  <a:fillRef idx="0">
+                    <a:schemeClr val="accent1"/>
+                  </a:fillRef>
+                  <a:effectRef idx="0">
+                    <a:schemeClr val="accent1"/>
+                  </a:effectRef>
+                  <a:fontRef idx="minor">
+                    <a:schemeClr val="tx1"/>
+                  </a:fontRef>
+                </p:style>
+              </p:cxnSp>
+              <p:cxnSp>
+                <p:nvCxnSpPr>
+                  <p:cNvPr id="68" name="Straight Connector 67"/>
+                  <p:cNvCxnSpPr/>
+                  <p:nvPr/>
+                </p:nvCxnSpPr>
+                <p:spPr>
+                  <a:xfrm rot="1424844" flipH="1" flipV="1">
+                    <a:off x="4244848" y="5269647"/>
+                    <a:ext cx="276306" cy="622129"/>
+                  </a:xfrm>
+                  <a:prstGeom prst="line">
+                    <a:avLst/>
+                  </a:prstGeom>
+                  <a:ln w="38100">
+                    <a:solidFill>
+                      <a:schemeClr val="tx1"/>
+                    </a:solidFill>
+                    <a:prstDash val="sysDot"/>
+                  </a:ln>
+                </p:spPr>
+                <p:style>
+                  <a:lnRef idx="1">
+                    <a:schemeClr val="accent1"/>
+                  </a:lnRef>
+                  <a:fillRef idx="0">
+                    <a:schemeClr val="accent1"/>
+                  </a:fillRef>
+                  <a:effectRef idx="0">
+                    <a:schemeClr val="accent1"/>
+                  </a:effectRef>
+                  <a:fontRef idx="minor">
+                    <a:schemeClr val="tx1"/>
+                  </a:fontRef>
+                </p:style>
+              </p:cxnSp>
+              <mc:AlternateContent xmlns:mc="http://schemas.openxmlformats.org/markup-compatibility/2006" xmlns:a14="http://schemas.microsoft.com/office/drawing/2010/main">
+                <mc:Choice Requires="a14">
+                  <p:sp>
+                    <p:nvSpPr>
+                      <p:cNvPr id="69" name="TextBox 68"/>
+                      <p:cNvSpPr txBox="1"/>
+                      <p:nvPr/>
+                    </p:nvSpPr>
+                    <p:spPr>
+                      <a:xfrm rot="1424844">
+                        <a:off x="4191252" y="3466484"/>
+                        <a:ext cx="555088" cy="307777"/>
+                      </a:xfrm>
+                      <a:prstGeom prst="rect">
+                        <a:avLst/>
+                      </a:prstGeom>
+                      <a:noFill/>
+                    </p:spPr>
+                    <p:txBody>
+                      <a:bodyPr wrap="none" lIns="0" tIns="0" rIns="0" bIns="0" rtlCol="0">
+                        <a:spAutoFit/>
+                      </a:bodyPr>
+                      <a:lstStyle/>
+                      <a:p>
+                        <a:pPr/>
+                        <a14:m>
+                          <m:oMathPara xmlns:m="http://schemas.openxmlformats.org/officeDocument/2006/math">
+                            <m:oMathParaPr>
+                              <m:jc m:val="centerGroup"/>
+                            </m:oMathParaPr>
+                            <m:oMath xmlns:m="http://schemas.openxmlformats.org/officeDocument/2006/math">
+                              <m:r>
+                                <a:rPr lang="en-US" sz="2000" b="0" i="1" smtClean="0">
+                                  <a:latin typeface="Cambria Math" panose="02040503050406030204" pitchFamily="18" charset="0"/>
+                                  <a:cs typeface="Arial" panose="020B0604020202020204" pitchFamily="34" charset="0"/>
+                                </a:rPr>
+                                <m:t>𝑎𝑥𝑖𝑠</m:t>
+                              </m:r>
+                            </m:oMath>
+                          </m:oMathPara>
+                        </a14:m>
+                        <a:endParaRPr lang="en-US" sz="2000" dirty="0" smtClean="0">
+                          <a:latin typeface="Arial" panose="020B0604020202020204" pitchFamily="34" charset="0"/>
+                          <a:cs typeface="Arial" panose="020B0604020202020204" pitchFamily="34" charset="0"/>
+                        </a:endParaRPr>
+                      </a:p>
+                    </p:txBody>
+                  </p:sp>
+                </mc:Choice>
+                <mc:Fallback xmlns="">
+                  <p:sp>
+                    <p:nvSpPr>
+                      <p:cNvPr id="69" name="TextBox 68"/>
+                      <p:cNvSpPr txBox="1">
+                        <a:spLocks noRot="1" noChangeAspect="1" noMove="1" noResize="1" noEditPoints="1" noAdjustHandles="1" noChangeArrowheads="1" noChangeShapeType="1" noTextEdit="1"/>
+                      </p:cNvSpPr>
+                      <p:nvPr/>
+                    </p:nvSpPr>
+                    <p:spPr>
+                      <a:xfrm rot="1424844">
+                        <a:off x="4191252" y="3466484"/>
+                        <a:ext cx="555088" cy="307777"/>
+                      </a:xfrm>
+                      <a:prstGeom prst="rect">
+                        <a:avLst/>
+                      </a:prstGeom>
+                      <a:blipFill>
+                        <a:blip r:embed="rId17"/>
+                        <a:stretch>
+                          <a:fillRect l="-8791" r="-7692" b="-10000"/>
+                        </a:stretch>
+                      </a:blipFill>
+                    </p:spPr>
+                    <p:txBody>
+                      <a:bodyPr/>
+                      <a:lstStyle/>
+                      <a:p>
+                        <a:r>
+                          <a:rPr lang="en-US">
+                            <a:noFill/>
+                          </a:rPr>
+                          <a:t> </a:t>
+                        </a:r>
+                      </a:p>
+                    </p:txBody>
+                  </p:sp>
+                </mc:Fallback>
+              </mc:AlternateContent>
+              <mc:AlternateContent xmlns:mc="http://schemas.openxmlformats.org/markup-compatibility/2006" xmlns:a14="http://schemas.microsoft.com/office/drawing/2010/main">
+                <mc:Choice Requires="a14">
+                  <p:sp>
+                    <p:nvSpPr>
+                      <p:cNvPr id="73" name="TextBox 72"/>
+                      <p:cNvSpPr txBox="1"/>
+                      <p:nvPr/>
+                    </p:nvSpPr>
+                    <p:spPr>
+                      <a:xfrm rot="1424844">
+                        <a:off x="4555816" y="4966972"/>
+                        <a:ext cx="198003" cy="307777"/>
+                      </a:xfrm>
+                      <a:prstGeom prst="rect">
+                        <a:avLst/>
+                      </a:prstGeom>
+                      <a:noFill/>
+                    </p:spPr>
+                    <p:txBody>
+                      <a:bodyPr wrap="none" lIns="0" tIns="0" rIns="0" bIns="0" rtlCol="0">
+                        <a:spAutoFit/>
+                      </a:bodyPr>
+                      <a:lstStyle/>
+                      <a:p>
+                        <a:pPr/>
+                        <a14:m>
+                          <m:oMathPara xmlns:m="http://schemas.openxmlformats.org/officeDocument/2006/math">
+                            <m:oMathParaPr>
+                              <m:jc m:val="centerGroup"/>
+                            </m:oMathParaPr>
+                            <m:oMath xmlns:m="http://schemas.openxmlformats.org/officeDocument/2006/math">
+                              <m:acc>
+                                <m:accPr>
+                                  <m:chr m:val="⃗"/>
+                                  <m:ctrlPr>
+                                    <a:rPr lang="en-US" sz="2000" b="0" i="1" smtClean="0">
+                                      <a:latin typeface="Cambria Math" panose="02040503050406030204" pitchFamily="18" charset="0"/>
+                                      <a:cs typeface="Arial" panose="020B0604020202020204" pitchFamily="34" charset="0"/>
+                                    </a:rPr>
+                                  </m:ctrlPr>
+                                </m:accPr>
+                                <m:e>
+                                  <m:r>
+                                    <a:rPr lang="en-US" sz="2000" b="0" i="1" smtClean="0">
+                                      <a:latin typeface="Cambria Math" panose="02040503050406030204" pitchFamily="18" charset="0"/>
+                                      <a:cs typeface="Arial" panose="020B0604020202020204" pitchFamily="34" charset="0"/>
+                                    </a:rPr>
+                                    <m:t>𝑟</m:t>
+                                  </m:r>
+                                </m:e>
+                              </m:acc>
+                            </m:oMath>
+                          </m:oMathPara>
+                        </a14:m>
+                        <a:endParaRPr lang="en-US" sz="2000" dirty="0" smtClean="0">
+                          <a:latin typeface="Arial" panose="020B0604020202020204" pitchFamily="34" charset="0"/>
+                          <a:cs typeface="Arial" panose="020B0604020202020204" pitchFamily="34" charset="0"/>
+                        </a:endParaRPr>
+                      </a:p>
+                    </p:txBody>
+                  </p:sp>
+                </mc:Choice>
+                <mc:Fallback xmlns="">
+                  <p:sp>
+                    <p:nvSpPr>
+                      <p:cNvPr id="73" name="TextBox 72"/>
+                      <p:cNvSpPr txBox="1">
+                        <a:spLocks noRot="1" noChangeAspect="1" noMove="1" noResize="1" noEditPoints="1" noAdjustHandles="1" noChangeArrowheads="1" noChangeShapeType="1" noTextEdit="1"/>
+                      </p:cNvSpPr>
+                      <p:nvPr/>
+                    </p:nvSpPr>
+                    <p:spPr>
+                      <a:xfrm rot="1424844">
+                        <a:off x="4555816" y="4966972"/>
+                        <a:ext cx="198003" cy="307777"/>
+                      </a:xfrm>
+                      <a:prstGeom prst="rect">
+                        <a:avLst/>
+                      </a:prstGeom>
+                      <a:blipFill>
+                        <a:blip r:embed="rId18"/>
+                        <a:stretch>
+                          <a:fillRect l="-31250" t="-36000" r="-96875" b="-6000"/>
+                        </a:stretch>
+                      </a:blipFill>
+                    </p:spPr>
+                    <p:txBody>
+                      <a:bodyPr/>
+                      <a:lstStyle/>
+                      <a:p>
+                        <a:r>
+                          <a:rPr lang="en-US">
+                            <a:noFill/>
+                          </a:rPr>
+                          <a:t> </a:t>
+                        </a:r>
+                      </a:p>
+                    </p:txBody>
+                  </p:sp>
+                </mc:Fallback>
+              </mc:AlternateContent>
+              <p:sp>
+                <p:nvSpPr>
+                  <p:cNvPr id="2" name="Oval 1"/>
+                  <p:cNvSpPr/>
+                  <p:nvPr/>
+                </p:nvSpPr>
+                <p:spPr>
+                  <a:xfrm rot="4152">
+                    <a:off x="3605957" y="4940615"/>
+                    <a:ext cx="1555275" cy="571985"/>
+                  </a:xfrm>
+                  <a:prstGeom prst="ellipse">
+                    <a:avLst/>
+                  </a:prstGeom>
+                  <a:noFill/>
+                  <a:ln w="38100">
+                    <a:solidFill>
+                      <a:schemeClr val="tx1"/>
+                    </a:solidFill>
+                  </a:ln>
+                </p:spPr>
+                <p:style>
+                  <a:lnRef idx="2">
+                    <a:schemeClr val="accent1">
+                      <a:shade val="50000"/>
+                    </a:schemeClr>
+                  </a:lnRef>
+                  <a:fillRef idx="1">
+                    <a:schemeClr val="accent1"/>
+                  </a:fillRef>
+                  <a:effectRef idx="0">
+                    <a:schemeClr val="accent1"/>
+                  </a:effectRef>
+                  <a:fontRef idx="minor">
+                    <a:schemeClr val="lt1"/>
+                  </a:fontRef>
+                </p:style>
+                <p:txBody>
+                  <a:bodyPr rtlCol="0" anchor="ctr"/>
+                  <a:lstStyle/>
+                  <a:p>
+                    <a:pPr algn="ctr"/>
+                    <a:endParaRPr lang="en-US"/>
+                  </a:p>
+                </p:txBody>
+              </p:sp>
+            </p:grpSp>
             <p:sp>
               <p:nvSpPr>
-                <p:cNvPr id="58" name="Rectangle 56"/>
+                <p:cNvPr id="79" name="Arc 78"/>
                 <p:cNvSpPr/>
                 <p:nvPr/>
               </p:nvSpPr>
               <p:spPr>
-                <a:xfrm rot="361824">
-                  <a:off x="1549880" y="4622218"/>
-                  <a:ext cx="5644913" cy="1303814"/>
+                <a:xfrm rot="20179962">
+                  <a:off x="5974871" y="4036967"/>
+                  <a:ext cx="1671457" cy="259654"/>
                 </a:xfrm>
-                <a:custGeom>
-                  <a:avLst/>
-                  <a:gdLst>
-                    <a:gd name="connsiteX0" fmla="*/ 0 w 2361341"/>
-                    <a:gd name="connsiteY0" fmla="*/ 0 h 988828"/>
-                    <a:gd name="connsiteX1" fmla="*/ 2361341 w 2361341"/>
-                    <a:gd name="connsiteY1" fmla="*/ 0 h 988828"/>
-                    <a:gd name="connsiteX2" fmla="*/ 2361341 w 2361341"/>
-                    <a:gd name="connsiteY2" fmla="*/ 988828 h 988828"/>
-                    <a:gd name="connsiteX3" fmla="*/ 0 w 2361341"/>
-                    <a:gd name="connsiteY3" fmla="*/ 988828 h 988828"/>
-                    <a:gd name="connsiteX4" fmla="*/ 0 w 2361341"/>
-                    <a:gd name="connsiteY4" fmla="*/ 0 h 988828"/>
-                    <a:gd name="connsiteX0" fmla="*/ 967563 w 2361341"/>
-                    <a:gd name="connsiteY0" fmla="*/ 159488 h 988828"/>
-                    <a:gd name="connsiteX1" fmla="*/ 2361341 w 2361341"/>
-                    <a:gd name="connsiteY1" fmla="*/ 0 h 988828"/>
-                    <a:gd name="connsiteX2" fmla="*/ 2361341 w 2361341"/>
-                    <a:gd name="connsiteY2" fmla="*/ 988828 h 988828"/>
-                    <a:gd name="connsiteX3" fmla="*/ 0 w 2361341"/>
-                    <a:gd name="connsiteY3" fmla="*/ 988828 h 988828"/>
-                    <a:gd name="connsiteX4" fmla="*/ 967563 w 2361341"/>
-                    <a:gd name="connsiteY4" fmla="*/ 159488 h 988828"/>
-                    <a:gd name="connsiteX0" fmla="*/ 935665 w 2329443"/>
-                    <a:gd name="connsiteY0" fmla="*/ 159488 h 1063256"/>
-                    <a:gd name="connsiteX1" fmla="*/ 2329443 w 2329443"/>
-                    <a:gd name="connsiteY1" fmla="*/ 0 h 1063256"/>
-                    <a:gd name="connsiteX2" fmla="*/ 2329443 w 2329443"/>
-                    <a:gd name="connsiteY2" fmla="*/ 988828 h 1063256"/>
-                    <a:gd name="connsiteX3" fmla="*/ 0 w 2329443"/>
-                    <a:gd name="connsiteY3" fmla="*/ 1063256 h 1063256"/>
-                    <a:gd name="connsiteX4" fmla="*/ 935665 w 2329443"/>
-                    <a:gd name="connsiteY4" fmla="*/ 159488 h 1063256"/>
-                    <a:gd name="connsiteX0" fmla="*/ 935665 w 2786643"/>
-                    <a:gd name="connsiteY0" fmla="*/ 10632 h 914400"/>
-                    <a:gd name="connsiteX1" fmla="*/ 2786643 w 2786643"/>
-                    <a:gd name="connsiteY1" fmla="*/ 0 h 914400"/>
-                    <a:gd name="connsiteX2" fmla="*/ 2329443 w 2786643"/>
-                    <a:gd name="connsiteY2" fmla="*/ 839972 h 914400"/>
-                    <a:gd name="connsiteX3" fmla="*/ 0 w 2786643"/>
-                    <a:gd name="connsiteY3" fmla="*/ 914400 h 914400"/>
-                    <a:gd name="connsiteX4" fmla="*/ 935665 w 2786643"/>
-                    <a:gd name="connsiteY4" fmla="*/ 10632 h 914400"/>
-                    <a:gd name="connsiteX0" fmla="*/ 935665 w 2786643"/>
-                    <a:gd name="connsiteY0" fmla="*/ 10632 h 914400"/>
-                    <a:gd name="connsiteX1" fmla="*/ 2786643 w 2786643"/>
-                    <a:gd name="connsiteY1" fmla="*/ 0 h 914400"/>
-                    <a:gd name="connsiteX2" fmla="*/ 1882876 w 2786643"/>
-                    <a:gd name="connsiteY2" fmla="*/ 861237 h 914400"/>
-                    <a:gd name="connsiteX3" fmla="*/ 0 w 2786643"/>
-                    <a:gd name="connsiteY3" fmla="*/ 914400 h 914400"/>
-                    <a:gd name="connsiteX4" fmla="*/ 935665 w 2786643"/>
-                    <a:gd name="connsiteY4" fmla="*/ 10632 h 914400"/>
-                    <a:gd name="connsiteX0" fmla="*/ 935665 w 3664172"/>
-                    <a:gd name="connsiteY0" fmla="*/ 869755 h 1773523"/>
-                    <a:gd name="connsiteX1" fmla="*/ 3664172 w 3664172"/>
-                    <a:gd name="connsiteY1" fmla="*/ 0 h 1773523"/>
-                    <a:gd name="connsiteX2" fmla="*/ 1882876 w 3664172"/>
-                    <a:gd name="connsiteY2" fmla="*/ 1720360 h 1773523"/>
-                    <a:gd name="connsiteX3" fmla="*/ 0 w 3664172"/>
-                    <a:gd name="connsiteY3" fmla="*/ 1773523 h 1773523"/>
-                    <a:gd name="connsiteX4" fmla="*/ 935665 w 3664172"/>
-                    <a:gd name="connsiteY4" fmla="*/ 869755 h 1773523"/>
-                    <a:gd name="connsiteX0" fmla="*/ 943039 w 3664172"/>
-                    <a:gd name="connsiteY0" fmla="*/ 17791 h 1773523"/>
-                    <a:gd name="connsiteX1" fmla="*/ 3664172 w 3664172"/>
-                    <a:gd name="connsiteY1" fmla="*/ 0 h 1773523"/>
-                    <a:gd name="connsiteX2" fmla="*/ 1882876 w 3664172"/>
-                    <a:gd name="connsiteY2" fmla="*/ 1720360 h 1773523"/>
-                    <a:gd name="connsiteX3" fmla="*/ 0 w 3664172"/>
-                    <a:gd name="connsiteY3" fmla="*/ 1773523 h 1773523"/>
-                    <a:gd name="connsiteX4" fmla="*/ 943039 w 3664172"/>
-                    <a:gd name="connsiteY4" fmla="*/ 17791 h 1773523"/>
-                    <a:gd name="connsiteX0" fmla="*/ 943039 w 3664172"/>
-                    <a:gd name="connsiteY0" fmla="*/ 17791 h 1784795"/>
-                    <a:gd name="connsiteX1" fmla="*/ 3664172 w 3664172"/>
-                    <a:gd name="connsiteY1" fmla="*/ 0 h 1784795"/>
-                    <a:gd name="connsiteX2" fmla="*/ 2775153 w 3664172"/>
-                    <a:gd name="connsiteY2" fmla="*/ 1784795 h 1784795"/>
-                    <a:gd name="connsiteX3" fmla="*/ 0 w 3664172"/>
-                    <a:gd name="connsiteY3" fmla="*/ 1773523 h 1784795"/>
-                    <a:gd name="connsiteX4" fmla="*/ 943039 w 3664172"/>
-                    <a:gd name="connsiteY4" fmla="*/ 17791 h 1784795"/>
-                    <a:gd name="connsiteX0" fmla="*/ 1110253 w 3664172"/>
-                    <a:gd name="connsiteY0" fmla="*/ 17791 h 1784795"/>
-                    <a:gd name="connsiteX1" fmla="*/ 3664172 w 3664172"/>
-                    <a:gd name="connsiteY1" fmla="*/ 0 h 1784795"/>
-                    <a:gd name="connsiteX2" fmla="*/ 2775153 w 3664172"/>
-                    <a:gd name="connsiteY2" fmla="*/ 1784795 h 1784795"/>
-                    <a:gd name="connsiteX3" fmla="*/ 0 w 3664172"/>
-                    <a:gd name="connsiteY3" fmla="*/ 1773523 h 1784795"/>
-                    <a:gd name="connsiteX4" fmla="*/ 1110253 w 3664172"/>
-                    <a:gd name="connsiteY4" fmla="*/ 17791 h 1784795"/>
-                    <a:gd name="connsiteX0" fmla="*/ 1361075 w 3664172"/>
-                    <a:gd name="connsiteY0" fmla="*/ 17791 h 1784795"/>
-                    <a:gd name="connsiteX1" fmla="*/ 3664172 w 3664172"/>
-                    <a:gd name="connsiteY1" fmla="*/ 0 h 1784795"/>
-                    <a:gd name="connsiteX2" fmla="*/ 2775153 w 3664172"/>
-                    <a:gd name="connsiteY2" fmla="*/ 1784795 h 1784795"/>
-                    <a:gd name="connsiteX3" fmla="*/ 0 w 3664172"/>
-                    <a:gd name="connsiteY3" fmla="*/ 1773523 h 1784795"/>
-                    <a:gd name="connsiteX4" fmla="*/ 1361075 w 3664172"/>
-                    <a:gd name="connsiteY4" fmla="*/ 17791 h 1784795"/>
-                    <a:gd name="connsiteX0" fmla="*/ 1411966 w 3664172"/>
-                    <a:gd name="connsiteY0" fmla="*/ 28485 h 1784795"/>
-                    <a:gd name="connsiteX1" fmla="*/ 3664172 w 3664172"/>
-                    <a:gd name="connsiteY1" fmla="*/ 0 h 1784795"/>
-                    <a:gd name="connsiteX2" fmla="*/ 2775153 w 3664172"/>
-                    <a:gd name="connsiteY2" fmla="*/ 1784795 h 1784795"/>
-                    <a:gd name="connsiteX3" fmla="*/ 0 w 3664172"/>
-                    <a:gd name="connsiteY3" fmla="*/ 1773523 h 1784795"/>
-                    <a:gd name="connsiteX4" fmla="*/ 1411966 w 3664172"/>
-                    <a:gd name="connsiteY4" fmla="*/ 28485 h 1784795"/>
-                    <a:gd name="connsiteX0" fmla="*/ 1397426 w 3664172"/>
-                    <a:gd name="connsiteY0" fmla="*/ 23139 h 1784795"/>
-                    <a:gd name="connsiteX1" fmla="*/ 3664172 w 3664172"/>
-                    <a:gd name="connsiteY1" fmla="*/ 0 h 1784795"/>
-                    <a:gd name="connsiteX2" fmla="*/ 2775153 w 3664172"/>
-                    <a:gd name="connsiteY2" fmla="*/ 1784795 h 1784795"/>
-                    <a:gd name="connsiteX3" fmla="*/ 0 w 3664172"/>
-                    <a:gd name="connsiteY3" fmla="*/ 1773523 h 1784795"/>
-                    <a:gd name="connsiteX4" fmla="*/ 1397426 w 3664172"/>
-                    <a:gd name="connsiteY4" fmla="*/ 23139 h 1784795"/>
-                    <a:gd name="connsiteX0" fmla="*/ 1397426 w 4154910"/>
-                    <a:gd name="connsiteY0" fmla="*/ 49874 h 1811530"/>
-                    <a:gd name="connsiteX1" fmla="*/ 4154910 w 4154910"/>
-                    <a:gd name="connsiteY1" fmla="*/ 0 h 1811530"/>
-                    <a:gd name="connsiteX2" fmla="*/ 2775153 w 4154910"/>
-                    <a:gd name="connsiteY2" fmla="*/ 1811530 h 1811530"/>
-                    <a:gd name="connsiteX3" fmla="*/ 0 w 4154910"/>
-                    <a:gd name="connsiteY3" fmla="*/ 1800258 h 1811530"/>
-                    <a:gd name="connsiteX4" fmla="*/ 1397426 w 4154910"/>
-                    <a:gd name="connsiteY4" fmla="*/ 49874 h 1811530"/>
-                    <a:gd name="connsiteX0" fmla="*/ 2077188 w 4154910"/>
-                    <a:gd name="connsiteY0" fmla="*/ 49874 h 1811530"/>
-                    <a:gd name="connsiteX1" fmla="*/ 4154910 w 4154910"/>
-                    <a:gd name="connsiteY1" fmla="*/ 0 h 1811530"/>
-                    <a:gd name="connsiteX2" fmla="*/ 2775153 w 4154910"/>
-                    <a:gd name="connsiteY2" fmla="*/ 1811530 h 1811530"/>
-                    <a:gd name="connsiteX3" fmla="*/ 0 w 4154910"/>
-                    <a:gd name="connsiteY3" fmla="*/ 1800258 h 1811530"/>
-                    <a:gd name="connsiteX4" fmla="*/ 2077188 w 4154910"/>
-                    <a:gd name="connsiteY4" fmla="*/ 49874 h 1811530"/>
-                    <a:gd name="connsiteX0" fmla="*/ 2077188 w 4871023"/>
-                    <a:gd name="connsiteY0" fmla="*/ 60568 h 1822224"/>
-                    <a:gd name="connsiteX1" fmla="*/ 4871023 w 4871023"/>
-                    <a:gd name="connsiteY1" fmla="*/ 0 h 1822224"/>
-                    <a:gd name="connsiteX2" fmla="*/ 2775153 w 4871023"/>
-                    <a:gd name="connsiteY2" fmla="*/ 1822224 h 1822224"/>
-                    <a:gd name="connsiteX3" fmla="*/ 0 w 4871023"/>
-                    <a:gd name="connsiteY3" fmla="*/ 1810952 h 1822224"/>
-                    <a:gd name="connsiteX4" fmla="*/ 2077188 w 4871023"/>
-                    <a:gd name="connsiteY4" fmla="*/ 60568 h 1822224"/>
-                  </a:gdLst>
-                  <a:ahLst/>
-                  <a:cxnLst>
-                    <a:cxn ang="0">
-                      <a:pos x="connsiteX0" y="connsiteY0"/>
-                    </a:cxn>
-                    <a:cxn ang="0">
-                      <a:pos x="connsiteX1" y="connsiteY1"/>
-                    </a:cxn>
-                    <a:cxn ang="0">
-                      <a:pos x="connsiteX2" y="connsiteY2"/>
-                    </a:cxn>
-                    <a:cxn ang="0">
-                      <a:pos x="connsiteX3" y="connsiteY3"/>
-                    </a:cxn>
-                    <a:cxn ang="0">
-                      <a:pos x="connsiteX4" y="connsiteY4"/>
-                    </a:cxn>
-                  </a:cxnLst>
-                  <a:rect l="l" t="t" r="r" b="b"/>
-                  <a:pathLst>
-                    <a:path w="4871023" h="1822224">
-                      <a:moveTo>
-                        <a:pt x="2077188" y="60568"/>
-                      </a:moveTo>
-                      <a:lnTo>
-                        <a:pt x="4871023" y="0"/>
-                      </a:lnTo>
-                      <a:lnTo>
-                        <a:pt x="2775153" y="1822224"/>
-                      </a:lnTo>
-                      <a:lnTo>
-                        <a:pt x="0" y="1810952"/>
-                      </a:lnTo>
-                      <a:lnTo>
-                        <a:pt x="2077188" y="60568"/>
-                      </a:lnTo>
-                      <a:close/>
-                    </a:path>
-                  </a:pathLst>
-                </a:custGeom>
-                <a:solidFill>
-                  <a:schemeClr val="bg2"/>
-                </a:solidFill>
-                <a:ln w="19050">
+                <a:prstGeom prst="arc">
+                  <a:avLst>
+                    <a:gd name="adj1" fmla="val 18287012"/>
+                    <a:gd name="adj2" fmla="val 9682168"/>
+                  </a:avLst>
+                </a:prstGeom>
+                <a:ln w="28575">
                   <a:solidFill>
                     <a:schemeClr val="tx1"/>
                   </a:solidFill>
-                </a:ln>
-              </p:spPr>
-              <p:style>
-                <a:lnRef idx="2">
-                  <a:schemeClr val="accent1">
-                    <a:shade val="50000"/>
-                  </a:schemeClr>
-                </a:lnRef>
-                <a:fillRef idx="1">
-                  <a:schemeClr val="accent1"/>
-                </a:fillRef>
-                <a:effectRef idx="0">
-                  <a:schemeClr val="accent1"/>
-                </a:effectRef>
-                <a:fontRef idx="minor">
-                  <a:schemeClr val="lt1"/>
-                </a:fontRef>
-              </p:style>
-              <p:txBody>
-                <a:bodyPr rtlCol="0" anchor="ctr"/>
-                <a:lstStyle/>
-                <a:p>
-                  <a:pPr algn="ctr"/>
-                  <a:endParaRPr lang="en-US" dirty="0"/>
-                </a:p>
-              </p:txBody>
-            </p:sp>
-            <p:cxnSp>
-              <p:nvCxnSpPr>
-                <p:cNvPr id="59" name="Straight Connector 58"/>
-                <p:cNvCxnSpPr/>
-                <p:nvPr/>
-              </p:nvCxnSpPr>
-              <p:spPr>
-                <a:xfrm flipH="1" flipV="1">
-                  <a:off x="4368740" y="4016098"/>
-                  <a:ext cx="10633" cy="1232244"/>
-                </a:xfrm>
-                <a:prstGeom prst="line">
-                  <a:avLst/>
-                </a:prstGeom>
-                <a:ln w="38100">
-                  <a:solidFill>
-                    <a:schemeClr val="tx1"/>
-                  </a:solidFill>
+                  <a:prstDash val="sysDot"/>
+                  <a:headEnd type="triangle" w="med" len="med"/>
+                  <a:tailEnd type="none" w="med" len="med"/>
                 </a:ln>
               </p:spPr>
               <p:style>
@@ -14654,340 +15053,6 @@
                   <a:schemeClr val="tx1"/>
                 </a:fontRef>
               </p:style>
-            </p:cxnSp>
-            <p:cxnSp>
-              <p:nvCxnSpPr>
-                <p:cNvPr id="60" name="Straight Connector 59"/>
-                <p:cNvCxnSpPr/>
-                <p:nvPr/>
-              </p:nvCxnSpPr>
-              <p:spPr>
-                <a:xfrm rot="1424844" flipH="1" flipV="1">
-                  <a:off x="4260460" y="5946063"/>
-                  <a:ext cx="242579" cy="563484"/>
-                </a:xfrm>
-                <a:prstGeom prst="line">
-                  <a:avLst/>
-                </a:prstGeom>
-                <a:ln w="38100">
-                  <a:solidFill>
-                    <a:schemeClr val="tx1"/>
-                  </a:solidFill>
-                </a:ln>
-              </p:spPr>
-              <p:style>
-                <a:lnRef idx="1">
-                  <a:schemeClr val="accent1"/>
-                </a:lnRef>
-                <a:fillRef idx="0">
-                  <a:schemeClr val="accent1"/>
-                </a:fillRef>
-                <a:effectRef idx="0">
-                  <a:schemeClr val="accent1"/>
-                </a:effectRef>
-                <a:fontRef idx="minor">
-                  <a:schemeClr val="tx1"/>
-                </a:fontRef>
-              </p:style>
-            </p:cxnSp>
-            <p:cxnSp>
-              <p:nvCxnSpPr>
-                <p:cNvPr id="61" name="Straight Arrow Connector 60"/>
-                <p:cNvCxnSpPr/>
-                <p:nvPr/>
-              </p:nvCxnSpPr>
-              <p:spPr>
-                <a:xfrm rot="1424844" flipV="1">
-                  <a:off x="4389356" y="5209385"/>
-                  <a:ext cx="693759" cy="197980"/>
-                </a:xfrm>
-                <a:prstGeom prst="straightConnector1">
-                  <a:avLst/>
-                </a:prstGeom>
-                <a:ln w="38100">
-                  <a:solidFill>
-                    <a:schemeClr val="tx1"/>
-                  </a:solidFill>
-                  <a:tailEnd type="triangle"/>
-                </a:ln>
-              </p:spPr>
-              <p:style>
-                <a:lnRef idx="1">
-                  <a:schemeClr val="accent1"/>
-                </a:lnRef>
-                <a:fillRef idx="0">
-                  <a:schemeClr val="accent1"/>
-                </a:fillRef>
-                <a:effectRef idx="0">
-                  <a:schemeClr val="accent1"/>
-                </a:effectRef>
-                <a:fontRef idx="minor">
-                  <a:schemeClr val="tx1"/>
-                </a:fontRef>
-              </p:style>
-            </p:cxnSp>
-            <p:cxnSp>
-              <p:nvCxnSpPr>
-                <p:cNvPr id="68" name="Straight Connector 67"/>
-                <p:cNvCxnSpPr/>
-                <p:nvPr/>
-              </p:nvCxnSpPr>
-              <p:spPr>
-                <a:xfrm rot="1424844" flipH="1" flipV="1">
-                  <a:off x="4244848" y="5269647"/>
-                  <a:ext cx="276306" cy="622129"/>
-                </a:xfrm>
-                <a:prstGeom prst="line">
-                  <a:avLst/>
-                </a:prstGeom>
-                <a:ln w="38100">
-                  <a:solidFill>
-                    <a:schemeClr val="tx1"/>
-                  </a:solidFill>
-                  <a:prstDash val="sysDot"/>
-                </a:ln>
-              </p:spPr>
-              <p:style>
-                <a:lnRef idx="1">
-                  <a:schemeClr val="accent1"/>
-                </a:lnRef>
-                <a:fillRef idx="0">
-                  <a:schemeClr val="accent1"/>
-                </a:fillRef>
-                <a:effectRef idx="0">
-                  <a:schemeClr val="accent1"/>
-                </a:effectRef>
-                <a:fontRef idx="minor">
-                  <a:schemeClr val="tx1"/>
-                </a:fontRef>
-              </p:style>
-            </p:cxnSp>
-            <mc:AlternateContent xmlns:mc="http://schemas.openxmlformats.org/markup-compatibility/2006">
-              <mc:Choice xmlns:a14="http://schemas.microsoft.com/office/drawing/2010/main" Requires="a14">
-                <p:sp>
-                  <p:nvSpPr>
-                    <p:cNvPr id="69" name="TextBox 68"/>
-                    <p:cNvSpPr txBox="1"/>
-                    <p:nvPr/>
-                  </p:nvSpPr>
-                  <p:spPr>
-                    <a:xfrm rot="1424844">
-                      <a:off x="4191252" y="3466484"/>
-                      <a:ext cx="555088" cy="307777"/>
-                    </a:xfrm>
-                    <a:prstGeom prst="rect">
-                      <a:avLst/>
-                    </a:prstGeom>
-                    <a:noFill/>
-                  </p:spPr>
-                  <p:txBody>
-                    <a:bodyPr wrap="none" lIns="0" tIns="0" rIns="0" bIns="0" rtlCol="0">
-                      <a:spAutoFit/>
-                    </a:bodyPr>
-                    <a:lstStyle/>
-                    <a:p>
-                      <a:pPr/>
-                      <a14:m>
-                        <m:oMathPara xmlns:m="http://schemas.openxmlformats.org/officeDocument/2006/math">
-                          <m:oMathParaPr>
-                            <m:jc m:val="centerGroup"/>
-                          </m:oMathParaPr>
-                          <m:oMath xmlns:m="http://schemas.openxmlformats.org/officeDocument/2006/math">
-                            <m:r>
-                              <a:rPr lang="en-US" sz="2000" b="0" i="1" smtClean="0">
-                                <a:latin typeface="Cambria Math" panose="02040503050406030204" pitchFamily="18" charset="0"/>
-                                <a:cs typeface="Arial" panose="020B0604020202020204" pitchFamily="34" charset="0"/>
-                              </a:rPr>
-                              <m:t>𝑎𝑥𝑖𝑠</m:t>
-                            </m:r>
-                          </m:oMath>
-                        </m:oMathPara>
-                      </a14:m>
-                      <a:endParaRPr lang="en-US" sz="2000" dirty="0" smtClean="0">
-                        <a:latin typeface="Arial" panose="020B0604020202020204" pitchFamily="34" charset="0"/>
-                        <a:cs typeface="Arial" panose="020B0604020202020204" pitchFamily="34" charset="0"/>
-                      </a:endParaRPr>
-                    </a:p>
-                  </p:txBody>
-                </p:sp>
-              </mc:Choice>
-              <mc:Fallback>
-                <p:sp>
-                  <p:nvSpPr>
-                    <p:cNvPr id="69" name="TextBox 68"/>
-                    <p:cNvSpPr txBox="1">
-                      <a:spLocks noRot="1" noChangeAspect="1" noMove="1" noResize="1" noEditPoints="1" noAdjustHandles="1" noChangeArrowheads="1" noChangeShapeType="1" noTextEdit="1"/>
-                    </p:cNvSpPr>
-                    <p:nvPr/>
-                  </p:nvSpPr>
-                  <p:spPr>
-                    <a:xfrm rot="1424844">
-                      <a:off x="4191252" y="3466484"/>
-                      <a:ext cx="555088" cy="307777"/>
-                    </a:xfrm>
-                    <a:prstGeom prst="rect">
-                      <a:avLst/>
-                    </a:prstGeom>
-                    <a:blipFill>
-                      <a:blip r:embed="rId17"/>
-                      <a:stretch>
-                        <a:fillRect l="-8791" r="-7692" b="-10000"/>
-                      </a:stretch>
-                    </a:blipFill>
-                  </p:spPr>
-                  <p:txBody>
-                    <a:bodyPr/>
-                    <a:lstStyle/>
-                    <a:p>
-                      <a:r>
-                        <a:rPr lang="en-US">
-                          <a:noFill/>
-                        </a:rPr>
-                        <a:t> </a:t>
-                      </a:r>
-                    </a:p>
-                  </p:txBody>
-                </p:sp>
-              </mc:Fallback>
-            </mc:AlternateContent>
-            <mc:AlternateContent xmlns:mc="http://schemas.openxmlformats.org/markup-compatibility/2006">
-              <mc:Choice xmlns:a14="http://schemas.microsoft.com/office/drawing/2010/main" Requires="a14">
-                <p:sp>
-                  <p:nvSpPr>
-                    <p:cNvPr id="73" name="TextBox 72"/>
-                    <p:cNvSpPr txBox="1"/>
-                    <p:nvPr/>
-                  </p:nvSpPr>
-                  <p:spPr>
-                    <a:xfrm rot="1424844">
-                      <a:off x="4555816" y="4966972"/>
-                      <a:ext cx="198003" cy="307777"/>
-                    </a:xfrm>
-                    <a:prstGeom prst="rect">
-                      <a:avLst/>
-                    </a:prstGeom>
-                    <a:noFill/>
-                  </p:spPr>
-                  <p:txBody>
-                    <a:bodyPr wrap="none" lIns="0" tIns="0" rIns="0" bIns="0" rtlCol="0">
-                      <a:spAutoFit/>
-                    </a:bodyPr>
-                    <a:lstStyle/>
-                    <a:p>
-                      <a:pPr/>
-                      <a14:m>
-                        <m:oMathPara xmlns:m="http://schemas.openxmlformats.org/officeDocument/2006/math">
-                          <m:oMathParaPr>
-                            <m:jc m:val="centerGroup"/>
-                          </m:oMathParaPr>
-                          <m:oMath xmlns:m="http://schemas.openxmlformats.org/officeDocument/2006/math">
-                            <m:acc>
-                              <m:accPr>
-                                <m:chr m:val="⃗"/>
-                                <m:ctrlPr>
-                                  <a:rPr lang="en-US" sz="2000" b="0" i="1" smtClean="0">
-                                    <a:latin typeface="Cambria Math" panose="02040503050406030204" pitchFamily="18" charset="0"/>
-                                    <a:cs typeface="Arial" panose="020B0604020202020204" pitchFamily="34" charset="0"/>
-                                  </a:rPr>
-                                </m:ctrlPr>
-                              </m:accPr>
-                              <m:e>
-                                <m:r>
-                                  <a:rPr lang="en-US" sz="2000" b="0" i="1" smtClean="0">
-                                    <a:latin typeface="Cambria Math" panose="02040503050406030204" pitchFamily="18" charset="0"/>
-                                    <a:cs typeface="Arial" panose="020B0604020202020204" pitchFamily="34" charset="0"/>
-                                  </a:rPr>
-                                  <m:t>𝑟</m:t>
-                                </m:r>
-                              </m:e>
-                            </m:acc>
-                          </m:oMath>
-                        </m:oMathPara>
-                      </a14:m>
-                      <a:endParaRPr lang="en-US" sz="2000" dirty="0" smtClean="0">
-                        <a:latin typeface="Arial" panose="020B0604020202020204" pitchFamily="34" charset="0"/>
-                        <a:cs typeface="Arial" panose="020B0604020202020204" pitchFamily="34" charset="0"/>
-                      </a:endParaRPr>
-                    </a:p>
-                  </p:txBody>
-                </p:sp>
-              </mc:Choice>
-              <mc:Fallback>
-                <p:sp>
-                  <p:nvSpPr>
-                    <p:cNvPr id="73" name="TextBox 72"/>
-                    <p:cNvSpPr txBox="1">
-                      <a:spLocks noRot="1" noChangeAspect="1" noMove="1" noResize="1" noEditPoints="1" noAdjustHandles="1" noChangeArrowheads="1" noChangeShapeType="1" noTextEdit="1"/>
-                    </p:cNvSpPr>
-                    <p:nvPr/>
-                  </p:nvSpPr>
-                  <p:spPr>
-                    <a:xfrm rot="1424844">
-                      <a:off x="4555816" y="4966972"/>
-                      <a:ext cx="198003" cy="307777"/>
-                    </a:xfrm>
-                    <a:prstGeom prst="rect">
-                      <a:avLst/>
-                    </a:prstGeom>
-                    <a:blipFill>
-                      <a:blip r:embed="rId18"/>
-                      <a:stretch>
-                        <a:fillRect l="-31250" t="-36000" r="-96875" b="-6000"/>
-                      </a:stretch>
-                    </a:blipFill>
-                  </p:spPr>
-                  <p:txBody>
-                    <a:bodyPr/>
-                    <a:lstStyle/>
-                    <a:p>
-                      <a:r>
-                        <a:rPr lang="en-US">
-                          <a:noFill/>
-                        </a:rPr>
-                        <a:t> </a:t>
-                      </a:r>
-                    </a:p>
-                  </p:txBody>
-                </p:sp>
-              </mc:Fallback>
-            </mc:AlternateContent>
-            <p:sp>
-              <p:nvSpPr>
-                <p:cNvPr id="2" name="Oval 1"/>
-                <p:cNvSpPr/>
-                <p:nvPr/>
-              </p:nvSpPr>
-              <p:spPr>
-                <a:xfrm rot="4152">
-                  <a:off x="3605957" y="4940615"/>
-                  <a:ext cx="1555275" cy="571985"/>
-                </a:xfrm>
-                <a:prstGeom prst="ellipse">
-                  <a:avLst/>
-                </a:prstGeom>
-                <a:noFill/>
-                <a:ln w="38100">
-                  <a:solidFill>
-                    <a:schemeClr val="tx1"/>
-                  </a:solidFill>
-                </a:ln>
-              </p:spPr>
-              <p:style>
-                <a:lnRef idx="2">
-                  <a:schemeClr val="accent1">
-                    <a:shade val="50000"/>
-                  </a:schemeClr>
-                </a:lnRef>
-                <a:fillRef idx="1">
-                  <a:schemeClr val="accent1"/>
-                </a:fillRef>
-                <a:effectRef idx="0">
-                  <a:schemeClr val="accent1"/>
-                </a:effectRef>
-                <a:fontRef idx="minor">
-                  <a:schemeClr val="lt1"/>
-                </a:fontRef>
-              </p:style>
               <p:txBody>
                 <a:bodyPr rtlCol="0" anchor="ctr"/>
                 <a:lstStyle/>
@@ -14998,30 +15063,25 @@
               </p:txBody>
             </p:sp>
           </p:grpSp>
-          <p:sp>
-            <p:nvSpPr>
-              <p:cNvPr id="79" name="Arc 78"/>
-              <p:cNvSpPr/>
+          <p:cxnSp>
+            <p:nvCxnSpPr>
+              <p:cNvPr id="32" name="Straight Arrow Connector 31"/>
+              <p:cNvCxnSpPr/>
               <p:nvPr/>
-            </p:nvSpPr>
+            </p:nvCxnSpPr>
             <p:spPr>
-              <a:xfrm rot="20179962">
-                <a:off x="5974871" y="4036967"/>
-                <a:ext cx="1671457" cy="259654"/>
+              <a:xfrm flipV="1">
+                <a:off x="8947368" y="3875050"/>
+                <a:ext cx="324692" cy="447395"/>
               </a:xfrm>
-              <a:prstGeom prst="arc">
-                <a:avLst>
-                  <a:gd name="adj1" fmla="val 18287012"/>
-                  <a:gd name="adj2" fmla="val 9682168"/>
-                </a:avLst>
+              <a:prstGeom prst="straightConnector1">
+                <a:avLst/>
               </a:prstGeom>
-              <a:ln w="28575">
+              <a:ln w="38100">
                 <a:solidFill>
                   <a:schemeClr val="tx1"/>
                 </a:solidFill>
-                <a:prstDash val="sysDot"/>
-                <a:headEnd type="triangle" w="med" len="med"/>
-                <a:tailEnd type="none" w="med" len="med"/>
+                <a:tailEnd type="triangle"/>
               </a:ln>
             </p:spPr>
             <p:style>
@@ -15038,35 +15098,303 @@
                 <a:schemeClr val="tx1"/>
               </a:fontRef>
             </p:style>
-            <p:txBody>
-              <a:bodyPr rtlCol="0" anchor="ctr"/>
-              <a:lstStyle/>
-              <a:p>
-                <a:pPr algn="ctr"/>
-                <a:endParaRPr lang="en-US"/>
-              </a:p>
-            </p:txBody>
-          </p:sp>
+          </p:cxnSp>
+          <mc:AlternateContent xmlns:mc="http://schemas.openxmlformats.org/markup-compatibility/2006" xmlns:a14="http://schemas.microsoft.com/office/drawing/2010/main">
+            <mc:Choice Requires="a14">
+              <p:sp>
+                <p:nvSpPr>
+                  <p:cNvPr id="81" name="TextBox 80"/>
+                  <p:cNvSpPr txBox="1"/>
+                  <p:nvPr/>
+                </p:nvSpPr>
+                <p:spPr>
+                  <a:xfrm>
+                    <a:off x="9233549" y="3937503"/>
+                    <a:ext cx="217495" cy="307777"/>
+                  </a:xfrm>
+                  <a:prstGeom prst="rect">
+                    <a:avLst/>
+                  </a:prstGeom>
+                  <a:noFill/>
+                </p:spPr>
+                <p:txBody>
+                  <a:bodyPr wrap="none" lIns="0" tIns="0" rIns="0" bIns="0" rtlCol="0">
+                    <a:spAutoFit/>
+                  </a:bodyPr>
+                  <a:lstStyle/>
+                  <a:p>
+                    <a:pPr/>
+                    <a14:m>
+                      <m:oMathPara xmlns:m="http://schemas.openxmlformats.org/officeDocument/2006/math">
+                        <m:oMathParaPr>
+                          <m:jc m:val="centerGroup"/>
+                        </m:oMathParaPr>
+                        <m:oMath xmlns:m="http://schemas.openxmlformats.org/officeDocument/2006/math">
+                          <m:acc>
+                            <m:accPr>
+                              <m:chr m:val="⃗"/>
+                              <m:ctrlPr>
+                                <a:rPr lang="en-US" sz="2000" b="0" i="1" smtClean="0">
+                                  <a:latin typeface="Cambria Math" panose="02040503050406030204" pitchFamily="18" charset="0"/>
+                                  <a:cs typeface="Arial" panose="020B0604020202020204" pitchFamily="34" charset="0"/>
+                                </a:rPr>
+                              </m:ctrlPr>
+                            </m:accPr>
+                            <m:e>
+                              <m:r>
+                                <a:rPr lang="en-US" sz="2000" b="0" i="1" smtClean="0">
+                                  <a:latin typeface="Cambria Math" panose="02040503050406030204" pitchFamily="18" charset="0"/>
+                                  <a:cs typeface="Arial" panose="020B0604020202020204" pitchFamily="34" charset="0"/>
+                                </a:rPr>
+                                <m:t>𝑣</m:t>
+                              </m:r>
+                            </m:e>
+                          </m:acc>
+                        </m:oMath>
+                      </m:oMathPara>
+                    </a14:m>
+                    <a:endParaRPr lang="en-US" sz="2000" dirty="0" smtClean="0">
+                      <a:latin typeface="Arial" panose="020B0604020202020204" pitchFamily="34" charset="0"/>
+                      <a:cs typeface="Arial" panose="020B0604020202020204" pitchFamily="34" charset="0"/>
+                    </a:endParaRPr>
+                  </a:p>
+                </p:txBody>
+              </p:sp>
+            </mc:Choice>
+            <mc:Fallback xmlns="">
+              <p:sp>
+                <p:nvSpPr>
+                  <p:cNvPr id="81" name="TextBox 80"/>
+                  <p:cNvSpPr txBox="1">
+                    <a:spLocks noRot="1" noChangeAspect="1" noMove="1" noResize="1" noEditPoints="1" noAdjustHandles="1" noChangeArrowheads="1" noChangeShapeType="1" noTextEdit="1"/>
+                  </p:cNvSpPr>
+                  <p:nvPr/>
+                </p:nvSpPr>
+                <p:spPr>
+                  <a:xfrm>
+                    <a:off x="9233549" y="3937503"/>
+                    <a:ext cx="217495" cy="307777"/>
+                  </a:xfrm>
+                  <a:prstGeom prst="rect">
+                    <a:avLst/>
+                  </a:prstGeom>
+                  <a:blipFill>
+                    <a:blip r:embed="rId19"/>
+                    <a:stretch>
+                      <a:fillRect l="-19444" t="-33333" r="-94444" b="-5882"/>
+                    </a:stretch>
+                  </a:blipFill>
+                </p:spPr>
+                <p:txBody>
+                  <a:bodyPr/>
+                  <a:lstStyle/>
+                  <a:p>
+                    <a:r>
+                      <a:rPr lang="en-US">
+                        <a:noFill/>
+                      </a:rPr>
+                      <a:t> </a:t>
+                    </a:r>
+                  </a:p>
+                </p:txBody>
+              </p:sp>
+            </mc:Fallback>
+          </mc:AlternateContent>
+          <p:cxnSp>
+            <p:nvCxnSpPr>
+              <p:cNvPr id="83" name="Straight Arrow Connector 82"/>
+              <p:cNvCxnSpPr/>
+              <p:nvPr/>
+            </p:nvCxnSpPr>
+            <p:spPr>
+              <a:xfrm flipH="1" flipV="1">
+                <a:off x="7116093" y="3516372"/>
+                <a:ext cx="285739" cy="659770"/>
+              </a:xfrm>
+              <a:prstGeom prst="straightConnector1">
+                <a:avLst/>
+              </a:prstGeom>
+              <a:ln w="57150">
+                <a:solidFill>
+                  <a:schemeClr val="tx1"/>
+                </a:solidFill>
+                <a:tailEnd type="triangle"/>
+              </a:ln>
+            </p:spPr>
+            <p:style>
+              <a:lnRef idx="1">
+                <a:schemeClr val="accent1"/>
+              </a:lnRef>
+              <a:fillRef idx="0">
+                <a:schemeClr val="accent1"/>
+              </a:fillRef>
+              <a:effectRef idx="0">
+                <a:schemeClr val="accent1"/>
+              </a:effectRef>
+              <a:fontRef idx="minor">
+                <a:schemeClr val="tx1"/>
+              </a:fontRef>
+            </p:style>
+          </p:cxnSp>
+          <mc:AlternateContent xmlns:mc="http://schemas.openxmlformats.org/markup-compatibility/2006" xmlns:a14="http://schemas.microsoft.com/office/drawing/2010/main">
+            <mc:Choice Requires="a14">
+              <p:sp>
+                <p:nvSpPr>
+                  <p:cNvPr id="85" name="TextBox 84"/>
+                  <p:cNvSpPr txBox="1"/>
+                  <p:nvPr/>
+                </p:nvSpPr>
+                <p:spPr>
+                  <a:xfrm>
+                    <a:off x="7012683" y="3193259"/>
+                    <a:ext cx="323083" cy="307777"/>
+                  </a:xfrm>
+                  <a:prstGeom prst="rect">
+                    <a:avLst/>
+                  </a:prstGeom>
+                  <a:noFill/>
+                </p:spPr>
+                <p:txBody>
+                  <a:bodyPr wrap="square" lIns="0" tIns="0" rIns="0" bIns="0" rtlCol="0">
+                    <a:spAutoFit/>
+                  </a:bodyPr>
+                  <a:lstStyle/>
+                  <a:p>
+                    <a:pPr/>
+                    <a14:m>
+                      <m:oMathPara xmlns:m="http://schemas.openxmlformats.org/officeDocument/2006/math">
+                        <m:oMathParaPr>
+                          <m:jc m:val="centerGroup"/>
+                        </m:oMathParaPr>
+                        <m:oMath xmlns:m="http://schemas.openxmlformats.org/officeDocument/2006/math">
+                          <m:acc>
+                            <m:accPr>
+                              <m:chr m:val="⃗"/>
+                              <m:ctrlPr>
+                                <a:rPr lang="en-US" sz="2000" b="0" i="1" smtClean="0">
+                                  <a:latin typeface="Cambria Math" panose="02040503050406030204" pitchFamily="18" charset="0"/>
+                                  <a:cs typeface="Arial" panose="020B0604020202020204" pitchFamily="34" charset="0"/>
+                                </a:rPr>
+                              </m:ctrlPr>
+                            </m:accPr>
+                            <m:e>
+                              <m:r>
+                                <a:rPr lang="en-US" sz="2000" b="0" i="1" smtClean="0">
+                                  <a:latin typeface="Cambria Math" panose="02040503050406030204" pitchFamily="18" charset="0"/>
+                                  <a:cs typeface="Arial" panose="020B0604020202020204" pitchFamily="34" charset="0"/>
+                                </a:rPr>
+                                <m:t>𝜔</m:t>
+                              </m:r>
+                            </m:e>
+                          </m:acc>
+                        </m:oMath>
+                      </m:oMathPara>
+                    </a14:m>
+                    <a:endParaRPr lang="en-US" sz="2000" dirty="0" smtClean="0">
+                      <a:latin typeface="Arial" panose="020B0604020202020204" pitchFamily="34" charset="0"/>
+                      <a:cs typeface="Arial" panose="020B0604020202020204" pitchFamily="34" charset="0"/>
+                    </a:endParaRPr>
+                  </a:p>
+                </p:txBody>
+              </p:sp>
+            </mc:Choice>
+            <mc:Fallback xmlns="">
+              <p:sp>
+                <p:nvSpPr>
+                  <p:cNvPr id="85" name="TextBox 84"/>
+                  <p:cNvSpPr txBox="1">
+                    <a:spLocks noRot="1" noChangeAspect="1" noMove="1" noResize="1" noEditPoints="1" noAdjustHandles="1" noChangeArrowheads="1" noChangeShapeType="1" noTextEdit="1"/>
+                  </p:cNvSpPr>
+                  <p:nvPr/>
+                </p:nvSpPr>
+                <p:spPr>
+                  <a:xfrm>
+                    <a:off x="7012683" y="3193259"/>
+                    <a:ext cx="323083" cy="307777"/>
+                  </a:xfrm>
+                  <a:prstGeom prst="rect">
+                    <a:avLst/>
+                  </a:prstGeom>
+                  <a:blipFill>
+                    <a:blip r:embed="rId20"/>
+                    <a:stretch>
+                      <a:fillRect b="-1961"/>
+                    </a:stretch>
+                  </a:blipFill>
+                </p:spPr>
+                <p:txBody>
+                  <a:bodyPr/>
+                  <a:lstStyle/>
+                  <a:p>
+                    <a:r>
+                      <a:rPr lang="en-US">
+                        <a:noFill/>
+                      </a:rPr>
+                      <a:t> </a:t>
+                    </a:r>
+                  </a:p>
+                </p:txBody>
+              </p:sp>
+            </mc:Fallback>
+          </mc:AlternateContent>
         </p:grpSp>
         <p:cxnSp>
           <p:nvCxnSpPr>
-            <p:cNvPr id="32" name="Straight Arrow Connector 31"/>
+            <p:cNvPr id="36" name="Straight Connector 35"/>
             <p:cNvCxnSpPr/>
             <p:nvPr/>
           </p:nvCxnSpPr>
           <p:spPr>
-            <a:xfrm flipV="1">
-              <a:off x="8947368" y="3875050"/>
-              <a:ext cx="324692" cy="447395"/>
+            <a:xfrm flipH="1">
+              <a:off x="8360197" y="4992965"/>
+              <a:ext cx="504979" cy="381675"/>
             </a:xfrm>
-            <a:prstGeom prst="straightConnector1">
+            <a:prstGeom prst="line">
               <a:avLst/>
             </a:prstGeom>
-            <a:ln w="38100">
+            <a:ln w="19050">
               <a:solidFill>
                 <a:schemeClr val="tx1"/>
               </a:solidFill>
-              <a:tailEnd type="triangle"/>
+              <a:prstDash val="sysDash"/>
+            </a:ln>
+          </p:spPr>
+          <p:style>
+            <a:lnRef idx="1">
+              <a:schemeClr val="accent1"/>
+            </a:lnRef>
+            <a:fillRef idx="0">
+              <a:schemeClr val="accent1"/>
+            </a:fillRef>
+            <a:effectRef idx="0">
+              <a:schemeClr val="accent1"/>
+            </a:effectRef>
+            <a:fontRef idx="minor">
+              <a:schemeClr val="tx1"/>
+            </a:fontRef>
+          </p:style>
+        </p:cxnSp>
+        <p:cxnSp>
+          <p:nvCxnSpPr>
+            <p:cNvPr id="67" name="Straight Connector 66"/>
+            <p:cNvCxnSpPr>
+              <a:endCxn id="2" idx="2"/>
+            </p:cNvCxnSpPr>
+            <p:nvPr/>
+          </p:nvCxnSpPr>
+          <p:spPr>
+            <a:xfrm flipH="1">
+              <a:off x="8139524" y="4992965"/>
+              <a:ext cx="712136" cy="286423"/>
+            </a:xfrm>
+            <a:prstGeom prst="line">
+              <a:avLst/>
+            </a:prstGeom>
+            <a:ln w="19050">
+              <a:solidFill>
+                <a:schemeClr val="tx1"/>
+              </a:solidFill>
+              <a:prstDash val="sysDash"/>
             </a:ln>
           </p:spPr>
           <p:style>
@@ -15088,14 +15416,14 @@
           <mc:Choice xmlns:a14="http://schemas.microsoft.com/office/drawing/2010/main" Requires="a14">
             <p:sp>
               <p:nvSpPr>
-                <p:cNvPr id="81" name="TextBox 80"/>
+                <p:cNvPr id="41" name="TextBox 40"/>
                 <p:cNvSpPr txBox="1"/>
                 <p:nvPr/>
               </p:nvSpPr>
               <p:spPr>
                 <a:xfrm>
-                  <a:off x="9233549" y="3937503"/>
-                  <a:ext cx="217495" cy="307777"/>
+                  <a:off x="8263128" y="5147277"/>
+                  <a:ext cx="179152" cy="246221"/>
                 </a:xfrm>
                 <a:prstGeom prst="rect">
                   <a:avLst/>
@@ -15114,30 +15442,17 @@
                         <m:jc m:val="centerGroup"/>
                       </m:oMathParaPr>
                       <m:oMath xmlns:m="http://schemas.openxmlformats.org/officeDocument/2006/math">
-                        <m:acc>
-                          <m:accPr>
-                            <m:chr m:val="⃗"/>
-                            <m:ctrlPr>
-                              <a:rPr lang="en-US" sz="2000" b="0" i="1" smtClean="0">
-                                <a:latin typeface="Cambria Math" panose="02040503050406030204" pitchFamily="18" charset="0"/>
-                                <a:cs typeface="Arial" panose="020B0604020202020204" pitchFamily="34" charset="0"/>
-                              </a:rPr>
-                            </m:ctrlPr>
-                          </m:accPr>
-                          <m:e>
-                            <m:r>
-                              <a:rPr lang="en-US" sz="2000" b="0" i="1" smtClean="0">
-                                <a:latin typeface="Cambria Math" panose="02040503050406030204" pitchFamily="18" charset="0"/>
-                                <a:cs typeface="Arial" panose="020B0604020202020204" pitchFamily="34" charset="0"/>
-                              </a:rPr>
-                              <m:t>𝑣</m:t>
-                            </m:r>
-                          </m:e>
-                        </m:acc>
+                        <m:r>
+                          <a:rPr lang="en-US" sz="1600" b="0" i="1" smtClean="0">
+                            <a:latin typeface="Cambria Math" panose="02040503050406030204" pitchFamily="18" charset="0"/>
+                            <a:cs typeface="Arial" panose="020B0604020202020204" pitchFamily="34" charset="0"/>
+                          </a:rPr>
+                          <m:t>𝜃</m:t>
+                        </m:r>
                       </m:oMath>
                     </m:oMathPara>
                   </a14:m>
-                  <a:endParaRPr lang="en-US" sz="2000" dirty="0" smtClean="0">
+                  <a:endParaRPr lang="en-US" sz="1600" dirty="0" smtClean="0">
                     <a:latin typeface="Arial" panose="020B0604020202020204" pitchFamily="34" charset="0"/>
                     <a:cs typeface="Arial" panose="020B0604020202020204" pitchFamily="34" charset="0"/>
                   </a:endParaRPr>
@@ -15148,7 +15463,7 @@
           <mc:Fallback>
             <p:sp>
               <p:nvSpPr>
-                <p:cNvPr id="81" name="TextBox 80"/>
+                <p:cNvPr id="41" name="TextBox 40"/>
                 <p:cNvSpPr txBox="1">
                   <a:spLocks noRot="1" noChangeAspect="1" noMove="1" noResize="1" noEditPoints="1" noAdjustHandles="1" noChangeArrowheads="1" noChangeShapeType="1" noTextEdit="1"/>
                 </p:cNvSpPr>
@@ -15156,152 +15471,16 @@
               </p:nvSpPr>
               <p:spPr>
                 <a:xfrm>
-                  <a:off x="9233549" y="3937503"/>
-                  <a:ext cx="217495" cy="307777"/>
+                  <a:off x="8263128" y="5147277"/>
+                  <a:ext cx="179152" cy="246221"/>
                 </a:xfrm>
                 <a:prstGeom prst="rect">
                   <a:avLst/>
                 </a:prstGeom>
                 <a:blipFill>
-                  <a:blip r:embed="rId19"/>
+                  <a:blip r:embed="rId21"/>
                   <a:stretch>
-                    <a:fillRect l="-19444" t="-33333" r="-94444" b="-5882"/>
-                  </a:stretch>
-                </a:blipFill>
-              </p:spPr>
-              <p:txBody>
-                <a:bodyPr/>
-                <a:lstStyle/>
-                <a:p>
-                  <a:r>
-                    <a:rPr lang="en-US">
-                      <a:noFill/>
-                    </a:rPr>
-                    <a:t> </a:t>
-                  </a:r>
-                </a:p>
-              </p:txBody>
-            </p:sp>
-          </mc:Fallback>
-        </mc:AlternateContent>
-        <p:cxnSp>
-          <p:nvCxnSpPr>
-            <p:cNvPr id="83" name="Straight Arrow Connector 82"/>
-            <p:cNvCxnSpPr/>
-            <p:nvPr/>
-          </p:nvCxnSpPr>
-          <p:spPr>
-            <a:xfrm flipH="1" flipV="1">
-              <a:off x="7116093" y="3516372"/>
-              <a:ext cx="285739" cy="659770"/>
-            </a:xfrm>
-            <a:prstGeom prst="straightConnector1">
-              <a:avLst/>
-            </a:prstGeom>
-            <a:ln w="57150">
-              <a:solidFill>
-                <a:schemeClr val="tx1"/>
-              </a:solidFill>
-              <a:tailEnd type="triangle"/>
-            </a:ln>
-          </p:spPr>
-          <p:style>
-            <a:lnRef idx="1">
-              <a:schemeClr val="accent1"/>
-            </a:lnRef>
-            <a:fillRef idx="0">
-              <a:schemeClr val="accent1"/>
-            </a:fillRef>
-            <a:effectRef idx="0">
-              <a:schemeClr val="accent1"/>
-            </a:effectRef>
-            <a:fontRef idx="minor">
-              <a:schemeClr val="tx1"/>
-            </a:fontRef>
-          </p:style>
-        </p:cxnSp>
-        <mc:AlternateContent xmlns:mc="http://schemas.openxmlformats.org/markup-compatibility/2006">
-          <mc:Choice xmlns:a14="http://schemas.microsoft.com/office/drawing/2010/main" Requires="a14">
-            <p:sp>
-              <p:nvSpPr>
-                <p:cNvPr id="85" name="TextBox 84"/>
-                <p:cNvSpPr txBox="1"/>
-                <p:nvPr/>
-              </p:nvSpPr>
-              <p:spPr>
-                <a:xfrm>
-                  <a:off x="7012683" y="3193259"/>
-                  <a:ext cx="323083" cy="307777"/>
-                </a:xfrm>
-                <a:prstGeom prst="rect">
-                  <a:avLst/>
-                </a:prstGeom>
-                <a:noFill/>
-              </p:spPr>
-              <p:txBody>
-                <a:bodyPr wrap="square" lIns="0" tIns="0" rIns="0" bIns="0" rtlCol="0">
-                  <a:spAutoFit/>
-                </a:bodyPr>
-                <a:lstStyle/>
-                <a:p>
-                  <a14:m>
-                    <m:oMathPara xmlns:m="http://schemas.openxmlformats.org/officeDocument/2006/math">
-                      <m:oMathParaPr>
-                        <m:jc m:val="centerGroup"/>
-                      </m:oMathParaPr>
-                      <m:oMath xmlns:m="http://schemas.openxmlformats.org/officeDocument/2006/math">
-                        <m:acc>
-                          <m:accPr>
-                            <m:chr m:val="⃗"/>
-                            <m:ctrlPr>
-                              <a:rPr lang="en-US" sz="2000" b="0" i="1" smtClean="0">
-                                <a:latin typeface="Cambria Math" panose="02040503050406030204" pitchFamily="18" charset="0"/>
-                                <a:cs typeface="Arial" panose="020B0604020202020204" pitchFamily="34" charset="0"/>
-                              </a:rPr>
-                            </m:ctrlPr>
-                          </m:accPr>
-                          <m:e>
-                            <m:r>
-                              <a:rPr lang="en-US" sz="2000" b="0" i="1" smtClean="0">
-                                <a:latin typeface="Cambria Math" panose="02040503050406030204" pitchFamily="18" charset="0"/>
-                                <a:cs typeface="Arial" panose="020B0604020202020204" pitchFamily="34" charset="0"/>
-                              </a:rPr>
-                              <m:t>𝜔</m:t>
-                            </m:r>
-                          </m:e>
-                        </m:acc>
-                      </m:oMath>
-                    </m:oMathPara>
-                  </a14:m>
-                  <a:endParaRPr lang="en-US" sz="2000" dirty="0" smtClean="0">
-                    <a:latin typeface="Arial" panose="020B0604020202020204" pitchFamily="34" charset="0"/>
-                    <a:cs typeface="Arial" panose="020B0604020202020204" pitchFamily="34" charset="0"/>
-                  </a:endParaRPr>
-                </a:p>
-              </p:txBody>
-            </p:sp>
-          </mc:Choice>
-          <mc:Fallback>
-            <p:sp>
-              <p:nvSpPr>
-                <p:cNvPr id="85" name="TextBox 84"/>
-                <p:cNvSpPr txBox="1">
-                  <a:spLocks noRot="1" noChangeAspect="1" noMove="1" noResize="1" noEditPoints="1" noAdjustHandles="1" noChangeArrowheads="1" noChangeShapeType="1" noTextEdit="1"/>
-                </p:cNvSpPr>
-                <p:nvPr/>
-              </p:nvSpPr>
-              <p:spPr>
-                <a:xfrm>
-                  <a:off x="7012683" y="3193259"/>
-                  <a:ext cx="323083" cy="307777"/>
-                </a:xfrm>
-                <a:prstGeom prst="rect">
-                  <a:avLst/>
-                </a:prstGeom>
-                <a:blipFill>
-                  <a:blip r:embed="rId20"/>
-                  <a:stretch>
-                    <a:fillRect b="-1961"/>
+                    <a:fillRect l="-24138" r="-24138" b="-10000"/>
                   </a:stretch>
                 </a:blipFill>
               </p:spPr>
@@ -27536,8 +27715,8 @@
                 </p:sp>
               </mc:Fallback>
             </mc:AlternateContent>
-            <mc:AlternateContent xmlns:mc="http://schemas.openxmlformats.org/markup-compatibility/2006">
-              <mc:Choice xmlns:a14="http://schemas.microsoft.com/office/drawing/2010/main" Requires="a14">
+            <mc:AlternateContent xmlns:mc="http://schemas.openxmlformats.org/markup-compatibility/2006" xmlns:a14="http://schemas.microsoft.com/office/drawing/2010/main">
+              <mc:Choice Requires="a14">
                 <p:sp>
                   <p:nvSpPr>
                     <p:cNvPr id="16" name="TextBox 15"/>
@@ -27585,7 +27764,7 @@
                   </p:txBody>
                 </p:sp>
               </mc:Choice>
-              <mc:Fallback>
+              <mc:Fallback xmlns="">
                 <p:sp>
                   <p:nvSpPr>
                     <p:cNvPr id="16" name="TextBox 15"/>

</xml_diff>

<commit_message>
Updated vector section on axial vectors
</commit_message>
<xml_diff>
--- a/tex/figures/RotationalDynamics/Figures.pptx
+++ b/tex/figures/RotationalDynamics/Figures.pptx
@@ -253,7 +253,7 @@
           <a:p>
             <a:fld id="{F7249F8D-641B-4CAF-BAE5-10524742F6F1}" type="datetimeFigureOut">
               <a:rPr lang="en-CA" smtClean="0"/>
-              <a:t>2018-07-16</a:t>
+              <a:t>2018-07-20</a:t>
             </a:fld>
             <a:endParaRPr lang="en-CA"/>
           </a:p>
@@ -423,7 +423,7 @@
           <a:p>
             <a:fld id="{F7249F8D-641B-4CAF-BAE5-10524742F6F1}" type="datetimeFigureOut">
               <a:rPr lang="en-CA" smtClean="0"/>
-              <a:t>2018-07-16</a:t>
+              <a:t>2018-07-20</a:t>
             </a:fld>
             <a:endParaRPr lang="en-CA"/>
           </a:p>
@@ -603,7 +603,7 @@
           <a:p>
             <a:fld id="{F7249F8D-641B-4CAF-BAE5-10524742F6F1}" type="datetimeFigureOut">
               <a:rPr lang="en-CA" smtClean="0"/>
-              <a:t>2018-07-16</a:t>
+              <a:t>2018-07-20</a:t>
             </a:fld>
             <a:endParaRPr lang="en-CA"/>
           </a:p>
@@ -773,7 +773,7 @@
           <a:p>
             <a:fld id="{F7249F8D-641B-4CAF-BAE5-10524742F6F1}" type="datetimeFigureOut">
               <a:rPr lang="en-CA" smtClean="0"/>
-              <a:t>2018-07-16</a:t>
+              <a:t>2018-07-20</a:t>
             </a:fld>
             <a:endParaRPr lang="en-CA"/>
           </a:p>
@@ -1019,7 +1019,7 @@
           <a:p>
             <a:fld id="{F7249F8D-641B-4CAF-BAE5-10524742F6F1}" type="datetimeFigureOut">
               <a:rPr lang="en-CA" smtClean="0"/>
-              <a:t>2018-07-16</a:t>
+              <a:t>2018-07-20</a:t>
             </a:fld>
             <a:endParaRPr lang="en-CA"/>
           </a:p>
@@ -1251,7 +1251,7 @@
           <a:p>
             <a:fld id="{F7249F8D-641B-4CAF-BAE5-10524742F6F1}" type="datetimeFigureOut">
               <a:rPr lang="en-CA" smtClean="0"/>
-              <a:t>2018-07-16</a:t>
+              <a:t>2018-07-20</a:t>
             </a:fld>
             <a:endParaRPr lang="en-CA"/>
           </a:p>
@@ -1618,7 +1618,7 @@
           <a:p>
             <a:fld id="{F7249F8D-641B-4CAF-BAE5-10524742F6F1}" type="datetimeFigureOut">
               <a:rPr lang="en-CA" smtClean="0"/>
-              <a:t>2018-07-16</a:t>
+              <a:t>2018-07-20</a:t>
             </a:fld>
             <a:endParaRPr lang="en-CA"/>
           </a:p>
@@ -1736,7 +1736,7 @@
           <a:p>
             <a:fld id="{F7249F8D-641B-4CAF-BAE5-10524742F6F1}" type="datetimeFigureOut">
               <a:rPr lang="en-CA" smtClean="0"/>
-              <a:t>2018-07-16</a:t>
+              <a:t>2018-07-20</a:t>
             </a:fld>
             <a:endParaRPr lang="en-CA"/>
           </a:p>
@@ -1831,7 +1831,7 @@
           <a:p>
             <a:fld id="{F7249F8D-641B-4CAF-BAE5-10524742F6F1}" type="datetimeFigureOut">
               <a:rPr lang="en-CA" smtClean="0"/>
-              <a:t>2018-07-16</a:t>
+              <a:t>2018-07-20</a:t>
             </a:fld>
             <a:endParaRPr lang="en-CA"/>
           </a:p>
@@ -2108,7 +2108,7 @@
           <a:p>
             <a:fld id="{F7249F8D-641B-4CAF-BAE5-10524742F6F1}" type="datetimeFigureOut">
               <a:rPr lang="en-CA" smtClean="0"/>
-              <a:t>2018-07-16</a:t>
+              <a:t>2018-07-20</a:t>
             </a:fld>
             <a:endParaRPr lang="en-CA"/>
           </a:p>
@@ -2361,7 +2361,7 @@
           <a:p>
             <a:fld id="{F7249F8D-641B-4CAF-BAE5-10524742F6F1}" type="datetimeFigureOut">
               <a:rPr lang="en-CA" smtClean="0"/>
-              <a:t>2018-07-16</a:t>
+              <a:t>2018-07-20</a:t>
             </a:fld>
             <a:endParaRPr lang="en-CA"/>
           </a:p>
@@ -2574,7 +2574,7 @@
           <a:p>
             <a:fld id="{F7249F8D-641B-4CAF-BAE5-10524742F6F1}" type="datetimeFigureOut">
               <a:rPr lang="en-CA" smtClean="0"/>
-              <a:t>2018-07-16</a:t>
+              <a:t>2018-07-20</a:t>
             </a:fld>
             <a:endParaRPr lang="en-CA"/>
           </a:p>
@@ -33923,8 +33923,8 @@
                 </p:sp>
               </mc:Fallback>
             </mc:AlternateContent>
-            <mc:AlternateContent xmlns:mc="http://schemas.openxmlformats.org/markup-compatibility/2006">
-              <mc:Choice xmlns:a14="http://schemas.microsoft.com/office/drawing/2010/main" Requires="a14">
+            <mc:AlternateContent xmlns:mc="http://schemas.openxmlformats.org/markup-compatibility/2006" xmlns:a14="http://schemas.microsoft.com/office/drawing/2010/main">
+              <mc:Choice Requires="a14">
                 <p:sp>
                   <p:nvSpPr>
                     <p:cNvPr id="48" name="TextBox 47"/>
@@ -33985,7 +33985,7 @@
                   </p:txBody>
                 </p:sp>
               </mc:Choice>
-              <mc:Fallback>
+              <mc:Fallback xmlns="">
                 <p:sp>
                   <p:nvSpPr>
                     <p:cNvPr id="48" name="TextBox 47"/>
@@ -34194,8 +34194,8 @@
                 </a:p>
               </p:txBody>
             </p:sp>
-            <mc:AlternateContent xmlns:mc="http://schemas.openxmlformats.org/markup-compatibility/2006">
-              <mc:Choice xmlns:a14="http://schemas.microsoft.com/office/drawing/2010/main" Requires="a14">
+            <mc:AlternateContent xmlns:mc="http://schemas.openxmlformats.org/markup-compatibility/2006" xmlns:a14="http://schemas.microsoft.com/office/drawing/2010/main">
+              <mc:Choice Requires="a14">
                 <p:sp>
                   <p:nvSpPr>
                     <p:cNvPr id="51" name="TextBox 50"/>
@@ -34277,7 +34277,7 @@
                   </p:txBody>
                 </p:sp>
               </mc:Choice>
-              <mc:Fallback>
+              <mc:Fallback xmlns="">
                 <p:sp>
                   <p:nvSpPr>
                     <p:cNvPr id="51" name="TextBox 50"/>
@@ -34732,8 +34732,8 @@
               </a:fontRef>
             </p:style>
           </p:cxnSp>
-          <mc:AlternateContent xmlns:mc="http://schemas.openxmlformats.org/markup-compatibility/2006">
-            <mc:Choice xmlns:a14="http://schemas.microsoft.com/office/drawing/2010/main" Requires="a14">
+          <mc:AlternateContent xmlns:mc="http://schemas.openxmlformats.org/markup-compatibility/2006" xmlns:a14="http://schemas.microsoft.com/office/drawing/2010/main">
+            <mc:Choice Requires="a14">
               <p:sp>
                 <p:nvSpPr>
                   <p:cNvPr id="66" name="TextBox 65"/>
@@ -34802,7 +34802,7 @@
                 </p:txBody>
               </p:sp>
             </mc:Choice>
-            <mc:Fallback>
+            <mc:Fallback xmlns="">
               <p:sp>
                 <p:nvSpPr>
                   <p:cNvPr id="66" name="TextBox 65"/>
@@ -34889,8 +34889,8 @@
               </a:p>
             </p:txBody>
           </p:sp>
-          <mc:AlternateContent xmlns:mc="http://schemas.openxmlformats.org/markup-compatibility/2006">
-            <mc:Choice xmlns:a14="http://schemas.microsoft.com/office/drawing/2010/main" Requires="a14">
+          <mc:AlternateContent xmlns:mc="http://schemas.openxmlformats.org/markup-compatibility/2006" xmlns:a14="http://schemas.microsoft.com/office/drawing/2010/main">
+            <mc:Choice Requires="a14">
               <p:sp>
                 <p:nvSpPr>
                   <p:cNvPr id="68" name="TextBox 67"/>
@@ -34938,7 +34938,7 @@
                 </p:txBody>
               </p:sp>
             </mc:Choice>
-            <mc:Fallback>
+            <mc:Fallback xmlns="">
               <p:sp>
                 <p:nvSpPr>
                   <p:cNvPr id="68" name="TextBox 67"/>
@@ -34978,8 +34978,8 @@
             </mc:Fallback>
           </mc:AlternateContent>
         </p:grpSp>
-        <mc:AlternateContent xmlns:mc="http://schemas.openxmlformats.org/markup-compatibility/2006">
-          <mc:Choice xmlns:a14="http://schemas.microsoft.com/office/drawing/2010/main" Requires="a14">
+        <mc:AlternateContent xmlns:mc="http://schemas.openxmlformats.org/markup-compatibility/2006" xmlns:a14="http://schemas.microsoft.com/office/drawing/2010/main">
+          <mc:Choice Requires="a14">
             <p:sp>
               <p:nvSpPr>
                 <p:cNvPr id="71" name="TextBox 70"/>
@@ -35027,7 +35027,7 @@
               </p:txBody>
             </p:sp>
           </mc:Choice>
-          <mc:Fallback>
+          <mc:Fallback xmlns="">
             <p:sp>
               <p:nvSpPr>
                 <p:cNvPr id="71" name="TextBox 70"/>
@@ -35104,9 +35104,9 @@
         </p:nvGrpSpPr>
         <p:grpSpPr>
           <a:xfrm>
-            <a:off x="231048" y="2061220"/>
+            <a:off x="231048" y="2068542"/>
             <a:ext cx="5899759" cy="3428599"/>
-            <a:chOff x="231048" y="2061220"/>
+            <a:chOff x="231048" y="2068542"/>
             <a:chExt cx="5899759" cy="3428599"/>
           </a:xfrm>
         </p:grpSpPr>
@@ -35118,10 +35118,10 @@
           </p:nvGrpSpPr>
           <p:grpSpPr>
             <a:xfrm>
-              <a:off x="231048" y="4534985"/>
-              <a:ext cx="5899759" cy="665122"/>
-              <a:chOff x="201169" y="4520708"/>
-              <a:chExt cx="5899759" cy="665122"/>
+              <a:off x="231048" y="4437449"/>
+              <a:ext cx="5899759" cy="762658"/>
+              <a:chOff x="201169" y="4423172"/>
+              <a:chExt cx="5899759" cy="762658"/>
             </a:xfrm>
           </p:grpSpPr>
           <p:sp>
@@ -35178,8 +35178,8 @@
               </a:p>
             </p:txBody>
           </p:sp>
-          <mc:AlternateContent xmlns:mc="http://schemas.openxmlformats.org/markup-compatibility/2006" xmlns:a14="http://schemas.microsoft.com/office/drawing/2010/main">
-            <mc:Choice Requires="a14">
+          <mc:AlternateContent xmlns:mc="http://schemas.openxmlformats.org/markup-compatibility/2006">
+            <mc:Choice xmlns:a14="http://schemas.microsoft.com/office/drawing/2010/main" Requires="a14">
               <p:sp>
                 <p:nvSpPr>
                   <p:cNvPr id="70" name="TextBox 69"/>
@@ -35188,8 +35188,8 @@
                 </p:nvSpPr>
                 <p:spPr>
                   <a:xfrm>
-                    <a:off x="3039896" y="4520708"/>
-                    <a:ext cx="222304" cy="307777"/>
+                    <a:off x="3039896" y="4423172"/>
+                    <a:ext cx="148913" cy="430887"/>
                   </a:xfrm>
                   <a:prstGeom prst="rect">
                     <a:avLst/>
@@ -35197,7 +35197,7 @@
                   <a:noFill/>
                 </p:spPr>
                 <p:txBody>
-                  <a:bodyPr wrap="none" lIns="0" tIns="0" rIns="0" bIns="0" rtlCol="0">
+                  <a:bodyPr wrap="square" lIns="0" tIns="0" rIns="0" bIns="0" rtlCol="0">
                     <a:spAutoFit/>
                   </a:bodyPr>
                   <a:lstStyle/>
@@ -35210,7 +35210,7 @@
                         </m:oMathParaPr>
                         <m:oMath xmlns:m="http://schemas.openxmlformats.org/officeDocument/2006/math">
                           <m:r>
-                            <a:rPr lang="en-US" sz="2000" b="0" i="1" smtClean="0">
+                            <a:rPr lang="en-US" sz="2800" b="0" i="1" smtClean="0">
                               <a:latin typeface="Cambria Math" panose="02040503050406030204" pitchFamily="18" charset="0"/>
                               <a:cs typeface="Arial" panose="020B0604020202020204" pitchFamily="34" charset="0"/>
                             </a:rPr>
@@ -35219,7 +35219,7 @@
                         </m:oMath>
                       </m:oMathPara>
                     </a14:m>
-                    <a:endParaRPr lang="en-US" sz="2000" dirty="0" smtClean="0">
+                    <a:endParaRPr lang="en-US" sz="2800" dirty="0" smtClean="0">
                       <a:latin typeface="Arial" panose="020B0604020202020204" pitchFamily="34" charset="0"/>
                       <a:cs typeface="Arial" panose="020B0604020202020204" pitchFamily="34" charset="0"/>
                     </a:endParaRPr>
@@ -35227,7 +35227,7 @@
                 </p:txBody>
               </p:sp>
             </mc:Choice>
-            <mc:Fallback xmlns="">
+            <mc:Fallback>
               <p:sp>
                 <p:nvSpPr>
                   <p:cNvPr id="70" name="TextBox 69"/>
@@ -35238,16 +35238,16 @@
                 </p:nvSpPr>
                 <p:spPr>
                   <a:xfrm>
-                    <a:off x="3039896" y="4520708"/>
-                    <a:ext cx="222304" cy="307777"/>
+                    <a:off x="3039896" y="4423172"/>
+                    <a:ext cx="148913" cy="430887"/>
                   </a:xfrm>
                   <a:prstGeom prst="rect">
                     <a:avLst/>
                   </a:prstGeom>
-                  <a:blipFill>
-                    <a:blip r:embed="rId2"/>
+                  <a:blipFill rotWithShape="0">
+                    <a:blip r:embed="rId33"/>
                     <a:stretch>
-                      <a:fillRect l="-25000" r="-25000" b="-12000"/>
+                      <a:fillRect r="-20833"/>
                     </a:stretch>
                   </a:blipFill>
                 </p:spPr>
@@ -35276,7 +35276,7 @@
             <p:nvPr/>
           </p:nvPicPr>
           <p:blipFill rotWithShape="1">
-            <a:blip r:embed="rId33">
+            <a:blip r:embed="rId34">
               <a:extLst>
                 <a:ext uri="{28A0092B-C50C-407E-A947-70E740481C1C}">
                   <a14:useLocalDpi xmlns:a14="http://schemas.microsoft.com/office/drawing/2010/main" val="0"/>
@@ -35288,7 +35288,7 @@
           </p:blipFill>
           <p:spPr>
             <a:xfrm rot="366768" flipH="1">
-              <a:off x="1244408" y="2061220"/>
+              <a:off x="1245411" y="2068542"/>
               <a:ext cx="4821241" cy="3428599"/>
             </a:xfrm>
             <a:prstGeom prst="rect">
@@ -35713,8 +35713,8 @@
                   </p:sp>
                 </mc:Fallback>
               </mc:AlternateContent>
-              <mc:AlternateContent xmlns:mc="http://schemas.openxmlformats.org/markup-compatibility/2006">
-                <mc:Choice xmlns:a14="http://schemas.microsoft.com/office/drawing/2010/main" Requires="a14">
+              <mc:AlternateContent xmlns:mc="http://schemas.openxmlformats.org/markup-compatibility/2006" xmlns:a14="http://schemas.microsoft.com/office/drawing/2010/main">
+                <mc:Choice Requires="a14">
                   <p:sp>
                     <p:nvSpPr>
                       <p:cNvPr id="47" name="TextBox 46"/>
@@ -35775,7 +35775,7 @@
                     </p:txBody>
                   </p:sp>
                 </mc:Choice>
-                <mc:Fallback>
+                <mc:Fallback xmlns="">
                   <p:sp>
                     <p:nvSpPr>
                       <p:cNvPr id="47" name="TextBox 46"/>
@@ -36352,8 +36352,8 @@
                 </a:fontRef>
               </p:style>
             </p:cxnSp>
-            <mc:AlternateContent xmlns:mc="http://schemas.openxmlformats.org/markup-compatibility/2006">
-              <mc:Choice xmlns:a14="http://schemas.microsoft.com/office/drawing/2010/main" Requires="a14">
+            <mc:AlternateContent xmlns:mc="http://schemas.openxmlformats.org/markup-compatibility/2006" xmlns:a14="http://schemas.microsoft.com/office/drawing/2010/main">
+              <mc:Choice Requires="a14">
                 <p:sp>
                   <p:nvSpPr>
                     <p:cNvPr id="38" name="TextBox 37"/>
@@ -36422,7 +36422,7 @@
                   </p:txBody>
                 </p:sp>
               </mc:Choice>
-              <mc:Fallback>
+              <mc:Fallback xmlns="">
                 <p:sp>
                   <p:nvSpPr>
                     <p:cNvPr id="38" name="TextBox 37"/>
@@ -36509,8 +36509,8 @@
                 </a:p>
               </p:txBody>
             </p:sp>
-            <mc:AlternateContent xmlns:mc="http://schemas.openxmlformats.org/markup-compatibility/2006">
-              <mc:Choice xmlns:a14="http://schemas.microsoft.com/office/drawing/2010/main" Requires="a14">
+            <mc:AlternateContent xmlns:mc="http://schemas.openxmlformats.org/markup-compatibility/2006" xmlns:a14="http://schemas.microsoft.com/office/drawing/2010/main">
+              <mc:Choice Requires="a14">
                 <p:sp>
                   <p:nvSpPr>
                     <p:cNvPr id="40" name="TextBox 39"/>
@@ -36558,7 +36558,7 @@
                   </p:txBody>
                 </p:sp>
               </mc:Choice>
-              <mc:Fallback>
+              <mc:Fallback xmlns="">
                 <p:sp>
                   <p:nvSpPr>
                     <p:cNvPr id="40" name="TextBox 39"/>
@@ -36598,8 +36598,8 @@
               </mc:Fallback>
             </mc:AlternateContent>
           </p:grpSp>
-          <mc:AlternateContent xmlns:mc="http://schemas.openxmlformats.org/markup-compatibility/2006">
-            <mc:Choice xmlns:a14="http://schemas.microsoft.com/office/drawing/2010/main" Requires="a14">
+          <mc:AlternateContent xmlns:mc="http://schemas.openxmlformats.org/markup-compatibility/2006" xmlns:a14="http://schemas.microsoft.com/office/drawing/2010/main">
+            <mc:Choice Requires="a14">
               <p:sp>
                 <p:nvSpPr>
                   <p:cNvPr id="35" name="TextBox 34"/>
@@ -36647,7 +36647,7 @@
                 </p:txBody>
               </p:sp>
             </mc:Choice>
-            <mc:Fallback>
+            <mc:Fallback xmlns="">
               <p:sp>
                 <p:nvSpPr>
                   <p:cNvPr id="35" name="TextBox 34"/>
@@ -36723,8 +36723,8 @@
             </a:fontRef>
           </p:style>
         </p:cxnSp>
-        <mc:AlternateContent xmlns:mc="http://schemas.openxmlformats.org/markup-compatibility/2006">
-          <mc:Choice xmlns:a14="http://schemas.microsoft.com/office/drawing/2010/main" Requires="a14">
+        <mc:AlternateContent xmlns:mc="http://schemas.openxmlformats.org/markup-compatibility/2006" xmlns:a14="http://schemas.microsoft.com/office/drawing/2010/main">
+          <mc:Choice Requires="a14">
             <p:sp>
               <p:nvSpPr>
                 <p:cNvPr id="61" name="TextBox 60"/>
@@ -36820,7 +36820,7 @@
               </p:txBody>
             </p:sp>
           </mc:Choice>
-          <mc:Fallback>
+          <mc:Fallback xmlns="">
             <p:sp>
               <p:nvSpPr>
                 <p:cNvPr id="61" name="TextBox 60"/>

</xml_diff>

<commit_message>
Rotation 1 is done
</commit_message>
<xml_diff>
--- a/tex/figures/RotationalDynamics/Figures.pptx
+++ b/tex/figures/RotationalDynamics/Figures.pptx
@@ -253,7 +253,7 @@
           <a:p>
             <a:fld id="{F7249F8D-641B-4CAF-BAE5-10524742F6F1}" type="datetimeFigureOut">
               <a:rPr lang="en-CA" smtClean="0"/>
-              <a:t>2018-07-20</a:t>
+              <a:t>2018-08-27</a:t>
             </a:fld>
             <a:endParaRPr lang="en-CA"/>
           </a:p>
@@ -423,7 +423,7 @@
           <a:p>
             <a:fld id="{F7249F8D-641B-4CAF-BAE5-10524742F6F1}" type="datetimeFigureOut">
               <a:rPr lang="en-CA" smtClean="0"/>
-              <a:t>2018-07-20</a:t>
+              <a:t>2018-08-27</a:t>
             </a:fld>
             <a:endParaRPr lang="en-CA"/>
           </a:p>
@@ -603,7 +603,7 @@
           <a:p>
             <a:fld id="{F7249F8D-641B-4CAF-BAE5-10524742F6F1}" type="datetimeFigureOut">
               <a:rPr lang="en-CA" smtClean="0"/>
-              <a:t>2018-07-20</a:t>
+              <a:t>2018-08-27</a:t>
             </a:fld>
             <a:endParaRPr lang="en-CA"/>
           </a:p>
@@ -773,7 +773,7 @@
           <a:p>
             <a:fld id="{F7249F8D-641B-4CAF-BAE5-10524742F6F1}" type="datetimeFigureOut">
               <a:rPr lang="en-CA" smtClean="0"/>
-              <a:t>2018-07-20</a:t>
+              <a:t>2018-08-27</a:t>
             </a:fld>
             <a:endParaRPr lang="en-CA"/>
           </a:p>
@@ -1019,7 +1019,7 @@
           <a:p>
             <a:fld id="{F7249F8D-641B-4CAF-BAE5-10524742F6F1}" type="datetimeFigureOut">
               <a:rPr lang="en-CA" smtClean="0"/>
-              <a:t>2018-07-20</a:t>
+              <a:t>2018-08-27</a:t>
             </a:fld>
             <a:endParaRPr lang="en-CA"/>
           </a:p>
@@ -1251,7 +1251,7 @@
           <a:p>
             <a:fld id="{F7249F8D-641B-4CAF-BAE5-10524742F6F1}" type="datetimeFigureOut">
               <a:rPr lang="en-CA" smtClean="0"/>
-              <a:t>2018-07-20</a:t>
+              <a:t>2018-08-27</a:t>
             </a:fld>
             <a:endParaRPr lang="en-CA"/>
           </a:p>
@@ -1618,7 +1618,7 @@
           <a:p>
             <a:fld id="{F7249F8D-641B-4CAF-BAE5-10524742F6F1}" type="datetimeFigureOut">
               <a:rPr lang="en-CA" smtClean="0"/>
-              <a:t>2018-07-20</a:t>
+              <a:t>2018-08-27</a:t>
             </a:fld>
             <a:endParaRPr lang="en-CA"/>
           </a:p>
@@ -1736,7 +1736,7 @@
           <a:p>
             <a:fld id="{F7249F8D-641B-4CAF-BAE5-10524742F6F1}" type="datetimeFigureOut">
               <a:rPr lang="en-CA" smtClean="0"/>
-              <a:t>2018-07-20</a:t>
+              <a:t>2018-08-27</a:t>
             </a:fld>
             <a:endParaRPr lang="en-CA"/>
           </a:p>
@@ -1831,7 +1831,7 @@
           <a:p>
             <a:fld id="{F7249F8D-641B-4CAF-BAE5-10524742F6F1}" type="datetimeFigureOut">
               <a:rPr lang="en-CA" smtClean="0"/>
-              <a:t>2018-07-20</a:t>
+              <a:t>2018-08-27</a:t>
             </a:fld>
             <a:endParaRPr lang="en-CA"/>
           </a:p>
@@ -2108,7 +2108,7 @@
           <a:p>
             <a:fld id="{F7249F8D-641B-4CAF-BAE5-10524742F6F1}" type="datetimeFigureOut">
               <a:rPr lang="en-CA" smtClean="0"/>
-              <a:t>2018-07-20</a:t>
+              <a:t>2018-08-27</a:t>
             </a:fld>
             <a:endParaRPr lang="en-CA"/>
           </a:p>
@@ -2361,7 +2361,7 @@
           <a:p>
             <a:fld id="{F7249F8D-641B-4CAF-BAE5-10524742F6F1}" type="datetimeFigureOut">
               <a:rPr lang="en-CA" smtClean="0"/>
-              <a:t>2018-07-20</a:t>
+              <a:t>2018-08-27</a:t>
             </a:fld>
             <a:endParaRPr lang="en-CA"/>
           </a:p>
@@ -2574,7 +2574,7 @@
           <a:p>
             <a:fld id="{F7249F8D-641B-4CAF-BAE5-10524742F6F1}" type="datetimeFigureOut">
               <a:rPr lang="en-CA" smtClean="0"/>
-              <a:t>2018-07-20</a:t>
+              <a:t>2018-08-27</a:t>
             </a:fld>
             <a:endParaRPr lang="en-CA"/>
           </a:p>
@@ -8362,7 +8362,7 @@
                           <m:sSubPr>
                             <m:ctrlPr>
                               <a:rPr lang="en-US" sz="2000" b="0" i="1" smtClean="0">
-                                <a:latin typeface="Cambria Math" charset="0"/>
+                                <a:latin typeface="Cambria Math" panose="02040503050406030204" pitchFamily="18" charset="0"/>
                                 <a:cs typeface="Arial" panose="020B0604020202020204" pitchFamily="34" charset="0"/>
                               </a:rPr>
                             </m:ctrlPr>
@@ -9479,7 +9479,7 @@
                               <m:sSubPr>
                                 <m:ctrlPr>
                                   <a:rPr lang="en-US" sz="2000" b="0" i="1" smtClean="0">
-                                    <a:latin typeface="Cambria Math" charset="0"/>
+                                    <a:latin typeface="Cambria Math" panose="02040503050406030204" pitchFamily="18" charset="0"/>
                                     <a:cs typeface="Arial" panose="020B0604020202020204" pitchFamily="34" charset="0"/>
                                   </a:rPr>
                                 </m:ctrlPr>
@@ -9514,7 +9514,7 @@
                               <m:sSubPr>
                                 <m:ctrlPr>
                                   <a:rPr lang="en-US" sz="2000" b="0" i="1" smtClean="0">
-                                    <a:latin typeface="Cambria Math" charset="0"/>
+                                    <a:latin typeface="Cambria Math" panose="02040503050406030204" pitchFamily="18" charset="0"/>
                                     <a:cs typeface="Arial" panose="020B0604020202020204" pitchFamily="34" charset="0"/>
                                   </a:rPr>
                                 </m:ctrlPr>
@@ -9549,7 +9549,7 @@
                               <m:sSubPr>
                                 <m:ctrlPr>
                                   <a:rPr lang="en-US" sz="2000" b="0" i="1" smtClean="0">
-                                    <a:latin typeface="Cambria Math" charset="0"/>
+                                    <a:latin typeface="Cambria Math" panose="02040503050406030204" pitchFamily="18" charset="0"/>
                                     <a:cs typeface="Arial" panose="020B0604020202020204" pitchFamily="34" charset="0"/>
                                   </a:rPr>
                                 </m:ctrlPr>
@@ -9848,7 +9848,7 @@
                               <m:sSubPr>
                                 <m:ctrlPr>
                                   <a:rPr lang="en-US" sz="2000" b="0" i="1" smtClean="0">
-                                    <a:latin typeface="Cambria Math" charset="0"/>
+                                    <a:latin typeface="Cambria Math" panose="02040503050406030204" pitchFamily="18" charset="0"/>
                                     <a:cs typeface="Arial" panose="020B0604020202020204" pitchFamily="34" charset="0"/>
                                   </a:rPr>
                                 </m:ctrlPr>
@@ -9883,7 +9883,7 @@
                               <m:sSubPr>
                                 <m:ctrlPr>
                                   <a:rPr lang="en-US" sz="2000" b="0" i="1" smtClean="0">
-                                    <a:latin typeface="Cambria Math" charset="0"/>
+                                    <a:latin typeface="Cambria Math" panose="02040503050406030204" pitchFamily="18" charset="0"/>
                                     <a:cs typeface="Arial" panose="020B0604020202020204" pitchFamily="34" charset="0"/>
                                   </a:rPr>
                                 </m:ctrlPr>
@@ -10174,7 +10174,7 @@
                             <m:chr m:val="⃗"/>
                             <m:ctrlPr>
                               <a:rPr lang="en-US" sz="2000" b="0" i="1" smtClean="0">
-                                <a:latin typeface="Cambria Math" charset="0"/>
+                                <a:latin typeface="Cambria Math" panose="02040503050406030204" pitchFamily="18" charset="0"/>
                                 <a:cs typeface="Arial" panose="020B0604020202020204" pitchFamily="34" charset="0"/>
                               </a:rPr>
                             </m:ctrlPr>
@@ -11858,7 +11858,7 @@
                             <m:chr m:val="⃗"/>
                             <m:ctrlPr>
                               <a:rPr lang="en-US" b="0" i="1" smtClean="0">
-                                <a:latin typeface="Cambria Math" charset="0"/>
+                                <a:latin typeface="Cambria Math" panose="02040503050406030204" pitchFamily="18" charset="0"/>
                               </a:rPr>
                             </m:ctrlPr>
                           </m:accPr>
@@ -12047,7 +12047,7 @@
                             <m:chr m:val="⃗"/>
                             <m:ctrlPr>
                               <a:rPr lang="en-US" b="0" i="1" smtClean="0">
-                                <a:latin typeface="Cambria Math" charset="0"/>
+                                <a:latin typeface="Cambria Math" panose="02040503050406030204" pitchFamily="18" charset="0"/>
                               </a:rPr>
                             </m:ctrlPr>
                           </m:accPr>
@@ -12412,7 +12412,7 @@
                           <m:sSubPr>
                             <m:ctrlPr>
                               <a:rPr lang="en-US" b="0" i="1" smtClean="0">
-                                <a:latin typeface="Cambria Math" charset="0"/>
+                                <a:latin typeface="Cambria Math" panose="02040503050406030204" pitchFamily="18" charset="0"/>
                               </a:rPr>
                             </m:ctrlPr>
                           </m:sSubPr>
@@ -12608,7 +12608,7 @@
                           <m:sSubPr>
                             <m:ctrlPr>
                               <a:rPr lang="en-US" b="0" i="1" smtClean="0">
-                                <a:latin typeface="Cambria Math" charset="0"/>
+                                <a:latin typeface="Cambria Math" panose="02040503050406030204" pitchFamily="18" charset="0"/>
                               </a:rPr>
                             </m:ctrlPr>
                           </m:sSubPr>
@@ -13568,7 +13568,7 @@
                                     <m:chr m:val="⃗"/>
                                     <m:ctrlPr>
                                       <a:rPr lang="en-US" b="0" i="1" smtClean="0">
-                                        <a:latin typeface="Cambria Math" charset="0"/>
+                                        <a:latin typeface="Cambria Math" panose="02040503050406030204" pitchFamily="18" charset="0"/>
                                       </a:rPr>
                                     </m:ctrlPr>
                                   </m:accPr>
@@ -13757,7 +13757,7 @@
                                     <m:chr m:val="⃗"/>
                                     <m:ctrlPr>
                                       <a:rPr lang="en-US" b="0" i="1" smtClean="0">
-                                        <a:latin typeface="Cambria Math" charset="0"/>
+                                        <a:latin typeface="Cambria Math" panose="02040503050406030204" pitchFamily="18" charset="0"/>
                                       </a:rPr>
                                     </m:ctrlPr>
                                   </m:accPr>
@@ -14104,7 +14104,7 @@
                             <m:sSubPr>
                               <m:ctrlPr>
                                 <a:rPr lang="en-US" sz="2000" b="0" i="1" smtClean="0">
-                                  <a:latin typeface="Cambria Math" charset="0"/>
+                                  <a:latin typeface="Cambria Math" panose="02040503050406030204" pitchFamily="18" charset="0"/>
                                   <a:cs typeface="Arial" panose="020B0604020202020204" pitchFamily="34" charset="0"/>
                                 </a:rPr>
                               </m:ctrlPr>
@@ -14901,7 +14901,7 @@
                                   <m:chr m:val="⃗"/>
                                   <m:ctrlPr>
                                     <a:rPr lang="en-US" sz="2000" b="0" i="1" smtClean="0">
-                                      <a:latin typeface="Cambria Math" charset="0"/>
+                                      <a:latin typeface="Cambria Math" panose="02040503050406030204" pitchFamily="18" charset="0"/>
                                       <a:cs typeface="Arial" panose="020B0604020202020204" pitchFamily="34" charset="0"/>
                                     </a:rPr>
                                   </m:ctrlPr>
@@ -15135,7 +15135,7 @@
                               <m:chr m:val="⃗"/>
                               <m:ctrlPr>
                                 <a:rPr lang="en-US" sz="2000" b="0" i="1" smtClean="0">
-                                  <a:latin typeface="Cambria Math" charset="0"/>
+                                  <a:latin typeface="Cambria Math" panose="02040503050406030204" pitchFamily="18" charset="0"/>
                                   <a:cs typeface="Arial" panose="020B0604020202020204" pitchFamily="34" charset="0"/>
                                 </a:rPr>
                               </m:ctrlPr>
@@ -15272,7 +15272,7 @@
                               <m:chr m:val="⃗"/>
                               <m:ctrlPr>
                                 <a:rPr lang="en-US" sz="2000" b="0" i="1" smtClean="0">
-                                  <a:latin typeface="Cambria Math" charset="0"/>
+                                  <a:latin typeface="Cambria Math" panose="02040503050406030204" pitchFamily="18" charset="0"/>
                                   <a:cs typeface="Arial" panose="020B0604020202020204" pitchFamily="34" charset="0"/>
                                 </a:rPr>
                               </m:ctrlPr>
@@ -16144,7 +16144,7 @@
                               <m:chr m:val="⃗"/>
                               <m:ctrlPr>
                                 <a:rPr lang="en-US" sz="2000" b="0" i="1" smtClean="0">
-                                  <a:latin typeface="Cambria Math" charset="0"/>
+                                  <a:latin typeface="Cambria Math" panose="02040503050406030204" pitchFamily="18" charset="0"/>
                                   <a:cs typeface="Arial" panose="020B0604020202020204" pitchFamily="34" charset="0"/>
                                 </a:rPr>
                               </m:ctrlPr>
@@ -16245,7 +16245,7 @@
                               <m:chr m:val="⃗"/>
                               <m:ctrlPr>
                                 <a:rPr lang="en-US" sz="2000" b="0" i="1" smtClean="0">
-                                  <a:latin typeface="Cambria Math" charset="0"/>
+                                  <a:latin typeface="Cambria Math" panose="02040503050406030204" pitchFamily="18" charset="0"/>
                                   <a:cs typeface="Arial" panose="020B0604020202020204" pitchFamily="34" charset="0"/>
                                 </a:rPr>
                               </m:ctrlPr>
@@ -16471,7 +16471,7 @@
                             <m:chr m:val="⃗"/>
                             <m:ctrlPr>
                               <a:rPr lang="en-US" sz="2000" b="0" i="1" smtClean="0">
-                                <a:latin typeface="Cambria Math" charset="0"/>
+                                <a:latin typeface="Cambria Math" panose="02040503050406030204" pitchFamily="18" charset="0"/>
                                 <a:cs typeface="Arial" panose="020B0604020202020204" pitchFamily="34" charset="0"/>
                               </a:rPr>
                             </m:ctrlPr>
@@ -16759,7 +16759,7 @@
                             <m:chr m:val="⃗"/>
                             <m:ctrlPr>
                               <a:rPr lang="en-US" sz="2000" b="0" i="1" smtClean="0">
-                                <a:latin typeface="Cambria Math" charset="0"/>
+                                <a:latin typeface="Cambria Math" panose="02040503050406030204" pitchFamily="18" charset="0"/>
                                 <a:cs typeface="Arial" panose="020B0604020202020204" pitchFamily="34" charset="0"/>
                               </a:rPr>
                             </m:ctrlPr>
@@ -16786,7 +16786,7 @@
                             <m:chr m:val="⃗"/>
                             <m:ctrlPr>
                               <a:rPr lang="en-US" sz="2000" b="0" i="1" smtClean="0">
-                                <a:latin typeface="Cambria Math" charset="0"/>
+                                <a:latin typeface="Cambria Math" panose="02040503050406030204" pitchFamily="18" charset="0"/>
                                 <a:cs typeface="Arial" panose="020B0604020202020204" pitchFamily="34" charset="0"/>
                               </a:rPr>
                             </m:ctrlPr>
@@ -16813,7 +16813,7 @@
                             <m:chr m:val="⃗"/>
                             <m:ctrlPr>
                               <a:rPr lang="en-US" sz="2000" b="0" i="1" smtClean="0">
-                                <a:latin typeface="Cambria Math" charset="0"/>
+                                <a:latin typeface="Cambria Math" panose="02040503050406030204" pitchFamily="18" charset="0"/>
                                 <a:cs typeface="Arial" panose="020B0604020202020204" pitchFamily="34" charset="0"/>
                               </a:rPr>
                             </m:ctrlPr>
@@ -17219,7 +17219,7 @@
                                 <m:chr m:val="⃗"/>
                                 <m:ctrlPr>
                                   <a:rPr lang="en-US" sz="2000" b="0" i="1" smtClean="0">
-                                    <a:latin typeface="Cambria Math" charset="0"/>
+                                    <a:latin typeface="Cambria Math" panose="02040503050406030204" pitchFamily="18" charset="0"/>
                                     <a:cs typeface="Arial" panose="020B0604020202020204" pitchFamily="34" charset="0"/>
                                   </a:rPr>
                                 </m:ctrlPr>
@@ -17320,7 +17320,7 @@
                                 <m:chr m:val="⃗"/>
                                 <m:ctrlPr>
                                   <a:rPr lang="en-US" sz="2000" b="0" i="1" smtClean="0">
-                                    <a:latin typeface="Cambria Math" charset="0"/>
+                                    <a:latin typeface="Cambria Math" panose="02040503050406030204" pitchFamily="18" charset="0"/>
                                     <a:cs typeface="Arial" panose="020B0604020202020204" pitchFamily="34" charset="0"/>
                                   </a:rPr>
                                 </m:ctrlPr>
@@ -17494,7 +17494,7 @@
                               <m:sSubPr>
                                 <m:ctrlPr>
                                   <a:rPr lang="en-US" sz="2000" b="0" i="1" smtClean="0">
-                                    <a:latin typeface="Cambria Math" charset="0"/>
+                                    <a:latin typeface="Cambria Math" panose="02040503050406030204" pitchFamily="18" charset="0"/>
                                     <a:cs typeface="Arial" panose="020B0604020202020204" pitchFamily="34" charset="0"/>
                                   </a:rPr>
                                 </m:ctrlPr>
@@ -17603,7 +17603,7 @@
                               <m:sSubPr>
                                 <m:ctrlPr>
                                   <a:rPr lang="en-US" sz="2000" b="0" i="1" smtClean="0">
-                                    <a:latin typeface="Cambria Math" charset="0"/>
+                                    <a:latin typeface="Cambria Math" panose="02040503050406030204" pitchFamily="18" charset="0"/>
                                     <a:cs typeface="Arial" panose="020B0604020202020204" pitchFamily="34" charset="0"/>
                                   </a:rPr>
                                 </m:ctrlPr>
@@ -18144,7 +18144,7 @@
                                 <m:chr m:val="⃗"/>
                                 <m:ctrlPr>
                                   <a:rPr lang="en-US" sz="2000" b="0" i="1" smtClean="0">
-                                    <a:latin typeface="Cambria Math" charset="0"/>
+                                    <a:latin typeface="Cambria Math" panose="02040503050406030204" pitchFamily="18" charset="0"/>
                                     <a:cs typeface="Arial" panose="020B0604020202020204" pitchFamily="34" charset="0"/>
                                   </a:rPr>
                                 </m:ctrlPr>
@@ -18245,7 +18245,7 @@
                                 <m:chr m:val="⃗"/>
                                 <m:ctrlPr>
                                   <a:rPr lang="en-US" sz="2000" b="0" i="1" smtClean="0">
-                                    <a:latin typeface="Cambria Math" charset="0"/>
+                                    <a:latin typeface="Cambria Math" panose="02040503050406030204" pitchFamily="18" charset="0"/>
                                     <a:cs typeface="Arial" panose="020B0604020202020204" pitchFamily="34" charset="0"/>
                                   </a:rPr>
                                 </m:ctrlPr>
@@ -18419,7 +18419,7 @@
                               <m:sSubPr>
                                 <m:ctrlPr>
                                   <a:rPr lang="en-US" sz="2000" b="0" i="1" smtClean="0">
-                                    <a:latin typeface="Cambria Math" charset="0"/>
+                                    <a:latin typeface="Cambria Math" panose="02040503050406030204" pitchFamily="18" charset="0"/>
                                     <a:cs typeface="Arial" panose="020B0604020202020204" pitchFamily="34" charset="0"/>
                                   </a:rPr>
                                 </m:ctrlPr>
@@ -18528,7 +18528,7 @@
                               <m:sSubPr>
                                 <m:ctrlPr>
                                   <a:rPr lang="en-US" sz="2000" b="0" i="1" smtClean="0">
-                                    <a:latin typeface="Cambria Math" charset="0"/>
+                                    <a:latin typeface="Cambria Math" panose="02040503050406030204" pitchFamily="18" charset="0"/>
                                     <a:cs typeface="Arial" panose="020B0604020202020204" pitchFamily="34" charset="0"/>
                                   </a:rPr>
                                 </m:ctrlPr>
@@ -19000,7 +19000,7 @@
             <p:nvPr/>
           </p:nvPicPr>
           <p:blipFill rotWithShape="1">
-            <a:blip r:embed="rId23">
+            <a:blip r:embed="rId23" cstate="print">
               <a:extLst>
                 <a:ext uri="{28A0092B-C50C-407E-A947-70E740481C1C}">
                   <a14:useLocalDpi xmlns:a14="http://schemas.microsoft.com/office/drawing/2010/main" val="0"/>
@@ -19696,7 +19696,7 @@
                               <m:chr m:val="⃗"/>
                               <m:ctrlPr>
                                 <a:rPr lang="en-US" sz="2000" b="0" i="1" smtClean="0">
-                                  <a:latin typeface="Cambria Math" charset="0"/>
+                                  <a:latin typeface="Cambria Math" panose="02040503050406030204" pitchFamily="18" charset="0"/>
                                   <a:cs typeface="Arial" panose="020B0604020202020204" pitchFamily="34" charset="0"/>
                                 </a:rPr>
                               </m:ctrlPr>
@@ -19797,7 +19797,7 @@
                               <m:chr m:val="⃗"/>
                               <m:ctrlPr>
                                 <a:rPr lang="en-US" sz="2000" b="0" i="1" smtClean="0">
-                                  <a:latin typeface="Cambria Math" charset="0"/>
+                                  <a:latin typeface="Cambria Math" panose="02040503050406030204" pitchFamily="18" charset="0"/>
                                   <a:cs typeface="Arial" panose="020B0604020202020204" pitchFamily="34" charset="0"/>
                                 </a:rPr>
                               </m:ctrlPr>
@@ -19897,7 +19897,7 @@
                             <m:sSubPr>
                               <m:ctrlPr>
                                 <a:rPr lang="en-US" sz="2000" b="0" i="1" smtClean="0">
-                                  <a:latin typeface="Cambria Math" charset="0"/>
+                                  <a:latin typeface="Cambria Math" panose="02040503050406030204" pitchFamily="18" charset="0"/>
                                   <a:cs typeface="Arial" panose="020B0604020202020204" pitchFamily="34" charset="0"/>
                                 </a:rPr>
                               </m:ctrlPr>
@@ -19908,7 +19908,7 @@
                                   <m:chr m:val="⃗"/>
                                   <m:ctrlPr>
                                     <a:rPr lang="en-US" sz="2000" b="0" i="1" smtClean="0">
-                                      <a:latin typeface="Cambria Math" charset="0"/>
+                                      <a:latin typeface="Cambria Math" panose="02040503050406030204" pitchFamily="18" charset="0"/>
                                       <a:cs typeface="Arial" panose="020B0604020202020204" pitchFamily="34" charset="0"/>
                                     </a:rPr>
                                   </m:ctrlPr>
@@ -20019,7 +20019,7 @@
                             <m:sSubPr>
                               <m:ctrlPr>
                                 <a:rPr lang="en-US" sz="2000" b="0" i="1" smtClean="0">
-                                  <a:latin typeface="Cambria Math" charset="0"/>
+                                  <a:latin typeface="Cambria Math" panose="02040503050406030204" pitchFamily="18" charset="0"/>
                                   <a:cs typeface="Arial" panose="020B0604020202020204" pitchFamily="34" charset="0"/>
                                 </a:rPr>
                               </m:ctrlPr>
@@ -20030,7 +20030,7 @@
                                   <m:chr m:val="⃗"/>
                                   <m:ctrlPr>
                                     <a:rPr lang="en-US" sz="2000" b="0" i="1" smtClean="0">
-                                      <a:latin typeface="Cambria Math" charset="0"/>
+                                      <a:latin typeface="Cambria Math" panose="02040503050406030204" pitchFamily="18" charset="0"/>
                                       <a:cs typeface="Arial" panose="020B0604020202020204" pitchFamily="34" charset="0"/>
                                     </a:rPr>
                                   </m:ctrlPr>
@@ -20890,7 +20890,7 @@
                                 <m:chr m:val="⃗"/>
                                 <m:ctrlPr>
                                   <a:rPr lang="en-US" sz="2000" b="0" i="1" smtClean="0">
-                                    <a:latin typeface="Cambria Math" charset="0"/>
+                                    <a:latin typeface="Cambria Math" panose="02040503050406030204" pitchFamily="18" charset="0"/>
                                     <a:cs typeface="Arial" panose="020B0604020202020204" pitchFamily="34" charset="0"/>
                                   </a:rPr>
                                 </m:ctrlPr>
@@ -21702,7 +21702,7 @@
                                 <m:chr m:val="⃗"/>
                                 <m:ctrlPr>
                                   <a:rPr lang="en-US" sz="2000" b="0" i="1" smtClean="0">
-                                    <a:latin typeface="Cambria Math" charset="0"/>
+                                    <a:latin typeface="Cambria Math" panose="02040503050406030204" pitchFamily="18" charset="0"/>
                                     <a:cs typeface="Arial" panose="020B0604020202020204" pitchFamily="34" charset="0"/>
                                   </a:rPr>
                                 </m:ctrlPr>
@@ -21887,7 +21887,7 @@
                           <m:sSupPr>
                             <m:ctrlPr>
                               <a:rPr lang="en-US" sz="2000" b="0" i="1" smtClean="0">
-                                <a:latin typeface="Cambria Math" charset="0"/>
+                                <a:latin typeface="Cambria Math" panose="02040503050406030204" pitchFamily="18" charset="0"/>
                                 <a:cs typeface="Arial" panose="020B0604020202020204" pitchFamily="34" charset="0"/>
                               </a:rPr>
                             </m:ctrlPr>
@@ -21898,7 +21898,7 @@
                                 <m:chr m:val="⃗"/>
                                 <m:ctrlPr>
                                   <a:rPr lang="en-US" sz="2000" b="0" i="1" smtClean="0">
-                                    <a:latin typeface="Cambria Math" charset="0"/>
+                                    <a:latin typeface="Cambria Math" panose="02040503050406030204" pitchFamily="18" charset="0"/>
                                     <a:cs typeface="Arial" panose="020B0604020202020204" pitchFamily="34" charset="0"/>
                                   </a:rPr>
                                 </m:ctrlPr>
@@ -22045,7 +22045,7 @@
                           <m:sSupPr>
                             <m:ctrlPr>
                               <a:rPr lang="en-US" sz="2000" b="0" i="1" smtClean="0">
-                                <a:latin typeface="Cambria Math" charset="0"/>
+                                <a:latin typeface="Cambria Math" panose="02040503050406030204" pitchFamily="18" charset="0"/>
                                 <a:cs typeface="Arial" panose="020B0604020202020204" pitchFamily="34" charset="0"/>
                               </a:rPr>
                             </m:ctrlPr>
@@ -22055,7 +22055,7 @@
                               <m:sSubPr>
                                 <m:ctrlPr>
                                   <a:rPr lang="en-US" sz="2000" b="0" i="1" smtClean="0">
-                                    <a:latin typeface="Cambria Math" charset="0"/>
+                                    <a:latin typeface="Cambria Math" panose="02040503050406030204" pitchFamily="18" charset="0"/>
                                     <a:cs typeface="Arial" panose="020B0604020202020204" pitchFamily="34" charset="0"/>
                                   </a:rPr>
                                 </m:ctrlPr>
@@ -22066,7 +22066,7 @@
                                     <m:chr m:val="⃗"/>
                                     <m:ctrlPr>
                                       <a:rPr lang="en-US" sz="2000" b="0" i="1" smtClean="0">
-                                        <a:latin typeface="Cambria Math" charset="0"/>
+                                        <a:latin typeface="Cambria Math" panose="02040503050406030204" pitchFamily="18" charset="0"/>
                                         <a:cs typeface="Arial" panose="020B0604020202020204" pitchFamily="34" charset="0"/>
                                       </a:rPr>
                                     </m:ctrlPr>
@@ -22471,7 +22471,7 @@
                             <m:chr m:val="⃗"/>
                             <m:ctrlPr>
                               <a:rPr lang="en-US" sz="2000" b="0" i="1" smtClean="0">
-                                <a:latin typeface="Cambria Math" charset="0"/>
+                                <a:latin typeface="Cambria Math" panose="02040503050406030204" pitchFamily="18" charset="0"/>
                                 <a:cs typeface="Arial" panose="020B0604020202020204" pitchFamily="34" charset="0"/>
                               </a:rPr>
                             </m:ctrlPr>
@@ -22579,7 +22579,7 @@
                             <m:chr m:val="⃗"/>
                             <m:ctrlPr>
                               <a:rPr lang="en-US" sz="2000" b="0" i="1" smtClean="0">
-                                <a:latin typeface="Cambria Math" charset="0"/>
+                                <a:latin typeface="Cambria Math" panose="02040503050406030204" pitchFamily="18" charset="0"/>
                                 <a:cs typeface="Arial" panose="020B0604020202020204" pitchFamily="34" charset="0"/>
                               </a:rPr>
                             </m:ctrlPr>
@@ -23216,7 +23216,7 @@
                                     <m:chr m:val="⃗"/>
                                     <m:ctrlPr>
                                       <a:rPr lang="en-US" sz="2000" b="0" i="1" smtClean="0">
-                                        <a:latin typeface="Cambria Math" charset="0"/>
+                                        <a:latin typeface="Cambria Math" panose="02040503050406030204" pitchFamily="18" charset="0"/>
                                         <a:cs typeface="Arial" panose="020B0604020202020204" pitchFamily="34" charset="0"/>
                                       </a:rPr>
                                     </m:ctrlPr>
@@ -23324,7 +23324,7 @@
                                     <m:chr m:val="⃗"/>
                                     <m:ctrlPr>
                                       <a:rPr lang="en-US" sz="2000" b="0" i="1" smtClean="0">
-                                        <a:latin typeface="Cambria Math" charset="0"/>
+                                        <a:latin typeface="Cambria Math" panose="02040503050406030204" pitchFamily="18" charset="0"/>
                                         <a:cs typeface="Arial" panose="020B0604020202020204" pitchFamily="34" charset="0"/>
                                       </a:rPr>
                                     </m:ctrlPr>
@@ -23729,7 +23729,7 @@
                                   <m:chr m:val="⃗"/>
                                   <m:ctrlPr>
                                     <a:rPr lang="en-US" sz="2000" b="0" i="1" smtClean="0">
-                                      <a:latin typeface="Cambria Math" charset="0"/>
+                                      <a:latin typeface="Cambria Math" panose="02040503050406030204" pitchFamily="18" charset="0"/>
                                       <a:cs typeface="Arial" panose="020B0604020202020204" pitchFamily="34" charset="0"/>
                                     </a:rPr>
                                   </m:ctrlPr>
@@ -23830,7 +23830,7 @@
                                   <m:chr m:val="⃗"/>
                                   <m:ctrlPr>
                                     <a:rPr lang="en-US" sz="2000" b="0" i="1" smtClean="0">
-                                      <a:latin typeface="Cambria Math" charset="0"/>
+                                      <a:latin typeface="Cambria Math" panose="02040503050406030204" pitchFamily="18" charset="0"/>
                                       <a:cs typeface="Arial" panose="020B0604020202020204" pitchFamily="34" charset="0"/>
                                     </a:rPr>
                                   </m:ctrlPr>
@@ -24708,7 +24708,7 @@
                                     <m:chr m:val="⃗"/>
                                     <m:ctrlPr>
                                       <a:rPr lang="en-US" sz="2000" b="0" i="1" smtClean="0">
-                                        <a:latin typeface="Cambria Math" charset="0"/>
+                                        <a:latin typeface="Cambria Math" panose="02040503050406030204" pitchFamily="18" charset="0"/>
                                         <a:cs typeface="Arial" panose="020B0604020202020204" pitchFamily="34" charset="0"/>
                                       </a:rPr>
                                     </m:ctrlPr>
@@ -24816,7 +24816,7 @@
                                     <m:chr m:val="⃗"/>
                                     <m:ctrlPr>
                                       <a:rPr lang="en-US" sz="2000" b="0" i="1" smtClean="0">
-                                        <a:latin typeface="Cambria Math" charset="0"/>
+                                        <a:latin typeface="Cambria Math" panose="02040503050406030204" pitchFamily="18" charset="0"/>
                                         <a:cs typeface="Arial" panose="020B0604020202020204" pitchFamily="34" charset="0"/>
                                       </a:rPr>
                                     </m:ctrlPr>
@@ -25130,7 +25130,7 @@
                                   <m:chr m:val="⃗"/>
                                   <m:ctrlPr>
                                     <a:rPr lang="en-US" sz="2000" b="0" i="1" smtClean="0">
-                                      <a:latin typeface="Cambria Math" charset="0"/>
+                                      <a:latin typeface="Cambria Math" panose="02040503050406030204" pitchFamily="18" charset="0"/>
                                       <a:cs typeface="Arial" panose="020B0604020202020204" pitchFamily="34" charset="0"/>
                                     </a:rPr>
                                   </m:ctrlPr>
@@ -26356,7 +26356,7 @@
                             <m:sSubPr>
                               <m:ctrlPr>
                                 <a:rPr lang="en-US" sz="2000" b="0" i="1" smtClean="0">
-                                  <a:latin typeface="Cambria Math" charset="0"/>
+                                  <a:latin typeface="Cambria Math" panose="02040503050406030204" pitchFamily="18" charset="0"/>
                                   <a:cs typeface="Arial" panose="020B0604020202020204" pitchFamily="34" charset="0"/>
                                 </a:rPr>
                               </m:ctrlPr>
@@ -26367,7 +26367,7 @@
                                   <m:chr m:val="⃗"/>
                                   <m:ctrlPr>
                                     <a:rPr lang="en-US" sz="2000" b="0" i="1" smtClean="0">
-                                      <a:latin typeface="Cambria Math" charset="0"/>
+                                      <a:latin typeface="Cambria Math" panose="02040503050406030204" pitchFamily="18" charset="0"/>
                                       <a:cs typeface="Arial" panose="020B0604020202020204" pitchFamily="34" charset="0"/>
                                     </a:rPr>
                                   </m:ctrlPr>
@@ -26478,7 +26478,7 @@
                             <m:sSubPr>
                               <m:ctrlPr>
                                 <a:rPr lang="en-US" sz="2000" b="0" i="1" smtClean="0">
-                                  <a:latin typeface="Cambria Math" charset="0"/>
+                                  <a:latin typeface="Cambria Math" panose="02040503050406030204" pitchFamily="18" charset="0"/>
                                   <a:cs typeface="Arial" panose="020B0604020202020204" pitchFamily="34" charset="0"/>
                                 </a:rPr>
                               </m:ctrlPr>
@@ -26489,7 +26489,7 @@
                                   <m:chr m:val="⃗"/>
                                   <m:ctrlPr>
                                     <a:rPr lang="en-US" sz="2000" b="0" i="1" smtClean="0">
-                                      <a:latin typeface="Cambria Math" charset="0"/>
+                                      <a:latin typeface="Cambria Math" panose="02040503050406030204" pitchFamily="18" charset="0"/>
                                       <a:cs typeface="Arial" panose="020B0604020202020204" pitchFamily="34" charset="0"/>
                                     </a:rPr>
                                   </m:ctrlPr>
@@ -26600,7 +26600,7 @@
                             <m:sSubPr>
                               <m:ctrlPr>
                                 <a:rPr lang="en-US" sz="2000" b="0" i="1" smtClean="0">
-                                  <a:latin typeface="Cambria Math" charset="0"/>
+                                  <a:latin typeface="Cambria Math" panose="02040503050406030204" pitchFamily="18" charset="0"/>
                                   <a:cs typeface="Arial" panose="020B0604020202020204" pitchFamily="34" charset="0"/>
                                 </a:rPr>
                               </m:ctrlPr>
@@ -26709,7 +26709,7 @@
                             <m:sSubPr>
                               <m:ctrlPr>
                                 <a:rPr lang="en-US" sz="2000" b="0" i="1" smtClean="0">
-                                  <a:latin typeface="Cambria Math" charset="0"/>
+                                  <a:latin typeface="Cambria Math" panose="02040503050406030204" pitchFamily="18" charset="0"/>
                                   <a:cs typeface="Arial" panose="020B0604020202020204" pitchFamily="34" charset="0"/>
                                 </a:rPr>
                               </m:ctrlPr>
@@ -27341,7 +27341,7 @@
                           <m:sSubPr>
                             <m:ctrlPr>
                               <a:rPr lang="en-US" sz="2000" b="0" i="1" smtClean="0">
-                                <a:latin typeface="Cambria Math" charset="0"/>
+                                <a:latin typeface="Cambria Math" panose="02040503050406030204" pitchFamily="18" charset="0"/>
                                 <a:cs typeface="Arial" panose="020B0604020202020204" pitchFamily="34" charset="0"/>
                               </a:rPr>
                             </m:ctrlPr>
@@ -27352,7 +27352,7 @@
                                 <m:chr m:val="⃗"/>
                                 <m:ctrlPr>
                                   <a:rPr lang="en-US" sz="2000" b="0" i="1" smtClean="0">
-                                    <a:latin typeface="Cambria Math" charset="0"/>
+                                    <a:latin typeface="Cambria Math" panose="02040503050406030204" pitchFamily="18" charset="0"/>
                                     <a:cs typeface="Arial" panose="020B0604020202020204" pitchFamily="34" charset="0"/>
                                   </a:rPr>
                                 </m:ctrlPr>
@@ -27463,7 +27463,7 @@
                           <m:sSubPr>
                             <m:ctrlPr>
                               <a:rPr lang="en-US" sz="2000" b="0" i="1" smtClean="0">
-                                <a:latin typeface="Cambria Math" charset="0"/>
+                                <a:latin typeface="Cambria Math" panose="02040503050406030204" pitchFamily="18" charset="0"/>
                                 <a:cs typeface="Arial" panose="020B0604020202020204" pitchFamily="34" charset="0"/>
                               </a:rPr>
                             </m:ctrlPr>
@@ -27474,7 +27474,7 @@
                                 <m:chr m:val="⃗"/>
                                 <m:ctrlPr>
                                   <a:rPr lang="en-US" sz="2000" b="0" i="1" smtClean="0">
-                                    <a:latin typeface="Cambria Math" charset="0"/>
+                                    <a:latin typeface="Cambria Math" panose="02040503050406030204" pitchFamily="18" charset="0"/>
                                     <a:cs typeface="Arial" panose="020B0604020202020204" pitchFamily="34" charset="0"/>
                                   </a:rPr>
                                 </m:ctrlPr>
@@ -27585,7 +27585,7 @@
                           <m:sSubPr>
                             <m:ctrlPr>
                               <a:rPr lang="en-US" sz="2000" b="0" i="1" smtClean="0">
-                                <a:latin typeface="Cambria Math" charset="0"/>
+                                <a:latin typeface="Cambria Math" panose="02040503050406030204" pitchFamily="18" charset="0"/>
                                 <a:cs typeface="Arial" panose="020B0604020202020204" pitchFamily="34" charset="0"/>
                               </a:rPr>
                             </m:ctrlPr>
@@ -27695,7 +27695,7 @@
                             <m:chr m:val="⃗"/>
                             <m:ctrlPr>
                               <a:rPr lang="en-US" sz="2000" b="0" i="1" smtClean="0">
-                                <a:latin typeface="Cambria Math" charset="0"/>
+                                <a:latin typeface="Cambria Math" panose="02040503050406030204" pitchFamily="18" charset="0"/>
                                 <a:cs typeface="Arial" panose="020B0604020202020204" pitchFamily="34" charset="0"/>
                               </a:rPr>
                             </m:ctrlPr>
@@ -27803,7 +27803,7 @@
                             <m:chr m:val="⃗"/>
                             <m:ctrlPr>
                               <a:rPr lang="en-US" sz="2000" b="0" i="1" smtClean="0">
-                                <a:latin typeface="Cambria Math" charset="0"/>
+                                <a:latin typeface="Cambria Math" panose="02040503050406030204" pitchFamily="18" charset="0"/>
                                 <a:cs typeface="Arial" panose="020B0604020202020204" pitchFamily="34" charset="0"/>
                               </a:rPr>
                             </m:ctrlPr>
@@ -28256,7 +28256,7 @@
                               <m:sSubPr>
                                 <m:ctrlPr>
                                   <a:rPr lang="en-US" sz="2000" b="0" i="1" smtClean="0">
-                                    <a:latin typeface="Cambria Math" charset="0"/>
+                                    <a:latin typeface="Cambria Math" panose="02040503050406030204" pitchFamily="18" charset="0"/>
                                     <a:cs typeface="Arial" panose="020B0604020202020204" pitchFamily="34" charset="0"/>
                                   </a:rPr>
                                 </m:ctrlPr>
@@ -28365,7 +28365,7 @@
                               <m:sSubPr>
                                 <m:ctrlPr>
                                   <a:rPr lang="en-US" sz="2000" b="0" i="1" smtClean="0">
-                                    <a:latin typeface="Cambria Math" charset="0"/>
+                                    <a:latin typeface="Cambria Math" panose="02040503050406030204" pitchFamily="18" charset="0"/>
                                     <a:cs typeface="Arial" panose="020B0604020202020204" pitchFamily="34" charset="0"/>
                                   </a:rPr>
                                 </m:ctrlPr>
@@ -28548,7 +28548,7 @@
                               <m:sSubPr>
                                 <m:ctrlPr>
                                   <a:rPr lang="en-US" sz="2000" b="0" i="1" smtClean="0">
-                                    <a:latin typeface="Cambria Math" charset="0"/>
+                                    <a:latin typeface="Cambria Math" panose="02040503050406030204" pitchFamily="18" charset="0"/>
                                     <a:cs typeface="Arial" panose="020B0604020202020204" pitchFamily="34" charset="0"/>
                                   </a:rPr>
                                 </m:ctrlPr>
@@ -29298,7 +29298,7 @@
                               <m:sSubPr>
                                 <m:ctrlPr>
                                   <a:rPr lang="en-US" sz="2000" b="0" i="1" smtClean="0">
-                                    <a:latin typeface="Cambria Math" charset="0"/>
+                                    <a:latin typeface="Cambria Math" panose="02040503050406030204" pitchFamily="18" charset="0"/>
                                     <a:cs typeface="Arial" panose="020B0604020202020204" pitchFamily="34" charset="0"/>
                                   </a:rPr>
                                 </m:ctrlPr>
@@ -29309,7 +29309,7 @@
                                     <m:chr m:val="⃗"/>
                                     <m:ctrlPr>
                                       <a:rPr lang="en-US" sz="2000" b="0" i="1" smtClean="0">
-                                        <a:latin typeface="Cambria Math" charset="0"/>
+                                        <a:latin typeface="Cambria Math" panose="02040503050406030204" pitchFamily="18" charset="0"/>
                                         <a:cs typeface="Arial" panose="020B0604020202020204" pitchFamily="34" charset="0"/>
                                       </a:rPr>
                                     </m:ctrlPr>
@@ -29420,7 +29420,7 @@
                               <m:sSubPr>
                                 <m:ctrlPr>
                                   <a:rPr lang="en-US" sz="2000" b="0" i="1" smtClean="0">
-                                    <a:latin typeface="Cambria Math" charset="0"/>
+                                    <a:latin typeface="Cambria Math" panose="02040503050406030204" pitchFamily="18" charset="0"/>
                                     <a:cs typeface="Arial" panose="020B0604020202020204" pitchFamily="34" charset="0"/>
                                   </a:rPr>
                                 </m:ctrlPr>
@@ -29431,7 +29431,7 @@
                                     <m:chr m:val="⃗"/>
                                     <m:ctrlPr>
                                       <a:rPr lang="en-US" sz="2000" b="0" i="1" smtClean="0">
-                                        <a:latin typeface="Cambria Math" charset="0"/>
+                                        <a:latin typeface="Cambria Math" panose="02040503050406030204" pitchFamily="18" charset="0"/>
                                         <a:cs typeface="Arial" panose="020B0604020202020204" pitchFamily="34" charset="0"/>
                                       </a:rPr>
                                     </m:ctrlPr>
@@ -29828,7 +29828,7 @@
                               <m:sSubPr>
                                 <m:ctrlPr>
                                   <a:rPr lang="en-US" sz="2000" b="0" i="1" smtClean="0">
-                                    <a:latin typeface="Cambria Math" charset="0"/>
+                                    <a:latin typeface="Cambria Math" panose="02040503050406030204" pitchFamily="18" charset="0"/>
                                     <a:cs typeface="Arial" panose="020B0604020202020204" pitchFamily="34" charset="0"/>
                                   </a:rPr>
                                 </m:ctrlPr>
@@ -29839,7 +29839,7 @@
                                     <m:chr m:val="⃗"/>
                                     <m:ctrlPr>
                                       <a:rPr lang="en-US" sz="2000" b="0" i="1" smtClean="0">
-                                        <a:latin typeface="Cambria Math" charset="0"/>
+                                        <a:latin typeface="Cambria Math" panose="02040503050406030204" pitchFamily="18" charset="0"/>
                                         <a:cs typeface="Arial" panose="020B0604020202020204" pitchFamily="34" charset="0"/>
                                       </a:rPr>
                                     </m:ctrlPr>
@@ -29993,7 +29993,7 @@
                               <m:sSubPr>
                                 <m:ctrlPr>
                                   <a:rPr lang="en-US" sz="2000" b="0" i="1" smtClean="0">
-                                    <a:latin typeface="Cambria Math" charset="0"/>
+                                    <a:latin typeface="Cambria Math" panose="02040503050406030204" pitchFamily="18" charset="0"/>
                                     <a:cs typeface="Arial" panose="020B0604020202020204" pitchFamily="34" charset="0"/>
                                   </a:rPr>
                                 </m:ctrlPr>
@@ -30004,7 +30004,7 @@
                                     <m:chr m:val="⃗"/>
                                     <m:ctrlPr>
                                       <a:rPr lang="en-US" sz="2000" b="0" i="1" smtClean="0">
-                                        <a:latin typeface="Cambria Math" charset="0"/>
+                                        <a:latin typeface="Cambria Math" panose="02040503050406030204" pitchFamily="18" charset="0"/>
                                         <a:cs typeface="Arial" panose="020B0604020202020204" pitchFamily="34" charset="0"/>
                                       </a:rPr>
                                     </m:ctrlPr>
@@ -30239,7 +30239,7 @@
                               <m:sSubPr>
                                 <m:ctrlPr>
                                   <a:rPr lang="en-US" sz="2000" b="0" i="1" smtClean="0">
-                                    <a:latin typeface="Cambria Math" charset="0"/>
+                                    <a:latin typeface="Cambria Math" panose="02040503050406030204" pitchFamily="18" charset="0"/>
                                     <a:cs typeface="Arial" panose="020B0604020202020204" pitchFamily="34" charset="0"/>
                                   </a:rPr>
                                 </m:ctrlPr>
@@ -30250,7 +30250,7 @@
                                     <m:chr m:val="⃗"/>
                                     <m:ctrlPr>
                                       <a:rPr lang="en-US" sz="2000" b="0" i="1" smtClean="0">
-                                        <a:latin typeface="Cambria Math" charset="0"/>
+                                        <a:latin typeface="Cambria Math" panose="02040503050406030204" pitchFamily="18" charset="0"/>
                                         <a:cs typeface="Arial" panose="020B0604020202020204" pitchFamily="34" charset="0"/>
                                       </a:rPr>
                                     </m:ctrlPr>
@@ -30398,7 +30398,7 @@
                                 <m:chr m:val="⃗"/>
                                 <m:ctrlPr>
                                   <a:rPr lang="en-US" sz="2000" b="0" i="1" smtClean="0">
-                                    <a:latin typeface="Cambria Math" charset="0"/>
+                                    <a:latin typeface="Cambria Math" panose="02040503050406030204" pitchFamily="18" charset="0"/>
                                     <a:cs typeface="Arial" panose="020B0604020202020204" pitchFamily="34" charset="0"/>
                                   </a:rPr>
                                 </m:ctrlPr>
@@ -30916,7 +30916,7 @@
                             <m:chr m:val="⃗"/>
                             <m:ctrlPr>
                               <a:rPr lang="en-US" sz="2000" b="0" i="1" smtClean="0">
-                                <a:latin typeface="Cambria Math" charset="0"/>
+                                <a:latin typeface="Cambria Math" panose="02040503050406030204" pitchFamily="18" charset="0"/>
                                 <a:cs typeface="Arial" panose="020B0604020202020204" pitchFamily="34" charset="0"/>
                               </a:rPr>
                             </m:ctrlPr>
@@ -30963,6 +30963,746 @@
                   <a:blip r:embed="rId30"/>
                   <a:stretch>
                     <a:fillRect l="-27273" t="-33333" r="-93939" b="-5882"/>
+                  </a:stretch>
+                </a:blipFill>
+              </p:spPr>
+              <p:txBody>
+                <a:bodyPr/>
+                <a:lstStyle/>
+                <a:p>
+                  <a:r>
+                    <a:rPr lang="en-US">
+                      <a:noFill/>
+                    </a:rPr>
+                    <a:t> </a:t>
+                  </a:r>
+                </a:p>
+              </p:txBody>
+            </p:sp>
+          </mc:Fallback>
+        </mc:AlternateContent>
+      </p:grpSp>
+      <p:grpSp>
+        <p:nvGrpSpPr>
+          <p:cNvPr id="54" name="Group 53"/>
+          <p:cNvGrpSpPr/>
+          <p:nvPr/>
+        </p:nvGrpSpPr>
+        <p:grpSpPr>
+          <a:xfrm>
+            <a:off x="8101250" y="1573162"/>
+            <a:ext cx="2265263" cy="1985047"/>
+            <a:chOff x="8101250" y="1573162"/>
+            <a:chExt cx="2265263" cy="1985047"/>
+          </a:xfrm>
+        </p:grpSpPr>
+        <p:sp>
+          <p:nvSpPr>
+            <p:cNvPr id="10" name="Oval 9"/>
+            <p:cNvSpPr/>
+            <p:nvPr/>
+          </p:nvSpPr>
+          <p:spPr>
+            <a:xfrm>
+              <a:off x="8169965" y="2474753"/>
+              <a:ext cx="2196548" cy="343676"/>
+            </a:xfrm>
+            <a:prstGeom prst="ellipse">
+              <a:avLst/>
+            </a:prstGeom>
+            <a:solidFill>
+              <a:schemeClr val="bg2">
+                <a:lumMod val="90000"/>
+              </a:schemeClr>
+            </a:solidFill>
+            <a:ln w="38100">
+              <a:solidFill>
+                <a:schemeClr val="tx1"/>
+              </a:solidFill>
+            </a:ln>
+          </p:spPr>
+          <p:style>
+            <a:lnRef idx="2">
+              <a:schemeClr val="accent1">
+                <a:shade val="50000"/>
+              </a:schemeClr>
+            </a:lnRef>
+            <a:fillRef idx="1">
+              <a:schemeClr val="accent1"/>
+            </a:fillRef>
+            <a:effectRef idx="0">
+              <a:schemeClr val="accent1"/>
+            </a:effectRef>
+            <a:fontRef idx="minor">
+              <a:schemeClr val="lt1"/>
+            </a:fontRef>
+          </p:style>
+          <p:txBody>
+            <a:bodyPr rtlCol="0" anchor="ctr"/>
+            <a:lstStyle/>
+            <a:p>
+              <a:pPr algn="ctr"/>
+              <a:endParaRPr lang="en-US"/>
+            </a:p>
+          </p:txBody>
+        </p:sp>
+        <p:cxnSp>
+          <p:nvCxnSpPr>
+            <p:cNvPr id="3" name="Straight Connector 2"/>
+            <p:cNvCxnSpPr/>
+            <p:nvPr/>
+          </p:nvCxnSpPr>
+          <p:spPr>
+            <a:xfrm>
+              <a:off x="9268239" y="1573162"/>
+              <a:ext cx="4969" cy="1073429"/>
+            </a:xfrm>
+            <a:prstGeom prst="line">
+              <a:avLst/>
+            </a:prstGeom>
+            <a:ln w="38100">
+              <a:solidFill>
+                <a:schemeClr val="tx1"/>
+              </a:solidFill>
+            </a:ln>
+          </p:spPr>
+          <p:style>
+            <a:lnRef idx="1">
+              <a:schemeClr val="accent1"/>
+            </a:lnRef>
+            <a:fillRef idx="0">
+              <a:schemeClr val="accent1"/>
+            </a:fillRef>
+            <a:effectRef idx="0">
+              <a:schemeClr val="accent1"/>
+            </a:effectRef>
+            <a:fontRef idx="minor">
+              <a:schemeClr val="tx1"/>
+            </a:fontRef>
+          </p:style>
+        </p:cxnSp>
+        <p:cxnSp>
+          <p:nvCxnSpPr>
+            <p:cNvPr id="55" name="Straight Connector 54"/>
+            <p:cNvCxnSpPr/>
+            <p:nvPr/>
+          </p:nvCxnSpPr>
+          <p:spPr>
+            <a:xfrm flipH="1">
+              <a:off x="9273208" y="2828261"/>
+              <a:ext cx="2" cy="729948"/>
+            </a:xfrm>
+            <a:prstGeom prst="line">
+              <a:avLst/>
+            </a:prstGeom>
+            <a:ln w="38100">
+              <a:solidFill>
+                <a:schemeClr val="tx1"/>
+              </a:solidFill>
+            </a:ln>
+          </p:spPr>
+          <p:style>
+            <a:lnRef idx="1">
+              <a:schemeClr val="accent1"/>
+            </a:lnRef>
+            <a:fillRef idx="0">
+              <a:schemeClr val="accent1"/>
+            </a:fillRef>
+            <a:effectRef idx="0">
+              <a:schemeClr val="accent1"/>
+            </a:effectRef>
+            <a:fontRef idx="minor">
+              <a:schemeClr val="tx1"/>
+            </a:fontRef>
+          </p:style>
+        </p:cxnSp>
+        <p:cxnSp>
+          <p:nvCxnSpPr>
+            <p:cNvPr id="24" name="Straight Connector 23"/>
+            <p:cNvCxnSpPr/>
+            <p:nvPr/>
+          </p:nvCxnSpPr>
+          <p:spPr>
+            <a:xfrm>
+              <a:off x="9273849" y="2646591"/>
+              <a:ext cx="0" cy="171838"/>
+            </a:xfrm>
+            <a:prstGeom prst="line">
+              <a:avLst/>
+            </a:prstGeom>
+            <a:ln w="38100">
+              <a:solidFill>
+                <a:schemeClr val="tx1"/>
+              </a:solidFill>
+              <a:prstDash val="sysDot"/>
+            </a:ln>
+          </p:spPr>
+          <p:style>
+            <a:lnRef idx="1">
+              <a:schemeClr val="accent1"/>
+            </a:lnRef>
+            <a:fillRef idx="0">
+              <a:schemeClr val="accent1"/>
+            </a:fillRef>
+            <a:effectRef idx="0">
+              <a:schemeClr val="accent1"/>
+            </a:effectRef>
+            <a:fontRef idx="minor">
+              <a:schemeClr val="tx1"/>
+            </a:fontRef>
+          </p:style>
+        </p:cxnSp>
+        <p:sp>
+          <p:nvSpPr>
+            <p:cNvPr id="28" name="Arc 27"/>
+            <p:cNvSpPr/>
+            <p:nvPr/>
+          </p:nvSpPr>
+          <p:spPr>
+            <a:xfrm>
+              <a:off x="8958876" y="1659942"/>
+              <a:ext cx="706837" cy="165881"/>
+            </a:xfrm>
+            <a:prstGeom prst="arc">
+              <a:avLst>
+                <a:gd name="adj1" fmla="val 19822531"/>
+                <a:gd name="adj2" fmla="val 10466937"/>
+              </a:avLst>
+            </a:prstGeom>
+            <a:ln w="28575">
+              <a:solidFill>
+                <a:schemeClr val="tx1"/>
+              </a:solidFill>
+              <a:prstDash val="sysDash"/>
+              <a:headEnd type="triangle" w="med" len="med"/>
+              <a:tailEnd type="none" w="med" len="med"/>
+            </a:ln>
+          </p:spPr>
+          <p:style>
+            <a:lnRef idx="1">
+              <a:schemeClr val="accent1"/>
+            </a:lnRef>
+            <a:fillRef idx="0">
+              <a:schemeClr val="accent1"/>
+            </a:fillRef>
+            <a:effectRef idx="0">
+              <a:schemeClr val="accent1"/>
+            </a:effectRef>
+            <a:fontRef idx="minor">
+              <a:schemeClr val="tx1"/>
+            </a:fontRef>
+          </p:style>
+          <p:txBody>
+            <a:bodyPr rtlCol="0" anchor="ctr"/>
+            <a:lstStyle/>
+            <a:p>
+              <a:pPr algn="ctr"/>
+              <a:endParaRPr lang="en-US"/>
+            </a:p>
+          </p:txBody>
+        </p:sp>
+        <p:sp>
+          <p:nvSpPr>
+            <p:cNvPr id="29" name="Oval 28"/>
+            <p:cNvSpPr/>
+            <p:nvPr/>
+          </p:nvSpPr>
+          <p:spPr>
+            <a:xfrm>
+              <a:off x="8526305" y="2758817"/>
+              <a:ext cx="45719" cy="45719"/>
+            </a:xfrm>
+            <a:prstGeom prst="ellipse">
+              <a:avLst/>
+            </a:prstGeom>
+            <a:solidFill>
+              <a:srgbClr val="FF0000"/>
+            </a:solidFill>
+            <a:ln w="38100">
+              <a:solidFill>
+                <a:srgbClr val="FF0000"/>
+              </a:solidFill>
+            </a:ln>
+          </p:spPr>
+          <p:style>
+            <a:lnRef idx="2">
+              <a:schemeClr val="accent1">
+                <a:shade val="50000"/>
+              </a:schemeClr>
+            </a:lnRef>
+            <a:fillRef idx="1">
+              <a:schemeClr val="accent1"/>
+            </a:fillRef>
+            <a:effectRef idx="0">
+              <a:schemeClr val="accent1"/>
+            </a:effectRef>
+            <a:fontRef idx="minor">
+              <a:schemeClr val="lt1"/>
+            </a:fontRef>
+          </p:style>
+          <p:txBody>
+            <a:bodyPr rtlCol="0" anchor="ctr"/>
+            <a:lstStyle/>
+            <a:p>
+              <a:pPr algn="ctr"/>
+              <a:endParaRPr lang="en-US"/>
+            </a:p>
+          </p:txBody>
+        </p:sp>
+        <p:sp>
+          <p:nvSpPr>
+            <p:cNvPr id="63" name="Oval 62"/>
+            <p:cNvSpPr/>
+            <p:nvPr/>
+          </p:nvSpPr>
+          <p:spPr>
+            <a:xfrm>
+              <a:off x="9620835" y="2684426"/>
+              <a:ext cx="45719" cy="45719"/>
+            </a:xfrm>
+            <a:prstGeom prst="ellipse">
+              <a:avLst/>
+            </a:prstGeom>
+            <a:solidFill>
+              <a:srgbClr val="FF0000"/>
+            </a:solidFill>
+            <a:ln w="38100">
+              <a:solidFill>
+                <a:srgbClr val="FF0000"/>
+              </a:solidFill>
+            </a:ln>
+          </p:spPr>
+          <p:style>
+            <a:lnRef idx="2">
+              <a:schemeClr val="accent1">
+                <a:shade val="50000"/>
+              </a:schemeClr>
+            </a:lnRef>
+            <a:fillRef idx="1">
+              <a:schemeClr val="accent1"/>
+            </a:fillRef>
+            <a:effectRef idx="0">
+              <a:schemeClr val="accent1"/>
+            </a:effectRef>
+            <a:fontRef idx="minor">
+              <a:schemeClr val="lt1"/>
+            </a:fontRef>
+          </p:style>
+          <p:txBody>
+            <a:bodyPr rtlCol="0" anchor="ctr"/>
+            <a:lstStyle/>
+            <a:p>
+              <a:pPr algn="ctr"/>
+              <a:endParaRPr lang="en-US"/>
+            </a:p>
+          </p:txBody>
+        </p:sp>
+        <p:cxnSp>
+          <p:nvCxnSpPr>
+            <p:cNvPr id="33" name="Straight Connector 32"/>
+            <p:cNvCxnSpPr>
+              <a:endCxn id="63" idx="2"/>
+            </p:cNvCxnSpPr>
+            <p:nvPr/>
+          </p:nvCxnSpPr>
+          <p:spPr>
+            <a:xfrm>
+              <a:off x="9270723" y="2674594"/>
+              <a:ext cx="350112" cy="32692"/>
+            </a:xfrm>
+            <a:prstGeom prst="line">
+              <a:avLst/>
+            </a:prstGeom>
+            <a:ln w="12700">
+              <a:solidFill>
+                <a:schemeClr val="tx1"/>
+              </a:solidFill>
+              <a:prstDash val="sysDot"/>
+            </a:ln>
+          </p:spPr>
+          <p:style>
+            <a:lnRef idx="1">
+              <a:schemeClr val="accent1"/>
+            </a:lnRef>
+            <a:fillRef idx="0">
+              <a:schemeClr val="accent1"/>
+            </a:fillRef>
+            <a:effectRef idx="0">
+              <a:schemeClr val="accent1"/>
+            </a:effectRef>
+            <a:fontRef idx="minor">
+              <a:schemeClr val="tx1"/>
+            </a:fontRef>
+          </p:style>
+        </p:cxnSp>
+        <p:cxnSp>
+          <p:nvCxnSpPr>
+            <p:cNvPr id="67" name="Straight Connector 66"/>
+            <p:cNvCxnSpPr>
+              <a:stCxn id="29" idx="7"/>
+            </p:cNvCxnSpPr>
+            <p:nvPr/>
+          </p:nvCxnSpPr>
+          <p:spPr>
+            <a:xfrm flipV="1">
+              <a:off x="8565329" y="2670304"/>
+              <a:ext cx="711647" cy="95208"/>
+            </a:xfrm>
+            <a:prstGeom prst="line">
+              <a:avLst/>
+            </a:prstGeom>
+            <a:ln w="12700">
+              <a:solidFill>
+                <a:schemeClr val="tx1"/>
+              </a:solidFill>
+              <a:prstDash val="sysDot"/>
+            </a:ln>
+          </p:spPr>
+          <p:style>
+            <a:lnRef idx="1">
+              <a:schemeClr val="accent1"/>
+            </a:lnRef>
+            <a:fillRef idx="0">
+              <a:schemeClr val="accent1"/>
+            </a:fillRef>
+            <a:effectRef idx="0">
+              <a:schemeClr val="accent1"/>
+            </a:effectRef>
+            <a:fontRef idx="minor">
+              <a:schemeClr val="tx1"/>
+            </a:fontRef>
+          </p:style>
+        </p:cxnSp>
+        <mc:AlternateContent xmlns:mc="http://schemas.openxmlformats.org/markup-compatibility/2006">
+          <mc:Choice xmlns:a14="http://schemas.microsoft.com/office/drawing/2010/main" Requires="a14">
+            <p:sp>
+              <p:nvSpPr>
+                <p:cNvPr id="41" name="TextBox 40"/>
+                <p:cNvSpPr txBox="1"/>
+                <p:nvPr/>
+              </p:nvSpPr>
+              <p:spPr>
+                <a:xfrm>
+                  <a:off x="8101250" y="2755369"/>
+                  <a:ext cx="234936" cy="307777"/>
+                </a:xfrm>
+                <a:prstGeom prst="rect">
+                  <a:avLst/>
+                </a:prstGeom>
+                <a:noFill/>
+              </p:spPr>
+              <p:txBody>
+                <a:bodyPr wrap="none" lIns="0" tIns="0" rIns="0" bIns="0" rtlCol="0">
+                  <a:spAutoFit/>
+                </a:bodyPr>
+                <a:lstStyle/>
+                <a:p>
+                  <a14:m>
+                    <m:oMathPara xmlns:m="http://schemas.openxmlformats.org/officeDocument/2006/math">
+                      <m:oMathParaPr>
+                        <m:jc m:val="centerGroup"/>
+                      </m:oMathParaPr>
+                      <m:oMath xmlns:m="http://schemas.openxmlformats.org/officeDocument/2006/math">
+                        <m:r>
+                          <a:rPr lang="en-US" sz="2000" b="0" i="1" smtClean="0">
+                            <a:latin typeface="Cambria Math" panose="02040503050406030204" pitchFamily="18" charset="0"/>
+                            <a:cs typeface="Arial" panose="020B0604020202020204" pitchFamily="34" charset="0"/>
+                          </a:rPr>
+                          <m:t>𝐴</m:t>
+                        </m:r>
+                      </m:oMath>
+                    </m:oMathPara>
+                  </a14:m>
+                  <a:endParaRPr lang="en-US" sz="2000" dirty="0" smtClean="0">
+                    <a:latin typeface="Arial" panose="020B0604020202020204" pitchFamily="34" charset="0"/>
+                    <a:cs typeface="Arial" panose="020B0604020202020204" pitchFamily="34" charset="0"/>
+                  </a:endParaRPr>
+                </a:p>
+              </p:txBody>
+            </p:sp>
+          </mc:Choice>
+          <mc:Fallback>
+            <p:sp>
+              <p:nvSpPr>
+                <p:cNvPr id="41" name="TextBox 40"/>
+                <p:cNvSpPr txBox="1">
+                  <a:spLocks noRot="1" noChangeAspect="1" noMove="1" noResize="1" noEditPoints="1" noAdjustHandles="1" noChangeArrowheads="1" noChangeShapeType="1" noTextEdit="1"/>
+                </p:cNvSpPr>
+                <p:nvPr/>
+              </p:nvSpPr>
+              <p:spPr>
+                <a:xfrm>
+                  <a:off x="8101250" y="2755369"/>
+                  <a:ext cx="234936" cy="307777"/>
+                </a:xfrm>
+                <a:prstGeom prst="rect">
+                  <a:avLst/>
+                </a:prstGeom>
+                <a:blipFill>
+                  <a:blip r:embed="rId31"/>
+                  <a:stretch>
+                    <a:fillRect l="-23684" r="-23684" b="-10000"/>
+                  </a:stretch>
+                </a:blipFill>
+              </p:spPr>
+              <p:txBody>
+                <a:bodyPr/>
+                <a:lstStyle/>
+                <a:p>
+                  <a:r>
+                    <a:rPr lang="en-US">
+                      <a:noFill/>
+                    </a:rPr>
+                    <a:t> </a:t>
+                  </a:r>
+                </a:p>
+              </p:txBody>
+            </p:sp>
+          </mc:Fallback>
+        </mc:AlternateContent>
+        <mc:AlternateContent xmlns:mc="http://schemas.openxmlformats.org/markup-compatibility/2006">
+          <mc:Choice xmlns:a14="http://schemas.microsoft.com/office/drawing/2010/main" Requires="a14">
+            <p:sp>
+              <p:nvSpPr>
+                <p:cNvPr id="79" name="TextBox 78"/>
+                <p:cNvSpPr txBox="1"/>
+                <p:nvPr/>
+              </p:nvSpPr>
+              <p:spPr>
+                <a:xfrm>
+                  <a:off x="9643694" y="2785929"/>
+                  <a:ext cx="245708" cy="307777"/>
+                </a:xfrm>
+                <a:prstGeom prst="rect">
+                  <a:avLst/>
+                </a:prstGeom>
+                <a:noFill/>
+              </p:spPr>
+              <p:txBody>
+                <a:bodyPr wrap="none" lIns="0" tIns="0" rIns="0" bIns="0" rtlCol="0">
+                  <a:spAutoFit/>
+                </a:bodyPr>
+                <a:lstStyle/>
+                <a:p>
+                  <a14:m>
+                    <m:oMathPara xmlns:m="http://schemas.openxmlformats.org/officeDocument/2006/math">
+                      <m:oMathParaPr>
+                        <m:jc m:val="centerGroup"/>
+                      </m:oMathParaPr>
+                      <m:oMath xmlns:m="http://schemas.openxmlformats.org/officeDocument/2006/math">
+                        <m:r>
+                          <a:rPr lang="en-US" sz="2000" b="0" i="1" smtClean="0">
+                            <a:latin typeface="Cambria Math" panose="02040503050406030204" pitchFamily="18" charset="0"/>
+                            <a:cs typeface="Arial" panose="020B0604020202020204" pitchFamily="34" charset="0"/>
+                          </a:rPr>
+                          <m:t>𝐵</m:t>
+                        </m:r>
+                      </m:oMath>
+                    </m:oMathPara>
+                  </a14:m>
+                  <a:endParaRPr lang="en-US" sz="2000" dirty="0" smtClean="0">
+                    <a:latin typeface="Arial" panose="020B0604020202020204" pitchFamily="34" charset="0"/>
+                    <a:cs typeface="Arial" panose="020B0604020202020204" pitchFamily="34" charset="0"/>
+                  </a:endParaRPr>
+                </a:p>
+              </p:txBody>
+            </p:sp>
+          </mc:Choice>
+          <mc:Fallback>
+            <p:sp>
+              <p:nvSpPr>
+                <p:cNvPr id="79" name="TextBox 78"/>
+                <p:cNvSpPr txBox="1">
+                  <a:spLocks noRot="1" noChangeAspect="1" noMove="1" noResize="1" noEditPoints="1" noAdjustHandles="1" noChangeArrowheads="1" noChangeShapeType="1" noTextEdit="1"/>
+                </p:cNvSpPr>
+                <p:nvPr/>
+              </p:nvSpPr>
+              <p:spPr>
+                <a:xfrm>
+                  <a:off x="9643694" y="2785929"/>
+                  <a:ext cx="245708" cy="307777"/>
+                </a:xfrm>
+                <a:prstGeom prst="rect">
+                  <a:avLst/>
+                </a:prstGeom>
+                <a:blipFill>
+                  <a:blip r:embed="rId32"/>
+                  <a:stretch>
+                    <a:fillRect l="-22500" r="-20000" b="-12000"/>
+                  </a:stretch>
+                </a:blipFill>
+              </p:spPr>
+              <p:txBody>
+                <a:bodyPr/>
+                <a:lstStyle/>
+                <a:p>
+                  <a:r>
+                    <a:rPr lang="en-US">
+                      <a:noFill/>
+                    </a:rPr>
+                    <a:t> </a:t>
+                  </a:r>
+                </a:p>
+              </p:txBody>
+            </p:sp>
+          </mc:Fallback>
+        </mc:AlternateContent>
+        <mc:AlternateContent xmlns:mc="http://schemas.openxmlformats.org/markup-compatibility/2006">
+          <mc:Choice xmlns:a14="http://schemas.microsoft.com/office/drawing/2010/main" Requires="a14">
+            <p:sp>
+              <p:nvSpPr>
+                <p:cNvPr id="46" name="TextBox 45"/>
+                <p:cNvSpPr txBox="1"/>
+                <p:nvPr/>
+              </p:nvSpPr>
+              <p:spPr>
+                <a:xfrm>
+                  <a:off x="8726171" y="2451040"/>
+                  <a:ext cx="241540" cy="307777"/>
+                </a:xfrm>
+                <a:prstGeom prst="rect">
+                  <a:avLst/>
+                </a:prstGeom>
+                <a:noFill/>
+              </p:spPr>
+              <p:txBody>
+                <a:bodyPr wrap="none" lIns="0" tIns="0" rIns="0" bIns="0" rtlCol="0">
+                  <a:spAutoFit/>
+                </a:bodyPr>
+                <a:lstStyle/>
+                <a:p>
+                  <a14:m>
+                    <m:oMathPara xmlns:m="http://schemas.openxmlformats.org/officeDocument/2006/math">
+                      <m:oMathParaPr>
+                        <m:jc m:val="centerGroup"/>
+                      </m:oMathParaPr>
+                      <m:oMath xmlns:m="http://schemas.openxmlformats.org/officeDocument/2006/math">
+                        <m:r>
+                          <a:rPr lang="en-US" sz="2000" b="0" i="1" smtClean="0">
+                            <a:latin typeface="Cambria Math" panose="02040503050406030204" pitchFamily="18" charset="0"/>
+                            <a:cs typeface="Arial" panose="020B0604020202020204" pitchFamily="34" charset="0"/>
+                          </a:rPr>
+                          <m:t>𝑅</m:t>
+                        </m:r>
+                      </m:oMath>
+                    </m:oMathPara>
+                  </a14:m>
+                  <a:endParaRPr lang="en-US" sz="2000" dirty="0" smtClean="0">
+                    <a:latin typeface="Arial" panose="020B0604020202020204" pitchFamily="34" charset="0"/>
+                    <a:cs typeface="Arial" panose="020B0604020202020204" pitchFamily="34" charset="0"/>
+                  </a:endParaRPr>
+                </a:p>
+              </p:txBody>
+            </p:sp>
+          </mc:Choice>
+          <mc:Fallback>
+            <p:sp>
+              <p:nvSpPr>
+                <p:cNvPr id="46" name="TextBox 45"/>
+                <p:cNvSpPr txBox="1">
+                  <a:spLocks noRot="1" noChangeAspect="1" noMove="1" noResize="1" noEditPoints="1" noAdjustHandles="1" noChangeArrowheads="1" noChangeShapeType="1" noTextEdit="1"/>
+                </p:cNvSpPr>
+                <p:nvPr/>
+              </p:nvSpPr>
+              <p:spPr>
+                <a:xfrm>
+                  <a:off x="8726171" y="2451040"/>
+                  <a:ext cx="241540" cy="307777"/>
+                </a:xfrm>
+                <a:prstGeom prst="rect">
+                  <a:avLst/>
+                </a:prstGeom>
+                <a:blipFill>
+                  <a:blip r:embed="rId33"/>
+                  <a:stretch>
+                    <a:fillRect l="-20000" r="-20000" b="-9804"/>
+                  </a:stretch>
+                </a:blipFill>
+              </p:spPr>
+              <p:txBody>
+                <a:bodyPr/>
+                <a:lstStyle/>
+                <a:p>
+                  <a:r>
+                    <a:rPr lang="en-US">
+                      <a:noFill/>
+                    </a:rPr>
+                    <a:t> </a:t>
+                  </a:r>
+                </a:p>
+              </p:txBody>
+            </p:sp>
+          </mc:Fallback>
+        </mc:AlternateContent>
+        <mc:AlternateContent xmlns:mc="http://schemas.openxmlformats.org/markup-compatibility/2006">
+          <mc:Choice xmlns:a14="http://schemas.microsoft.com/office/drawing/2010/main" Requires="a14">
+            <p:sp>
+              <p:nvSpPr>
+                <p:cNvPr id="82" name="TextBox 81"/>
+                <p:cNvSpPr txBox="1"/>
+                <p:nvPr/>
+              </p:nvSpPr>
+              <p:spPr>
+                <a:xfrm>
+                  <a:off x="9393272" y="2422368"/>
+                  <a:ext cx="198003" cy="307777"/>
+                </a:xfrm>
+                <a:prstGeom prst="rect">
+                  <a:avLst/>
+                </a:prstGeom>
+                <a:noFill/>
+              </p:spPr>
+              <p:txBody>
+                <a:bodyPr wrap="none" lIns="0" tIns="0" rIns="0" bIns="0" rtlCol="0">
+                  <a:spAutoFit/>
+                </a:bodyPr>
+                <a:lstStyle/>
+                <a:p>
+                  <a14:m>
+                    <m:oMathPara xmlns:m="http://schemas.openxmlformats.org/officeDocument/2006/math">
+                      <m:oMathParaPr>
+                        <m:jc m:val="centerGroup"/>
+                      </m:oMathParaPr>
+                      <m:oMath xmlns:m="http://schemas.openxmlformats.org/officeDocument/2006/math">
+                        <m:r>
+                          <a:rPr lang="en-US" sz="2000" b="0" i="1" smtClean="0">
+                            <a:latin typeface="Cambria Math" panose="02040503050406030204" pitchFamily="18" charset="0"/>
+                            <a:cs typeface="Arial" panose="020B0604020202020204" pitchFamily="34" charset="0"/>
+                          </a:rPr>
+                          <m:t>𝑟</m:t>
+                        </m:r>
+                      </m:oMath>
+                    </m:oMathPara>
+                  </a14:m>
+                  <a:endParaRPr lang="en-US" sz="2000" dirty="0" smtClean="0">
+                    <a:latin typeface="Arial" panose="020B0604020202020204" pitchFamily="34" charset="0"/>
+                    <a:cs typeface="Arial" panose="020B0604020202020204" pitchFamily="34" charset="0"/>
+                  </a:endParaRPr>
+                </a:p>
+              </p:txBody>
+            </p:sp>
+          </mc:Choice>
+          <mc:Fallback>
+            <p:sp>
+              <p:nvSpPr>
+                <p:cNvPr id="82" name="TextBox 81"/>
+                <p:cNvSpPr txBox="1">
+                  <a:spLocks noRot="1" noChangeAspect="1" noMove="1" noResize="1" noEditPoints="1" noAdjustHandles="1" noChangeArrowheads="1" noChangeShapeType="1" noTextEdit="1"/>
+                </p:cNvSpPr>
+                <p:nvPr/>
+              </p:nvSpPr>
+              <p:spPr>
+                <a:xfrm>
+                  <a:off x="9393272" y="2422368"/>
+                  <a:ext cx="198003" cy="307777"/>
+                </a:xfrm>
+                <a:prstGeom prst="rect">
+                  <a:avLst/>
+                </a:prstGeom>
+                <a:blipFill>
+                  <a:blip r:embed="rId34"/>
+                  <a:stretch>
+                    <a:fillRect l="-15625" r="-12500" b="-1961"/>
                   </a:stretch>
                 </a:blipFill>
               </p:spPr>
@@ -31343,7 +32083,7 @@
                                 <m:chr m:val="⃗"/>
                                 <m:ctrlPr>
                                   <a:rPr lang="en-US" sz="2000" b="0" i="1" smtClean="0">
-                                    <a:latin typeface="Cambria Math" charset="0"/>
+                                    <a:latin typeface="Cambria Math" panose="02040503050406030204" pitchFamily="18" charset="0"/>
                                     <a:cs typeface="Arial" panose="020B0604020202020204" pitchFamily="34" charset="0"/>
                                   </a:rPr>
                                 </m:ctrlPr>
@@ -31554,7 +32294,7 @@
                                 <m:chr m:val="⃗"/>
                                 <m:ctrlPr>
                                   <a:rPr lang="en-US" sz="2000" b="0" i="1" smtClean="0">
-                                    <a:latin typeface="Cambria Math" charset="0"/>
+                                    <a:latin typeface="Cambria Math" panose="02040503050406030204" pitchFamily="18" charset="0"/>
                                     <a:cs typeface="Arial" panose="020B0604020202020204" pitchFamily="34" charset="0"/>
                                   </a:rPr>
                                 </m:ctrlPr>
@@ -31654,7 +32394,7 @@
                               <m:sSubPr>
                                 <m:ctrlPr>
                                   <a:rPr lang="en-US" sz="2000" b="0" i="1" smtClean="0">
-                                    <a:latin typeface="Cambria Math" charset="0"/>
+                                    <a:latin typeface="Cambria Math" panose="02040503050406030204" pitchFamily="18" charset="0"/>
                                     <a:cs typeface="Arial" panose="020B0604020202020204" pitchFamily="34" charset="0"/>
                                   </a:rPr>
                                 </m:ctrlPr>
@@ -31665,7 +32405,7 @@
                                     <m:chr m:val="⃗"/>
                                     <m:ctrlPr>
                                       <a:rPr lang="en-US" sz="2000" b="0" i="1" smtClean="0">
-                                        <a:latin typeface="Cambria Math" charset="0"/>
+                                        <a:latin typeface="Cambria Math" panose="02040503050406030204" pitchFamily="18" charset="0"/>
                                         <a:cs typeface="Arial" panose="020B0604020202020204" pitchFamily="34" charset="0"/>
                                       </a:rPr>
                                     </m:ctrlPr>
@@ -31776,7 +32516,7 @@
                               <m:sSubPr>
                                 <m:ctrlPr>
                                   <a:rPr lang="en-US" sz="2000" b="0" i="1" smtClean="0">
-                                    <a:latin typeface="Cambria Math" charset="0"/>
+                                    <a:latin typeface="Cambria Math" panose="02040503050406030204" pitchFamily="18" charset="0"/>
                                     <a:cs typeface="Arial" panose="020B0604020202020204" pitchFamily="34" charset="0"/>
                                   </a:rPr>
                                 </m:ctrlPr>
@@ -31787,7 +32527,7 @@
                                     <m:chr m:val="⃗"/>
                                     <m:ctrlPr>
                                       <a:rPr lang="en-US" sz="2000" b="0" i="1" smtClean="0">
-                                        <a:latin typeface="Cambria Math" charset="0"/>
+                                        <a:latin typeface="Cambria Math" panose="02040503050406030204" pitchFamily="18" charset="0"/>
                                         <a:cs typeface="Arial" panose="020B0604020202020204" pitchFamily="34" charset="0"/>
                                       </a:rPr>
                                     </m:ctrlPr>
@@ -32386,7 +33126,7 @@
                           <m:sSubPr>
                             <m:ctrlPr>
                               <a:rPr lang="en-US" sz="2000" b="0" i="1" smtClean="0">
-                                <a:latin typeface="Cambria Math" charset="0"/>
+                                <a:latin typeface="Cambria Math" panose="02040503050406030204" pitchFamily="18" charset="0"/>
                                 <a:cs typeface="Arial" panose="020B0604020202020204" pitchFamily="34" charset="0"/>
                               </a:rPr>
                             </m:ctrlPr>
@@ -32397,7 +33137,7 @@
                                 <m:chr m:val="⃗"/>
                                 <m:ctrlPr>
                                   <a:rPr lang="en-US" sz="2000" b="0" i="1" smtClean="0">
-                                    <a:latin typeface="Cambria Math" charset="0"/>
+                                    <a:latin typeface="Cambria Math" panose="02040503050406030204" pitchFamily="18" charset="0"/>
                                     <a:cs typeface="Arial" panose="020B0604020202020204" pitchFamily="34" charset="0"/>
                                   </a:rPr>
                                 </m:ctrlPr>
@@ -32508,7 +33248,7 @@
                           <m:sSubPr>
                             <m:ctrlPr>
                               <a:rPr lang="en-US" sz="2000" b="0" i="1" smtClean="0">
-                                <a:latin typeface="Cambria Math" charset="0"/>
+                                <a:latin typeface="Cambria Math" panose="02040503050406030204" pitchFamily="18" charset="0"/>
                                 <a:cs typeface="Arial" panose="020B0604020202020204" pitchFamily="34" charset="0"/>
                               </a:rPr>
                             </m:ctrlPr>
@@ -32519,7 +33259,7 @@
                                 <m:chr m:val="⃗"/>
                                 <m:ctrlPr>
                                   <a:rPr lang="en-US" sz="2000" b="0" i="1" smtClean="0">
-                                    <a:latin typeface="Cambria Math" charset="0"/>
+                                    <a:latin typeface="Cambria Math" panose="02040503050406030204" pitchFamily="18" charset="0"/>
                                     <a:cs typeface="Arial" panose="020B0604020202020204" pitchFamily="34" charset="0"/>
                                   </a:rPr>
                                 </m:ctrlPr>
@@ -32630,7 +33370,7 @@
                           <m:sSubPr>
                             <m:ctrlPr>
                               <a:rPr lang="en-US" sz="2000" b="0" i="1" smtClean="0">
-                                <a:latin typeface="Cambria Math" charset="0"/>
+                                <a:latin typeface="Cambria Math" panose="02040503050406030204" pitchFamily="18" charset="0"/>
                                 <a:cs typeface="Arial" panose="020B0604020202020204" pitchFamily="34" charset="0"/>
                               </a:rPr>
                             </m:ctrlPr>
@@ -32641,7 +33381,7 @@
                                 <m:chr m:val="⃗"/>
                                 <m:ctrlPr>
                                   <a:rPr lang="en-US" sz="2000" b="0" i="1" smtClean="0">
-                                    <a:latin typeface="Cambria Math" charset="0"/>
+                                    <a:latin typeface="Cambria Math" panose="02040503050406030204" pitchFamily="18" charset="0"/>
                                     <a:cs typeface="Arial" panose="020B0604020202020204" pitchFamily="34" charset="0"/>
                                   </a:rPr>
                                 </m:ctrlPr>
@@ -33071,7 +33811,7 @@
                               <m:fPr>
                                 <m:ctrlPr>
                                   <a:rPr lang="en-US" sz="2000" b="0" i="1" smtClean="0">
-                                    <a:latin typeface="Cambria Math" charset="0"/>
+                                    <a:latin typeface="Cambria Math" panose="02040503050406030204" pitchFamily="18" charset="0"/>
                                     <a:cs typeface="Arial" panose="020B0604020202020204" pitchFamily="34" charset="0"/>
                                   </a:rPr>
                                 </m:ctrlPr>
@@ -33836,7 +34576,7 @@
                               <m:sSubPr>
                                 <m:ctrlPr>
                                   <a:rPr lang="en-US" sz="2000" b="0" i="1" smtClean="0">
-                                    <a:latin typeface="Cambria Math" charset="0"/>
+                                    <a:latin typeface="Cambria Math" panose="02040503050406030204" pitchFamily="18" charset="0"/>
                                     <a:cs typeface="Arial" panose="020B0604020202020204" pitchFamily="34" charset="0"/>
                                   </a:rPr>
                                 </m:ctrlPr>
@@ -33847,7 +34587,7 @@
                                     <m:chr m:val="⃗"/>
                                     <m:ctrlPr>
                                       <a:rPr lang="en-US" sz="2000" b="0" i="1" smtClean="0">
-                                        <a:latin typeface="Cambria Math" charset="0"/>
+                                        <a:latin typeface="Cambria Math" panose="02040503050406030204" pitchFamily="18" charset="0"/>
                                         <a:cs typeface="Arial" panose="020B0604020202020204" pitchFamily="34" charset="0"/>
                                       </a:rPr>
                                     </m:ctrlPr>
@@ -33959,7 +34699,7 @@
                                 <m:chr m:val="⃗"/>
                                 <m:ctrlPr>
                                   <a:rPr lang="en-US" sz="2000" b="0" i="1" smtClean="0">
-                                    <a:latin typeface="Cambria Math" charset="0"/>
+                                    <a:latin typeface="Cambria Math" panose="02040503050406030204" pitchFamily="18" charset="0"/>
                                     <a:cs typeface="Arial" panose="020B0604020202020204" pitchFamily="34" charset="0"/>
                                   </a:rPr>
                                 </m:ctrlPr>
@@ -34059,7 +34799,7 @@
                               <m:sSubPr>
                                 <m:ctrlPr>
                                   <a:rPr lang="en-US" sz="2000" b="0" i="1" smtClean="0">
-                                    <a:latin typeface="Cambria Math" charset="0"/>
+                                    <a:latin typeface="Cambria Math" panose="02040503050406030204" pitchFamily="18" charset="0"/>
                                     <a:cs typeface="Arial" panose="020B0604020202020204" pitchFamily="34" charset="0"/>
                                   </a:rPr>
                                 </m:ctrlPr>
@@ -34070,7 +34810,7 @@
                                     <m:chr m:val="⃗"/>
                                     <m:ctrlPr>
                                       <a:rPr lang="en-US" sz="2000" b="0" i="1" smtClean="0">
-                                        <a:latin typeface="Cambria Math" charset="0"/>
+                                        <a:latin typeface="Cambria Math" panose="02040503050406030204" pitchFamily="18" charset="0"/>
                                         <a:cs typeface="Arial" panose="020B0604020202020204" pitchFamily="34" charset="0"/>
                                       </a:rPr>
                                     </m:ctrlPr>
@@ -34229,7 +34969,7 @@
                               <m:sSubPr>
                                 <m:ctrlPr>
                                   <a:rPr lang="en-US" sz="2000" b="0" i="1" smtClean="0">
-                                    <a:latin typeface="Cambria Math" charset="0"/>
+                                    <a:latin typeface="Cambria Math" panose="02040503050406030204" pitchFamily="18" charset="0"/>
                                     <a:cs typeface="Arial" panose="020B0604020202020204" pitchFamily="34" charset="0"/>
                                   </a:rPr>
                                 </m:ctrlPr>
@@ -34240,7 +34980,7 @@
                                     <m:chr m:val="⃗"/>
                                     <m:ctrlPr>
                                       <a:rPr lang="en-US" sz="2000" b="0" i="1" smtClean="0">
-                                        <a:latin typeface="Cambria Math" charset="0"/>
+                                        <a:latin typeface="Cambria Math" panose="02040503050406030204" pitchFamily="18" charset="0"/>
                                         <a:cs typeface="Arial" panose="020B0604020202020204" pitchFamily="34" charset="0"/>
                                       </a:rPr>
                                     </m:ctrlPr>
@@ -34767,7 +35507,7 @@
                             <m:fPr>
                               <m:ctrlPr>
                                 <a:rPr lang="en-US" sz="2000" b="0" i="1" smtClean="0">
-                                  <a:latin typeface="Cambria Math" charset="0"/>
+                                  <a:latin typeface="Cambria Math" panose="02040503050406030204" pitchFamily="18" charset="0"/>
                                   <a:cs typeface="Arial" panose="020B0604020202020204" pitchFamily="34" charset="0"/>
                                 </a:rPr>
                               </m:ctrlPr>
@@ -35178,8 +35918,8 @@
               </a:p>
             </p:txBody>
           </p:sp>
-          <mc:AlternateContent xmlns:mc="http://schemas.openxmlformats.org/markup-compatibility/2006">
-            <mc:Choice xmlns:a14="http://schemas.microsoft.com/office/drawing/2010/main" Requires="a14">
+          <mc:AlternateContent xmlns:mc="http://schemas.openxmlformats.org/markup-compatibility/2006" xmlns:a14="http://schemas.microsoft.com/office/drawing/2010/main">
+            <mc:Choice Requires="a14">
               <p:sp>
                 <p:nvSpPr>
                   <p:cNvPr id="70" name="TextBox 69"/>
@@ -35227,7 +35967,7 @@
                 </p:txBody>
               </p:sp>
             </mc:Choice>
-            <mc:Fallback>
+            <mc:Fallback xmlns="">
               <p:sp>
                 <p:nvSpPr>
                   <p:cNvPr id="70" name="TextBox 69"/>
@@ -35276,7 +36016,7 @@
             <p:nvPr/>
           </p:nvPicPr>
           <p:blipFill rotWithShape="1">
-            <a:blip r:embed="rId34">
+            <a:blip r:embed="rId34" cstate="print">
               <a:extLst>
                 <a:ext uri="{28A0092B-C50C-407E-A947-70E740481C1C}">
                   <a14:useLocalDpi xmlns:a14="http://schemas.microsoft.com/office/drawing/2010/main" val="0"/>
@@ -35626,7 +36366,7 @@
                                 <m:sSubPr>
                                   <m:ctrlPr>
                                     <a:rPr lang="en-US" sz="2000" b="0" i="1" smtClean="0">
-                                      <a:latin typeface="Cambria Math" charset="0"/>
+                                      <a:latin typeface="Cambria Math" panose="02040503050406030204" pitchFamily="18" charset="0"/>
                                       <a:cs typeface="Arial" panose="020B0604020202020204" pitchFamily="34" charset="0"/>
                                     </a:rPr>
                                   </m:ctrlPr>
@@ -35637,7 +36377,7 @@
                                       <m:chr m:val="⃗"/>
                                       <m:ctrlPr>
                                         <a:rPr lang="en-US" sz="2000" b="0" i="1" smtClean="0">
-                                          <a:latin typeface="Cambria Math" charset="0"/>
+                                          <a:latin typeface="Cambria Math" panose="02040503050406030204" pitchFamily="18" charset="0"/>
                                           <a:cs typeface="Arial" panose="020B0604020202020204" pitchFamily="34" charset="0"/>
                                         </a:rPr>
                                       </m:ctrlPr>
@@ -35749,7 +36489,7 @@
                                   <m:chr m:val="⃗"/>
                                   <m:ctrlPr>
                                     <a:rPr lang="en-US" sz="2000" b="0" i="1" smtClean="0">
-                                      <a:latin typeface="Cambria Math" charset="0"/>
+                                      <a:latin typeface="Cambria Math" panose="02040503050406030204" pitchFamily="18" charset="0"/>
                                       <a:cs typeface="Arial" panose="020B0604020202020204" pitchFamily="34" charset="0"/>
                                     </a:rPr>
                                   </m:ctrlPr>
@@ -35849,7 +36589,7 @@
                                 <m:sSubPr>
                                   <m:ctrlPr>
                                     <a:rPr lang="en-US" sz="2000" b="0" i="1" smtClean="0">
-                                      <a:latin typeface="Cambria Math" charset="0"/>
+                                      <a:latin typeface="Cambria Math" panose="02040503050406030204" pitchFamily="18" charset="0"/>
                                       <a:cs typeface="Arial" panose="020B0604020202020204" pitchFamily="34" charset="0"/>
                                     </a:rPr>
                                   </m:ctrlPr>
@@ -35860,7 +36600,7 @@
                                       <m:chr m:val="⃗"/>
                                       <m:ctrlPr>
                                         <a:rPr lang="en-US" sz="2000" b="0" i="1" smtClean="0">
-                                          <a:latin typeface="Cambria Math" charset="0"/>
+                                          <a:latin typeface="Cambria Math" panose="02040503050406030204" pitchFamily="18" charset="0"/>
                                           <a:cs typeface="Arial" panose="020B0604020202020204" pitchFamily="34" charset="0"/>
                                         </a:rPr>
                                       </m:ctrlPr>
@@ -36387,7 +37127,7 @@
                               <m:fPr>
                                 <m:ctrlPr>
                                   <a:rPr lang="en-US" sz="2000" b="0" i="1" smtClean="0">
-                                    <a:latin typeface="Cambria Math" charset="0"/>
+                                    <a:latin typeface="Cambria Math" panose="02040503050406030204" pitchFamily="18" charset="0"/>
                                     <a:cs typeface="Arial" panose="020B0604020202020204" pitchFamily="34" charset="0"/>
                                   </a:rPr>
                                 </m:ctrlPr>
@@ -36772,7 +37512,7 @@
                           <m:sSubPr>
                             <m:ctrlPr>
                               <a:rPr lang="en-US" sz="2000" b="0" i="1" smtClean="0">
-                                <a:latin typeface="Cambria Math" charset="0"/>
+                                <a:latin typeface="Cambria Math" panose="02040503050406030204" pitchFamily="18" charset="0"/>
                                 <a:cs typeface="Arial" panose="020B0604020202020204" pitchFamily="34" charset="0"/>
                               </a:rPr>
                             </m:ctrlPr>
@@ -36783,7 +37523,7 @@
                                 <m:chr m:val="⃗"/>
                                 <m:ctrlPr>
                                   <a:rPr lang="en-US" sz="2000" b="0" i="1" smtClean="0">
-                                    <a:latin typeface="Cambria Math" charset="0"/>
+                                    <a:latin typeface="Cambria Math" panose="02040503050406030204" pitchFamily="18" charset="0"/>
                                     <a:cs typeface="Arial" panose="020B0604020202020204" pitchFamily="34" charset="0"/>
                                   </a:rPr>
                                 </m:ctrlPr>

</xml_diff>